<commit_message>
Update to functions ppt
</commit_message>
<xml_diff>
--- a/tehtavat/tiedostot/maol/power_point/Racket-MAOL-9-funktiot.pptx
+++ b/tehtavat/tiedostot/maol/power_point/Racket-MAOL-9-funktiot.pptx
@@ -6,7 +6,7 @@
     <p:sldMasterId id="2147483703" r:id="rId2"/>
   </p:sldMasterIdLst>
   <p:notesMasterIdLst>
-    <p:notesMasterId r:id="rId13"/>
+    <p:notesMasterId r:id="rId17"/>
   </p:notesMasterIdLst>
   <p:sldIdLst>
     <p:sldId id="442" r:id="rId3"/>
@@ -19,11 +19,15 @@
     <p:sldId id="446" r:id="rId10"/>
     <p:sldId id="439" r:id="rId11"/>
     <p:sldId id="447" r:id="rId12"/>
+    <p:sldId id="448" r:id="rId13"/>
+    <p:sldId id="449" r:id="rId14"/>
+    <p:sldId id="450" r:id="rId15"/>
+    <p:sldId id="451" r:id="rId16"/>
   </p:sldIdLst>
   <p:sldSz cx="9144000" cy="6858000" type="screen4x3"/>
   <p:notesSz cx="6858000" cy="9144000"/>
   <p:custDataLst>
-    <p:tags r:id="rId14"/>
+    <p:tags r:id="rId18"/>
   </p:custDataLst>
   <p:defaultTextStyle>
     <a:defPPr>
@@ -678,6 +682,270 @@
     <p:extLst>
       <p:ext uri="{BB962C8B-B14F-4D97-AF65-F5344CB8AC3E}">
         <p14:creationId xmlns:p14="http://schemas.microsoft.com/office/powerpoint/2010/main" val="4020760728"/>
+      </p:ext>
+    </p:extLst>
+  </p:cSld>
+  <p:clrMapOvr>
+    <a:masterClrMapping/>
+  </p:clrMapOvr>
+</p:notes>
+</file>
+
+<file path=ppt/notesSlides/notesSlide3.xml><?xml version="1.0" encoding="utf-8"?>
+<p:notes xmlns:a="http://schemas.openxmlformats.org/drawingml/2006/main" xmlns:r="http://schemas.openxmlformats.org/officeDocument/2006/relationships" xmlns:p="http://schemas.openxmlformats.org/presentationml/2006/main">
+  <p:cSld>
+    <p:spTree>
+      <p:nvGrpSpPr>
+        <p:cNvPr id="1" name=""/>
+        <p:cNvGrpSpPr/>
+        <p:nvPr/>
+      </p:nvGrpSpPr>
+      <p:grpSpPr>
+        <a:xfrm>
+          <a:off x="0" y="0"/>
+          <a:ext cx="0" cy="0"/>
+          <a:chOff x="0" y="0"/>
+          <a:chExt cx="0" cy="0"/>
+        </a:xfrm>
+      </p:grpSpPr>
+      <p:sp>
+        <p:nvSpPr>
+          <p:cNvPr id="2" name="Slide Image Placeholder 1"/>
+          <p:cNvSpPr>
+            <a:spLocks noGrp="1" noRot="1" noChangeAspect="1"/>
+          </p:cNvSpPr>
+          <p:nvPr>
+            <p:ph type="sldImg"/>
+          </p:nvPr>
+        </p:nvSpPr>
+        <p:spPr>
+          <a:xfrm>
+            <a:off x="-14225588" y="-11796713"/>
+            <a:ext cx="16649701" cy="12488863"/>
+          </a:xfrm>
+        </p:spPr>
+      </p:sp>
+      <p:sp>
+        <p:nvSpPr>
+          <p:cNvPr id="3" name="Notes Placeholder 2"/>
+          <p:cNvSpPr>
+            <a:spLocks noGrp="1"/>
+          </p:cNvSpPr>
+          <p:nvPr>
+            <p:ph type="body" idx="1"/>
+          </p:nvPr>
+        </p:nvSpPr>
+        <p:spPr/>
+        <p:txBody>
+          <a:bodyPr/>
+          <a:lstStyle/>
+          <a:p>
+            <a:endParaRPr lang="fi-FI" dirty="0"/>
+          </a:p>
+        </p:txBody>
+      </p:sp>
+    </p:spTree>
+    <p:extLst>
+      <p:ext uri="{BB962C8B-B14F-4D97-AF65-F5344CB8AC3E}">
+        <p14:creationId xmlns:p14="http://schemas.microsoft.com/office/powerpoint/2010/main" val="683687875"/>
+      </p:ext>
+    </p:extLst>
+  </p:cSld>
+  <p:clrMapOvr>
+    <a:masterClrMapping/>
+  </p:clrMapOvr>
+</p:notes>
+</file>
+
+<file path=ppt/notesSlides/notesSlide4.xml><?xml version="1.0" encoding="utf-8"?>
+<p:notes xmlns:a="http://schemas.openxmlformats.org/drawingml/2006/main" xmlns:r="http://schemas.openxmlformats.org/officeDocument/2006/relationships" xmlns:p="http://schemas.openxmlformats.org/presentationml/2006/main">
+  <p:cSld>
+    <p:spTree>
+      <p:nvGrpSpPr>
+        <p:cNvPr id="1" name=""/>
+        <p:cNvGrpSpPr/>
+        <p:nvPr/>
+      </p:nvGrpSpPr>
+      <p:grpSpPr>
+        <a:xfrm>
+          <a:off x="0" y="0"/>
+          <a:ext cx="0" cy="0"/>
+          <a:chOff x="0" y="0"/>
+          <a:chExt cx="0" cy="0"/>
+        </a:xfrm>
+      </p:grpSpPr>
+      <p:sp>
+        <p:nvSpPr>
+          <p:cNvPr id="2" name="Slide Image Placeholder 1"/>
+          <p:cNvSpPr>
+            <a:spLocks noGrp="1" noRot="1" noChangeAspect="1"/>
+          </p:cNvSpPr>
+          <p:nvPr>
+            <p:ph type="sldImg"/>
+          </p:nvPr>
+        </p:nvSpPr>
+        <p:spPr>
+          <a:xfrm>
+            <a:off x="-14225588" y="-11796713"/>
+            <a:ext cx="16649701" cy="12488863"/>
+          </a:xfrm>
+        </p:spPr>
+      </p:sp>
+      <p:sp>
+        <p:nvSpPr>
+          <p:cNvPr id="3" name="Notes Placeholder 2"/>
+          <p:cNvSpPr>
+            <a:spLocks noGrp="1"/>
+          </p:cNvSpPr>
+          <p:nvPr>
+            <p:ph type="body" idx="1"/>
+          </p:nvPr>
+        </p:nvSpPr>
+        <p:spPr/>
+        <p:txBody>
+          <a:bodyPr/>
+          <a:lstStyle/>
+          <a:p>
+            <a:endParaRPr lang="fi-FI" dirty="0"/>
+          </a:p>
+        </p:txBody>
+      </p:sp>
+    </p:spTree>
+    <p:extLst>
+      <p:ext uri="{BB962C8B-B14F-4D97-AF65-F5344CB8AC3E}">
+        <p14:creationId xmlns:p14="http://schemas.microsoft.com/office/powerpoint/2010/main" val="2491845295"/>
+      </p:ext>
+    </p:extLst>
+  </p:cSld>
+  <p:clrMapOvr>
+    <a:masterClrMapping/>
+  </p:clrMapOvr>
+</p:notes>
+</file>
+
+<file path=ppt/notesSlides/notesSlide5.xml><?xml version="1.0" encoding="utf-8"?>
+<p:notes xmlns:a="http://schemas.openxmlformats.org/drawingml/2006/main" xmlns:r="http://schemas.openxmlformats.org/officeDocument/2006/relationships" xmlns:p="http://schemas.openxmlformats.org/presentationml/2006/main">
+  <p:cSld>
+    <p:spTree>
+      <p:nvGrpSpPr>
+        <p:cNvPr id="1" name=""/>
+        <p:cNvGrpSpPr/>
+        <p:nvPr/>
+      </p:nvGrpSpPr>
+      <p:grpSpPr>
+        <a:xfrm>
+          <a:off x="0" y="0"/>
+          <a:ext cx="0" cy="0"/>
+          <a:chOff x="0" y="0"/>
+          <a:chExt cx="0" cy="0"/>
+        </a:xfrm>
+      </p:grpSpPr>
+      <p:sp>
+        <p:nvSpPr>
+          <p:cNvPr id="2" name="Slide Image Placeholder 1"/>
+          <p:cNvSpPr>
+            <a:spLocks noGrp="1" noRot="1" noChangeAspect="1"/>
+          </p:cNvSpPr>
+          <p:nvPr>
+            <p:ph type="sldImg"/>
+          </p:nvPr>
+        </p:nvSpPr>
+        <p:spPr>
+          <a:xfrm>
+            <a:off x="-14225588" y="-11796713"/>
+            <a:ext cx="16649701" cy="12488863"/>
+          </a:xfrm>
+        </p:spPr>
+      </p:sp>
+      <p:sp>
+        <p:nvSpPr>
+          <p:cNvPr id="3" name="Notes Placeholder 2"/>
+          <p:cNvSpPr>
+            <a:spLocks noGrp="1"/>
+          </p:cNvSpPr>
+          <p:nvPr>
+            <p:ph type="body" idx="1"/>
+          </p:nvPr>
+        </p:nvSpPr>
+        <p:spPr/>
+        <p:txBody>
+          <a:bodyPr/>
+          <a:lstStyle/>
+          <a:p>
+            <a:endParaRPr lang="fi-FI" dirty="0"/>
+          </a:p>
+        </p:txBody>
+      </p:sp>
+    </p:spTree>
+    <p:extLst>
+      <p:ext uri="{BB962C8B-B14F-4D97-AF65-F5344CB8AC3E}">
+        <p14:creationId xmlns:p14="http://schemas.microsoft.com/office/powerpoint/2010/main" val="2143709767"/>
+      </p:ext>
+    </p:extLst>
+  </p:cSld>
+  <p:clrMapOvr>
+    <a:masterClrMapping/>
+  </p:clrMapOvr>
+</p:notes>
+</file>
+
+<file path=ppt/notesSlides/notesSlide6.xml><?xml version="1.0" encoding="utf-8"?>
+<p:notes xmlns:a="http://schemas.openxmlformats.org/drawingml/2006/main" xmlns:r="http://schemas.openxmlformats.org/officeDocument/2006/relationships" xmlns:p="http://schemas.openxmlformats.org/presentationml/2006/main">
+  <p:cSld>
+    <p:spTree>
+      <p:nvGrpSpPr>
+        <p:cNvPr id="1" name=""/>
+        <p:cNvGrpSpPr/>
+        <p:nvPr/>
+      </p:nvGrpSpPr>
+      <p:grpSpPr>
+        <a:xfrm>
+          <a:off x="0" y="0"/>
+          <a:ext cx="0" cy="0"/>
+          <a:chOff x="0" y="0"/>
+          <a:chExt cx="0" cy="0"/>
+        </a:xfrm>
+      </p:grpSpPr>
+      <p:sp>
+        <p:nvSpPr>
+          <p:cNvPr id="2" name="Slide Image Placeholder 1"/>
+          <p:cNvSpPr>
+            <a:spLocks noGrp="1" noRot="1" noChangeAspect="1"/>
+          </p:cNvSpPr>
+          <p:nvPr>
+            <p:ph type="sldImg"/>
+          </p:nvPr>
+        </p:nvSpPr>
+        <p:spPr>
+          <a:xfrm>
+            <a:off x="-14225588" y="-11796713"/>
+            <a:ext cx="16649701" cy="12488863"/>
+          </a:xfrm>
+        </p:spPr>
+      </p:sp>
+      <p:sp>
+        <p:nvSpPr>
+          <p:cNvPr id="3" name="Notes Placeholder 2"/>
+          <p:cNvSpPr>
+            <a:spLocks noGrp="1"/>
+          </p:cNvSpPr>
+          <p:nvPr>
+            <p:ph type="body" idx="1"/>
+          </p:nvPr>
+        </p:nvSpPr>
+        <p:spPr/>
+        <p:txBody>
+          <a:bodyPr/>
+          <a:lstStyle/>
+          <a:p>
+            <a:endParaRPr lang="fi-FI" dirty="0"/>
+          </a:p>
+        </p:txBody>
+      </p:sp>
+    </p:spTree>
+    <p:extLst>
+      <p:ext uri="{BB962C8B-B14F-4D97-AF65-F5344CB8AC3E}">
+        <p14:creationId xmlns:p14="http://schemas.microsoft.com/office/powerpoint/2010/main" val="1269622697"/>
       </p:ext>
     </p:extLst>
   </p:cSld>
@@ -7490,7 +7758,7 @@
         <p:spPr>
           <a:xfrm>
             <a:off x="384572" y="1439048"/>
-            <a:ext cx="6770571" cy="584775"/>
+            <a:ext cx="6308137" cy="584775"/>
           </a:xfrm>
           <a:prstGeom prst="rect">
             <a:avLst/>
@@ -7512,7 +7780,7 @@
                 </a:solidFill>
                 <a:latin typeface="Arial" charset="0"/>
               </a:rPr>
-              <a:t>0) Asenna plot-kirjasto (DrRacket)</a:t>
+              <a:t>Asenna plot-kirjasto (DrRacket)</a:t>
             </a:r>
             <a:endParaRPr lang="fi-FI" sz="3200" dirty="0"/>
           </a:p>
@@ -8883,6 +9151,4121 @@
     <p:extLst>
       <p:ext uri="{BB962C8B-B14F-4D97-AF65-F5344CB8AC3E}">
         <p14:creationId xmlns:p14="http://schemas.microsoft.com/office/powerpoint/2010/main" val="952103519"/>
+      </p:ext>
+    </p:extLst>
+  </p:cSld>
+  <p:clrMapOvr>
+    <a:masterClrMapping/>
+  </p:clrMapOvr>
+</p:sld>
+</file>
+
+<file path=ppt/slides/slide11.xml><?xml version="1.0" encoding="utf-8"?>
+<p:sld xmlns:a="http://schemas.openxmlformats.org/drawingml/2006/main" xmlns:r="http://schemas.openxmlformats.org/officeDocument/2006/relationships" xmlns:p="http://schemas.openxmlformats.org/presentationml/2006/main">
+  <p:cSld>
+    <p:spTree>
+      <p:nvGrpSpPr>
+        <p:cNvPr id="1" name=""/>
+        <p:cNvGrpSpPr/>
+        <p:nvPr/>
+      </p:nvGrpSpPr>
+      <p:grpSpPr>
+        <a:xfrm>
+          <a:off x="0" y="0"/>
+          <a:ext cx="0" cy="0"/>
+          <a:chOff x="0" y="0"/>
+          <a:chExt cx="0" cy="0"/>
+        </a:xfrm>
+      </p:grpSpPr>
+      <p:pic>
+        <p:nvPicPr>
+          <p:cNvPr id="10" name="Picture 8" descr="https://avatars0.githubusercontent.com/u/232371?v=3&amp;s=400"/>
+          <p:cNvPicPr>
+            <a:picLocks noChangeAspect="1" noChangeArrowheads="1"/>
+          </p:cNvPicPr>
+          <p:nvPr/>
+        </p:nvPicPr>
+        <p:blipFill>
+          <a:blip r:embed="rId3" cstate="print">
+            <a:extLst>
+              <a:ext uri="{28A0092B-C50C-407E-A947-70E740481C1C}">
+                <a14:useLocalDpi xmlns:a14="http://schemas.microsoft.com/office/drawing/2010/main" val="0"/>
+              </a:ext>
+            </a:extLst>
+          </a:blip>
+          <a:srcRect/>
+          <a:stretch>
+            <a:fillRect/>
+          </a:stretch>
+        </p:blipFill>
+        <p:spPr bwMode="auto">
+          <a:xfrm>
+            <a:off x="235017" y="5306027"/>
+            <a:ext cx="1254667" cy="1254668"/>
+          </a:xfrm>
+          <a:prstGeom prst="rect">
+            <a:avLst/>
+          </a:prstGeom>
+          <a:noFill/>
+          <a:ln>
+            <a:noFill/>
+          </a:ln>
+          <a:extLst>
+            <a:ext uri="{909E8E84-426E-40DD-AFC4-6F175D3DCCD1}">
+              <a14:hiddenFill xmlns:a14="http://schemas.microsoft.com/office/drawing/2010/main">
+                <a:solidFill>
+                  <a:srgbClr val="FFFFFF"/>
+                </a:solidFill>
+              </a14:hiddenFill>
+            </a:ext>
+            <a:ext uri="{91240B29-F687-4F45-9708-019B960494DF}">
+              <a14:hiddenLine xmlns:a14="http://schemas.microsoft.com/office/drawing/2010/main" w="9525">
+                <a:solidFill>
+                  <a:srgbClr val="000000"/>
+                </a:solidFill>
+                <a:miter lim="800000"/>
+                <a:headEnd/>
+                <a:tailEnd/>
+              </a14:hiddenLine>
+            </a:ext>
+          </a:extLst>
+        </p:spPr>
+      </p:pic>
+      <p:sp>
+        <p:nvSpPr>
+          <p:cNvPr id="13" name="Suorakulmio 12"/>
+          <p:cNvSpPr/>
+          <p:nvPr/>
+        </p:nvSpPr>
+        <p:spPr bwMode="auto">
+          <a:xfrm>
+            <a:off x="5311958" y="240174"/>
+            <a:ext cx="3570371" cy="531170"/>
+          </a:xfrm>
+          <a:prstGeom prst="rect">
+            <a:avLst/>
+          </a:prstGeom>
+          <a:ln>
+            <a:headEnd type="none" w="med" len="med"/>
+            <a:tailEnd type="none" w="med" len="med"/>
+          </a:ln>
+          <a:scene3d>
+            <a:camera prst="orthographicFront"/>
+            <a:lightRig rig="threePt" dir="t"/>
+          </a:scene3d>
+          <a:sp3d>
+            <a:bevelT w="114300" prst="artDeco"/>
+          </a:sp3d>
+        </p:spPr>
+        <p:style>
+          <a:lnRef idx="2">
+            <a:schemeClr val="accent4"/>
+          </a:lnRef>
+          <a:fillRef idx="1">
+            <a:schemeClr val="lt1"/>
+          </a:fillRef>
+          <a:effectRef idx="0">
+            <a:schemeClr val="accent4"/>
+          </a:effectRef>
+          <a:fontRef idx="minor">
+            <a:schemeClr val="dk1"/>
+          </a:fontRef>
+        </p:style>
+        <p:txBody>
+          <a:bodyPr vert="horz" wrap="square" lIns="91440" tIns="45720" rIns="91440" bIns="45720" numCol="1" rtlCol="0" anchor="t" anchorCtr="0" compatLnSpc="1">
+            <a:prstTxWarp prst="textNoShape">
+              <a:avLst/>
+            </a:prstTxWarp>
+          </a:bodyPr>
+          <a:lstStyle/>
+          <a:p>
+            <a:pPr marL="0" marR="0" indent="0" algn="ctr" defTabSz="449263" rtl="0" eaLnBrk="1" fontAlgn="base" latinLnBrk="0" hangingPunct="1">
+              <a:lnSpc>
+                <a:spcPct val="100000"/>
+              </a:lnSpc>
+              <a:spcBef>
+                <a:spcPct val="0"/>
+              </a:spcBef>
+              <a:spcAft>
+                <a:spcPct val="0"/>
+              </a:spcAft>
+              <a:buClr>
+                <a:srgbClr val="000000"/>
+              </a:buClr>
+              <a:buSzPct val="100000"/>
+              <a:buFont typeface="Times New Roman" pitchFamily="16" charset="0"/>
+              <a:buNone/>
+              <a:tabLst/>
+            </a:pPr>
+            <a:r>
+              <a:rPr kumimoji="0" lang="fi-FI" sz="2400" b="0" i="0" u="none" strike="noStrike" cap="none" normalizeH="0" dirty="0">
+                <a:ln>
+                  <a:noFill/>
+                </a:ln>
+                <a:solidFill>
+                  <a:schemeClr val="tx2">
+                    <a:lumMod val="75000"/>
+                    <a:lumOff val="25000"/>
+                  </a:schemeClr>
+                </a:solidFill>
+                <a:effectLst/>
+                <a:latin typeface="Arial" charset="0"/>
+              </a:rPr>
+              <a:t>MÄÄRITTELYIKKUNA</a:t>
+            </a:r>
+            <a:endParaRPr kumimoji="0" lang="fi-FI" sz="1800" b="0" i="0" u="none" strike="noStrike" cap="none" normalizeH="0" dirty="0">
+              <a:ln>
+                <a:noFill/>
+              </a:ln>
+              <a:solidFill>
+                <a:schemeClr val="tx2">
+                  <a:lumMod val="75000"/>
+                  <a:lumOff val="25000"/>
+                </a:schemeClr>
+              </a:solidFill>
+              <a:effectLst/>
+              <a:latin typeface="Arial" charset="0"/>
+            </a:endParaRPr>
+          </a:p>
+          <a:p>
+            <a:pPr marL="0" marR="0" indent="0" algn="l" defTabSz="449263" rtl="0" eaLnBrk="1" fontAlgn="base" latinLnBrk="0" hangingPunct="1">
+              <a:lnSpc>
+                <a:spcPct val="100000"/>
+              </a:lnSpc>
+              <a:spcBef>
+                <a:spcPct val="0"/>
+              </a:spcBef>
+              <a:spcAft>
+                <a:spcPct val="0"/>
+              </a:spcAft>
+              <a:buClr>
+                <a:srgbClr val="000000"/>
+              </a:buClr>
+              <a:buSzPct val="100000"/>
+              <a:buFont typeface="Times New Roman" pitchFamily="16" charset="0"/>
+              <a:buNone/>
+              <a:tabLst/>
+            </a:pPr>
+            <a:endParaRPr kumimoji="0" lang="fi-FI" sz="1800" b="0" i="0" u="none" strike="noStrike" cap="none" normalizeH="0" dirty="0">
+              <a:ln>
+                <a:noFill/>
+              </a:ln>
+              <a:solidFill>
+                <a:schemeClr val="tx2">
+                  <a:lumMod val="75000"/>
+                  <a:lumOff val="25000"/>
+                </a:schemeClr>
+              </a:solidFill>
+              <a:effectLst/>
+              <a:latin typeface="Arial" charset="0"/>
+            </a:endParaRPr>
+          </a:p>
+        </p:txBody>
+      </p:sp>
+      <p:sp>
+        <p:nvSpPr>
+          <p:cNvPr id="43" name="Suorakulmio 42"/>
+          <p:cNvSpPr/>
+          <p:nvPr/>
+        </p:nvSpPr>
+        <p:spPr>
+          <a:xfrm>
+            <a:off x="7303" y="1642977"/>
+            <a:ext cx="1074012" cy="338554"/>
+          </a:xfrm>
+          <a:prstGeom prst="rect">
+            <a:avLst/>
+          </a:prstGeom>
+          <a:solidFill>
+            <a:schemeClr val="accent2">
+              <a:lumMod val="75000"/>
+            </a:schemeClr>
+          </a:solidFill>
+        </p:spPr>
+        <p:txBody>
+          <a:bodyPr wrap="none">
+            <a:spAutoFit/>
+          </a:bodyPr>
+          <a:lstStyle/>
+          <a:p>
+            <a:r>
+              <a:rPr kumimoji="0" lang="fi-FI" sz="1600" b="0" i="0" u="none" strike="noStrike" cap="none" normalizeH="0" dirty="0">
+                <a:ln>
+                  <a:noFill/>
+                </a:ln>
+                <a:effectLst/>
+                <a:latin typeface="Arial" charset="0"/>
+              </a:rPr>
+              <a:t>Tehtävä </a:t>
+            </a:r>
+            <a:r>
+              <a:rPr lang="fi-FI" sz="1600" dirty="0">
+                <a:latin typeface="Arial" charset="0"/>
+              </a:rPr>
+              <a:t>5</a:t>
+            </a:r>
+            <a:endParaRPr lang="fi-FI" sz="1600" dirty="0"/>
+          </a:p>
+        </p:txBody>
+      </p:sp>
+      <p:sp>
+        <p:nvSpPr>
+          <p:cNvPr id="45" name="Suorakulmio 44"/>
+          <p:cNvSpPr/>
+          <p:nvPr/>
+        </p:nvSpPr>
+        <p:spPr>
+          <a:xfrm>
+            <a:off x="11237" y="3861048"/>
+            <a:ext cx="1074012" cy="338554"/>
+          </a:xfrm>
+          <a:prstGeom prst="rect">
+            <a:avLst/>
+          </a:prstGeom>
+          <a:solidFill>
+            <a:schemeClr val="accent2">
+              <a:lumMod val="75000"/>
+            </a:schemeClr>
+          </a:solidFill>
+        </p:spPr>
+        <p:txBody>
+          <a:bodyPr wrap="none">
+            <a:spAutoFit/>
+          </a:bodyPr>
+          <a:lstStyle/>
+          <a:p>
+            <a:r>
+              <a:rPr kumimoji="0" lang="fi-FI" sz="1600" b="0" i="0" u="none" strike="noStrike" cap="none" normalizeH="0" dirty="0">
+                <a:ln>
+                  <a:noFill/>
+                </a:ln>
+                <a:effectLst/>
+                <a:latin typeface="Arial" charset="0"/>
+              </a:rPr>
+              <a:t>Tehtävä </a:t>
+            </a:r>
+            <a:r>
+              <a:rPr lang="fi-FI" sz="1600" dirty="0">
+                <a:latin typeface="Arial" charset="0"/>
+              </a:rPr>
+              <a:t>6</a:t>
+            </a:r>
+            <a:endParaRPr lang="fi-FI" sz="1600" dirty="0"/>
+          </a:p>
+        </p:txBody>
+      </p:sp>
+      <p:pic>
+        <p:nvPicPr>
+          <p:cNvPr id="42" name="Kuva 41"/>
+          <p:cNvPicPr>
+            <a:picLocks noChangeAspect="1"/>
+          </p:cNvPicPr>
+          <p:nvPr/>
+        </p:nvPicPr>
+        <p:blipFill>
+          <a:blip r:embed="rId4">
+            <a:extLst>
+              <a:ext uri="{28A0092B-C50C-407E-A947-70E740481C1C}">
+                <a14:useLocalDpi xmlns:a14="http://schemas.microsoft.com/office/drawing/2010/main" val="0"/>
+              </a:ext>
+            </a:extLst>
+          </a:blip>
+          <a:stretch>
+            <a:fillRect/>
+          </a:stretch>
+        </p:blipFill>
+        <p:spPr>
+          <a:xfrm>
+            <a:off x="8068724" y="1165451"/>
+            <a:ext cx="1075276" cy="516133"/>
+          </a:xfrm>
+          <a:prstGeom prst="rect">
+            <a:avLst/>
+          </a:prstGeom>
+        </p:spPr>
+      </p:pic>
+      <p:sp>
+        <p:nvSpPr>
+          <p:cNvPr id="3" name="Alatunnisteen paikkamerkki 2"/>
+          <p:cNvSpPr>
+            <a:spLocks noGrp="1"/>
+          </p:cNvSpPr>
+          <p:nvPr>
+            <p:ph type="ftr" sz="quarter" idx="11"/>
+          </p:nvPr>
+        </p:nvSpPr>
+        <p:spPr>
+          <a:xfrm>
+            <a:off x="755576" y="6308361"/>
+            <a:ext cx="4870585" cy="365125"/>
+          </a:xfrm>
+        </p:spPr>
+        <p:txBody>
+          <a:bodyPr/>
+          <a:lstStyle/>
+          <a:p>
+            <a:pPr algn="r">
+              <a:defRPr/>
+            </a:pPr>
+            <a:r>
+              <a:rPr lang="fi-FI" dirty="0"/>
+              <a:t>MAOL Ohjelmointia matematiikkaan</a:t>
+            </a:r>
+            <a:endParaRPr lang="ru-RU" dirty="0"/>
+          </a:p>
+        </p:txBody>
+      </p:sp>
+      <p:sp>
+        <p:nvSpPr>
+          <p:cNvPr id="35" name="Suorakulmio 34"/>
+          <p:cNvSpPr/>
+          <p:nvPr/>
+        </p:nvSpPr>
+        <p:spPr>
+          <a:xfrm>
+            <a:off x="428520" y="765364"/>
+            <a:ext cx="8391952" cy="677108"/>
+          </a:xfrm>
+          <a:prstGeom prst="rect">
+            <a:avLst/>
+          </a:prstGeom>
+        </p:spPr>
+        <p:txBody>
+          <a:bodyPr wrap="square">
+            <a:spAutoFit/>
+          </a:bodyPr>
+          <a:lstStyle/>
+          <a:p>
+            <a:r>
+              <a:rPr lang="fi-FI" sz="2200" dirty="0">
+                <a:solidFill>
+                  <a:schemeClr val="tx1"/>
+                </a:solidFill>
+                <a:latin typeface="Arial" charset="0"/>
+              </a:rPr>
+              <a:t>Harjoittele kuvaajien piirtämistä:     </a:t>
+            </a:r>
+            <a:r>
+              <a:rPr lang="fi-FI" sz="1600" i="1" dirty="0">
+                <a:solidFill>
+                  <a:schemeClr val="tx1"/>
+                </a:solidFill>
+                <a:latin typeface="Arial" charset="0"/>
+              </a:rPr>
+              <a:t>(vinkki: plot, points, function, map, vector,</a:t>
+            </a:r>
+          </a:p>
+          <a:p>
+            <a:r>
+              <a:rPr lang="fi-FI" sz="1600" i="1" dirty="0">
+                <a:solidFill>
+                  <a:schemeClr val="tx1"/>
+                </a:solidFill>
+                <a:latin typeface="Arial" charset="0"/>
+              </a:rPr>
+              <a:t>                                                                                       sqr, +, -, *, /)</a:t>
+            </a:r>
+            <a:endParaRPr lang="fi-FI" sz="1600" i="1" dirty="0">
+              <a:solidFill>
+                <a:schemeClr val="tx1"/>
+              </a:solidFill>
+            </a:endParaRPr>
+          </a:p>
+        </p:txBody>
+      </p:sp>
+      <p:pic>
+        <p:nvPicPr>
+          <p:cNvPr id="61" name="Picture 2" descr="WeScheme Logo"/>
+          <p:cNvPicPr>
+            <a:picLocks noChangeAspect="1" noChangeArrowheads="1"/>
+          </p:cNvPicPr>
+          <p:nvPr/>
+        </p:nvPicPr>
+        <p:blipFill>
+          <a:blip r:embed="rId5" cstate="print">
+            <a:extLst>
+              <a:ext uri="{28A0092B-C50C-407E-A947-70E740481C1C}">
+                <a14:useLocalDpi xmlns:a14="http://schemas.microsoft.com/office/drawing/2010/main" val="0"/>
+              </a:ext>
+            </a:extLst>
+          </a:blip>
+          <a:srcRect/>
+          <a:stretch>
+            <a:fillRect/>
+          </a:stretch>
+        </p:blipFill>
+        <p:spPr bwMode="auto">
+          <a:xfrm>
+            <a:off x="7386527" y="5180161"/>
+            <a:ext cx="1495802" cy="1383832"/>
+          </a:xfrm>
+          <a:prstGeom prst="rect">
+            <a:avLst/>
+          </a:prstGeom>
+          <a:noFill/>
+          <a:ln>
+            <a:noFill/>
+          </a:ln>
+          <a:effectLst>
+            <a:outerShdw blurRad="50800" dist="38100" dir="5400000" algn="t" rotWithShape="0">
+              <a:prstClr val="black">
+                <a:alpha val="40000"/>
+              </a:prstClr>
+            </a:outerShdw>
+          </a:effectLst>
+          <a:extLst>
+            <a:ext uri="{909E8E84-426E-40DD-AFC4-6F175D3DCCD1}">
+              <a14:hiddenFill xmlns:a14="http://schemas.microsoft.com/office/drawing/2010/main">
+                <a:solidFill>
+                  <a:srgbClr val="FFFFFF"/>
+                </a:solidFill>
+              </a14:hiddenFill>
+            </a:ext>
+            <a:ext uri="{91240B29-F687-4F45-9708-019B960494DF}">
+              <a14:hiddenLine xmlns:a14="http://schemas.microsoft.com/office/drawing/2010/main" w="9525">
+                <a:solidFill>
+                  <a:srgbClr val="000000"/>
+                </a:solidFill>
+                <a:miter lim="800000"/>
+                <a:headEnd/>
+                <a:tailEnd/>
+              </a14:hiddenLine>
+            </a:ext>
+          </a:extLst>
+        </p:spPr>
+      </p:pic>
+      <p:sp>
+        <p:nvSpPr>
+          <p:cNvPr id="24" name="Suorakulmio 34"/>
+          <p:cNvSpPr/>
+          <p:nvPr/>
+        </p:nvSpPr>
+        <p:spPr>
+          <a:xfrm>
+            <a:off x="1163679" y="3769543"/>
+            <a:ext cx="6976866" cy="1446550"/>
+          </a:xfrm>
+          <a:prstGeom prst="rect">
+            <a:avLst/>
+          </a:prstGeom>
+        </p:spPr>
+        <p:txBody>
+          <a:bodyPr wrap="square">
+            <a:spAutoFit/>
+          </a:bodyPr>
+          <a:lstStyle/>
+          <a:p>
+            <a:r>
+              <a:rPr lang="fi-FI" sz="2200" dirty="0">
+                <a:solidFill>
+                  <a:schemeClr val="tx1"/>
+                </a:solidFill>
+                <a:latin typeface="Arial" charset="0"/>
+              </a:rPr>
+              <a:t>Piirrä pisteiden avulla haluamasi paraabelin kuvaaja. Voit laskea pisteet itse tai kokeilla generoida niitä map:in (ja vector-funtion) avulla (katso mallia teoria dioista).</a:t>
+            </a:r>
+            <a:endParaRPr lang="fi-FI" sz="2200" i="1" dirty="0">
+              <a:solidFill>
+                <a:schemeClr val="tx1"/>
+              </a:solidFill>
+              <a:latin typeface="Arial" charset="0"/>
+            </a:endParaRPr>
+          </a:p>
+        </p:txBody>
+      </p:sp>
+      <mc:AlternateContent xmlns:mc="http://schemas.openxmlformats.org/markup-compatibility/2006" xmlns:a14="http://schemas.microsoft.com/office/drawing/2010/main">
+        <mc:Choice Requires="a14">
+          <p:sp>
+            <p:nvSpPr>
+              <p:cNvPr id="16" name="Suorakulmio 34"/>
+              <p:cNvSpPr/>
+              <p:nvPr/>
+            </p:nvSpPr>
+            <p:spPr>
+              <a:xfrm>
+                <a:off x="1155412" y="1558298"/>
+                <a:ext cx="7446886" cy="2123658"/>
+              </a:xfrm>
+              <a:prstGeom prst="rect">
+                <a:avLst/>
+              </a:prstGeom>
+            </p:spPr>
+            <p:txBody>
+              <a:bodyPr wrap="square">
+                <a:spAutoFit/>
+              </a:bodyPr>
+              <a:lstStyle/>
+              <a:p>
+                <a:r>
+                  <a:rPr lang="fi-FI" sz="2200" dirty="0">
+                    <a:solidFill>
+                      <a:schemeClr val="tx1"/>
+                    </a:solidFill>
+                    <a:latin typeface="Arial" charset="0"/>
+                  </a:rPr>
+                  <a:t>Piirrä samaan koordinaatistoon</a:t>
+                </a:r>
+              </a:p>
+              <a:p>
+                <a:pPr marL="457200" indent="-457200">
+                  <a:buAutoNum type="alphaLcParenR"/>
+                </a:pPr>
+                <a:r>
+                  <a:rPr lang="fi-FI" sz="2200" dirty="0">
+                    <a:solidFill>
+                      <a:schemeClr val="tx1"/>
+                    </a:solidFill>
+                    <a:latin typeface="Arial" charset="0"/>
+                  </a:rPr>
+                  <a:t>Funktion </a:t>
+                </a:r>
+                <a14:m>
+                  <m:oMath xmlns:m="http://schemas.openxmlformats.org/officeDocument/2006/math">
+                    <m:r>
+                      <a:rPr lang="fi-FI" sz="2200" b="0" i="1" smtClean="0">
+                        <a:solidFill>
+                          <a:schemeClr val="tx1"/>
+                        </a:solidFill>
+                        <a:latin typeface="Cambria Math" panose="02040503050406030204" pitchFamily="18" charset="0"/>
+                      </a:rPr>
+                      <m:t>h</m:t>
+                    </m:r>
+                    <m:d>
+                      <m:dPr>
+                        <m:ctrlPr>
+                          <a:rPr lang="fi-FI" sz="2200" b="0" i="1" smtClean="0">
+                            <a:solidFill>
+                              <a:schemeClr val="tx1"/>
+                            </a:solidFill>
+                            <a:latin typeface="Cambria Math" panose="02040503050406030204" pitchFamily="18" charset="0"/>
+                          </a:rPr>
+                        </m:ctrlPr>
+                      </m:dPr>
+                      <m:e>
+                        <m:r>
+                          <a:rPr lang="fi-FI" sz="2200" b="0" i="1" smtClean="0">
+                            <a:solidFill>
+                              <a:schemeClr val="tx1"/>
+                            </a:solidFill>
+                            <a:latin typeface="Cambria Math" panose="02040503050406030204" pitchFamily="18" charset="0"/>
+                          </a:rPr>
+                          <m:t>𝑥</m:t>
+                        </m:r>
+                      </m:e>
+                    </m:d>
+                    <m:r>
+                      <a:rPr lang="fi-FI" sz="2200" i="1" smtClean="0">
+                        <a:solidFill>
+                          <a:schemeClr val="tx1"/>
+                        </a:solidFill>
+                        <a:latin typeface="Cambria Math" panose="02040503050406030204" pitchFamily="18" charset="0"/>
+                      </a:rPr>
+                      <m:t>=</m:t>
+                    </m:r>
+                    <m:r>
+                      <a:rPr lang="fi-FI" sz="2200" b="0" i="1" smtClean="0">
+                        <a:solidFill>
+                          <a:schemeClr val="tx1"/>
+                        </a:solidFill>
+                        <a:latin typeface="Cambria Math" panose="02040503050406030204" pitchFamily="18" charset="0"/>
+                      </a:rPr>
+                      <m:t>2</m:t>
+                    </m:r>
+                    <m:r>
+                      <a:rPr lang="fi-FI" sz="2200" b="0" i="1" smtClean="0">
+                        <a:solidFill>
+                          <a:schemeClr val="tx1"/>
+                        </a:solidFill>
+                        <a:latin typeface="Cambria Math" panose="02040503050406030204" pitchFamily="18" charset="0"/>
+                      </a:rPr>
+                      <m:t>𝑥</m:t>
+                    </m:r>
+                    <m:r>
+                      <a:rPr lang="fi-FI" sz="2200" b="0" i="1" baseline="30000" smtClean="0">
+                        <a:solidFill>
+                          <a:schemeClr val="tx1"/>
+                        </a:solidFill>
+                        <a:latin typeface="Cambria Math" panose="02040503050406030204" pitchFamily="18" charset="0"/>
+                      </a:rPr>
+                      <m:t>2   </m:t>
+                    </m:r>
+                  </m:oMath>
+                </a14:m>
+                <a:r>
+                  <a:rPr lang="fi-FI" sz="2200" dirty="0">
+                    <a:solidFill>
+                      <a:schemeClr val="tx1"/>
+                    </a:solidFill>
+                    <a:latin typeface="Arial" charset="0"/>
+                  </a:rPr>
+                  <a:t>kuvaaja. </a:t>
+                </a:r>
+              </a:p>
+              <a:p>
+                <a:pPr marL="457200" indent="-457200">
+                  <a:buFontTx/>
+                  <a:buAutoNum type="alphaLcParenR"/>
+                </a:pPr>
+                <a:r>
+                  <a:rPr lang="fi-FI" sz="2200" dirty="0">
+                    <a:solidFill>
+                      <a:schemeClr val="tx1"/>
+                    </a:solidFill>
+                    <a:latin typeface="Arial" charset="0"/>
+                  </a:rPr>
+                  <a:t>Funktion </a:t>
+                </a:r>
+                <a14:m>
+                  <m:oMath xmlns:m="http://schemas.openxmlformats.org/officeDocument/2006/math">
+                    <m:r>
+                      <a:rPr lang="fi-FI" sz="2200" b="0" i="1" smtClean="0">
+                        <a:solidFill>
+                          <a:schemeClr val="tx1"/>
+                        </a:solidFill>
+                        <a:latin typeface="Cambria Math" panose="02040503050406030204" pitchFamily="18" charset="0"/>
+                      </a:rPr>
+                      <m:t>𝑖</m:t>
+                    </m:r>
+                    <m:d>
+                      <m:dPr>
+                        <m:ctrlPr>
+                          <a:rPr lang="fi-FI" sz="2200" i="1">
+                            <a:solidFill>
+                              <a:schemeClr val="tx1"/>
+                            </a:solidFill>
+                            <a:latin typeface="Cambria Math" panose="02040503050406030204" pitchFamily="18" charset="0"/>
+                          </a:rPr>
+                        </m:ctrlPr>
+                      </m:dPr>
+                      <m:e>
+                        <m:r>
+                          <a:rPr lang="fi-FI" sz="2200" i="1">
+                            <a:solidFill>
+                              <a:schemeClr val="tx1"/>
+                            </a:solidFill>
+                            <a:latin typeface="Cambria Math" panose="02040503050406030204" pitchFamily="18" charset="0"/>
+                          </a:rPr>
+                          <m:t>𝑥</m:t>
+                        </m:r>
+                      </m:e>
+                    </m:d>
+                    <m:r>
+                      <a:rPr lang="fi-FI" sz="2200" i="1">
+                        <a:solidFill>
+                          <a:schemeClr val="tx1"/>
+                        </a:solidFill>
+                        <a:latin typeface="Cambria Math" panose="02040503050406030204" pitchFamily="18" charset="0"/>
+                      </a:rPr>
+                      <m:t>=2</m:t>
+                    </m:r>
+                    <m:r>
+                      <a:rPr lang="fi-FI" sz="2200" i="1">
+                        <a:solidFill>
+                          <a:schemeClr val="tx1"/>
+                        </a:solidFill>
+                        <a:latin typeface="Cambria Math" panose="02040503050406030204" pitchFamily="18" charset="0"/>
+                      </a:rPr>
+                      <m:t>𝑥</m:t>
+                    </m:r>
+                    <m:r>
+                      <a:rPr lang="fi-FI" sz="2200" i="1" baseline="30000">
+                        <a:solidFill>
+                          <a:schemeClr val="tx1"/>
+                        </a:solidFill>
+                        <a:latin typeface="Cambria Math" panose="02040503050406030204" pitchFamily="18" charset="0"/>
+                      </a:rPr>
+                      <m:t>2 </m:t>
+                    </m:r>
+                    <m:r>
+                      <a:rPr lang="fi-FI" sz="2200" b="0" i="1" smtClean="0">
+                        <a:solidFill>
+                          <a:schemeClr val="tx1"/>
+                        </a:solidFill>
+                        <a:latin typeface="Cambria Math" panose="02040503050406030204" pitchFamily="18" charset="0"/>
+                      </a:rPr>
+                      <m:t>−3</m:t>
+                    </m:r>
+                    <m:r>
+                      <a:rPr lang="fi-FI" sz="2200" i="1" baseline="30000">
+                        <a:solidFill>
+                          <a:schemeClr val="tx1"/>
+                        </a:solidFill>
+                        <a:latin typeface="Cambria Math" panose="02040503050406030204" pitchFamily="18" charset="0"/>
+                      </a:rPr>
+                      <m:t>  </m:t>
+                    </m:r>
+                  </m:oMath>
+                </a14:m>
+                <a:r>
+                  <a:rPr lang="fi-FI" sz="2200" dirty="0">
+                    <a:solidFill>
+                      <a:schemeClr val="tx1"/>
+                    </a:solidFill>
+                    <a:latin typeface="Arial" charset="0"/>
+                  </a:rPr>
+                  <a:t>kuvaaja. Miten kuvaaja muuttui verrattuna kohdan a) kuvaajaan?</a:t>
+                </a:r>
+              </a:p>
+              <a:p>
+                <a:pPr marL="457200" indent="-457200">
+                  <a:buAutoNum type="alphaLcParenR"/>
+                </a:pPr>
+                <a:r>
+                  <a:rPr lang="fi-FI" sz="2200" dirty="0">
+                    <a:solidFill>
+                      <a:schemeClr val="tx1"/>
+                    </a:solidFill>
+                    <a:latin typeface="Arial" charset="0"/>
+                  </a:rPr>
+                  <a:t>Funktion </a:t>
+                </a:r>
+                <a14:m>
+                  <m:oMath xmlns:m="http://schemas.openxmlformats.org/officeDocument/2006/math">
+                    <m:r>
+                      <a:rPr lang="fi-FI" sz="2200" b="0" i="1" smtClean="0">
+                        <a:solidFill>
+                          <a:schemeClr val="tx1"/>
+                        </a:solidFill>
+                        <a:latin typeface="Cambria Math" panose="02040503050406030204" pitchFamily="18" charset="0"/>
+                      </a:rPr>
+                      <m:t>𝑗</m:t>
+                    </m:r>
+                    <m:d>
+                      <m:dPr>
+                        <m:ctrlPr>
+                          <a:rPr lang="fi-FI" sz="2200" i="1">
+                            <a:solidFill>
+                              <a:schemeClr val="tx1"/>
+                            </a:solidFill>
+                            <a:latin typeface="Cambria Math" panose="02040503050406030204" pitchFamily="18" charset="0"/>
+                          </a:rPr>
+                        </m:ctrlPr>
+                      </m:dPr>
+                      <m:e>
+                        <m:r>
+                          <a:rPr lang="fi-FI" sz="2200" i="1">
+                            <a:solidFill>
+                              <a:schemeClr val="tx1"/>
+                            </a:solidFill>
+                            <a:latin typeface="Cambria Math" panose="02040503050406030204" pitchFamily="18" charset="0"/>
+                          </a:rPr>
+                          <m:t>𝑥</m:t>
+                        </m:r>
+                      </m:e>
+                    </m:d>
+                    <m:r>
+                      <a:rPr lang="fi-FI" sz="2200" i="1">
+                        <a:solidFill>
+                          <a:schemeClr val="tx1"/>
+                        </a:solidFill>
+                        <a:latin typeface="Cambria Math" panose="02040503050406030204" pitchFamily="18" charset="0"/>
+                      </a:rPr>
+                      <m:t>=</m:t>
+                    </m:r>
+                    <m:r>
+                      <a:rPr lang="fi-FI" sz="2200" b="0" i="1" smtClean="0">
+                        <a:solidFill>
+                          <a:schemeClr val="tx1"/>
+                        </a:solidFill>
+                        <a:latin typeface="Cambria Math" panose="02040503050406030204" pitchFamily="18" charset="0"/>
+                      </a:rPr>
+                      <m:t>−</m:t>
+                    </m:r>
+                    <m:r>
+                      <a:rPr lang="fi-FI" sz="2200" i="1">
+                        <a:solidFill>
+                          <a:schemeClr val="tx1"/>
+                        </a:solidFill>
+                        <a:latin typeface="Cambria Math" panose="02040503050406030204" pitchFamily="18" charset="0"/>
+                      </a:rPr>
+                      <m:t>2</m:t>
+                    </m:r>
+                    <m:r>
+                      <a:rPr lang="fi-FI" sz="2200" i="1">
+                        <a:solidFill>
+                          <a:schemeClr val="tx1"/>
+                        </a:solidFill>
+                        <a:latin typeface="Cambria Math" panose="02040503050406030204" pitchFamily="18" charset="0"/>
+                      </a:rPr>
+                      <m:t>𝑥</m:t>
+                    </m:r>
+                    <m:r>
+                      <a:rPr lang="fi-FI" sz="2200" i="1" baseline="30000">
+                        <a:solidFill>
+                          <a:schemeClr val="tx1"/>
+                        </a:solidFill>
+                        <a:latin typeface="Cambria Math" panose="02040503050406030204" pitchFamily="18" charset="0"/>
+                      </a:rPr>
+                      <m:t>2   </m:t>
+                    </m:r>
+                  </m:oMath>
+                </a14:m>
+                <a:r>
+                  <a:rPr lang="fi-FI" sz="2200" dirty="0">
+                    <a:solidFill>
+                      <a:schemeClr val="tx1"/>
+                    </a:solidFill>
+                    <a:latin typeface="Arial" charset="0"/>
+                  </a:rPr>
+                  <a:t>kuvaaja. Miten kuvaaja muuttui verrattuna kohdan a) kuvaajaan?</a:t>
+                </a:r>
+              </a:p>
+            </p:txBody>
+          </p:sp>
+        </mc:Choice>
+        <mc:Fallback xmlns="">
+          <p:sp>
+            <p:nvSpPr>
+              <p:cNvPr id="16" name="Suorakulmio 34"/>
+              <p:cNvSpPr>
+                <a:spLocks noRot="1" noChangeAspect="1" noMove="1" noResize="1" noEditPoints="1" noAdjustHandles="1" noChangeArrowheads="1" noChangeShapeType="1" noTextEdit="1"/>
+              </p:cNvSpPr>
+              <p:nvPr/>
+            </p:nvSpPr>
+            <p:spPr>
+              <a:xfrm>
+                <a:off x="1155412" y="1558298"/>
+                <a:ext cx="7446886" cy="2123658"/>
+              </a:xfrm>
+              <a:prstGeom prst="rect">
+                <a:avLst/>
+              </a:prstGeom>
+              <a:blipFill>
+                <a:blip r:embed="rId6"/>
+                <a:stretch>
+                  <a:fillRect l="-1065" t="-1724" b="-5172"/>
+                </a:stretch>
+              </a:blipFill>
+            </p:spPr>
+            <p:txBody>
+              <a:bodyPr/>
+              <a:lstStyle/>
+              <a:p>
+                <a:r>
+                  <a:rPr lang="fi-FI">
+                    <a:noFill/>
+                  </a:rPr>
+                  <a:t> </a:t>
+                </a:r>
+              </a:p>
+            </p:txBody>
+          </p:sp>
+        </mc:Fallback>
+      </mc:AlternateContent>
+      <p:sp>
+        <p:nvSpPr>
+          <p:cNvPr id="9" name="Rectangle 8"/>
+          <p:cNvSpPr/>
+          <p:nvPr/>
+        </p:nvSpPr>
+        <p:spPr>
+          <a:xfrm>
+            <a:off x="2000381" y="5381177"/>
+            <a:ext cx="4887620" cy="923330"/>
+          </a:xfrm>
+          <a:prstGeom prst="rect">
+            <a:avLst/>
+          </a:prstGeom>
+        </p:spPr>
+        <p:txBody>
+          <a:bodyPr wrap="square">
+            <a:spAutoFit/>
+          </a:bodyPr>
+          <a:lstStyle/>
+          <a:p>
+            <a:r>
+              <a:rPr lang="fi-FI" i="1" dirty="0">
+                <a:solidFill>
+                  <a:schemeClr val="tx1"/>
+                </a:solidFill>
+                <a:latin typeface="Arial" charset="0"/>
+              </a:rPr>
+              <a:t>Vinkki: tehtävässä 6 voit generoida x:n arvot myös range:n avulla esim. (range -5 6 1) tuottaa x: arvot ’(-5 -4 -3 -2 -1 0 1 2 3 4 5) </a:t>
+            </a:r>
+          </a:p>
+        </p:txBody>
+      </p:sp>
+    </p:spTree>
+    <p:extLst>
+      <p:ext uri="{BB962C8B-B14F-4D97-AF65-F5344CB8AC3E}">
+        <p14:creationId xmlns:p14="http://schemas.microsoft.com/office/powerpoint/2010/main" val="1356974640"/>
+      </p:ext>
+    </p:extLst>
+  </p:cSld>
+  <p:clrMapOvr>
+    <a:masterClrMapping/>
+  </p:clrMapOvr>
+</p:sld>
+</file>
+
+<file path=ppt/slides/slide12.xml><?xml version="1.0" encoding="utf-8"?>
+<p:sld xmlns:a="http://schemas.openxmlformats.org/drawingml/2006/main" xmlns:r="http://schemas.openxmlformats.org/officeDocument/2006/relationships" xmlns:p="http://schemas.openxmlformats.org/presentationml/2006/main">
+  <p:cSld>
+    <p:spTree>
+      <p:nvGrpSpPr>
+        <p:cNvPr id="1" name=""/>
+        <p:cNvGrpSpPr/>
+        <p:nvPr/>
+      </p:nvGrpSpPr>
+      <p:grpSpPr>
+        <a:xfrm>
+          <a:off x="0" y="0"/>
+          <a:ext cx="0" cy="0"/>
+          <a:chOff x="0" y="0"/>
+          <a:chExt cx="0" cy="0"/>
+        </a:xfrm>
+      </p:grpSpPr>
+      <p:pic>
+        <p:nvPicPr>
+          <p:cNvPr id="10" name="Picture 8" descr="https://avatars0.githubusercontent.com/u/232371?v=3&amp;s=400"/>
+          <p:cNvPicPr>
+            <a:picLocks noChangeAspect="1" noChangeArrowheads="1"/>
+          </p:cNvPicPr>
+          <p:nvPr/>
+        </p:nvPicPr>
+        <p:blipFill>
+          <a:blip r:embed="rId3" cstate="print">
+            <a:extLst>
+              <a:ext uri="{28A0092B-C50C-407E-A947-70E740481C1C}">
+                <a14:useLocalDpi xmlns:a14="http://schemas.microsoft.com/office/drawing/2010/main" val="0"/>
+              </a:ext>
+            </a:extLst>
+          </a:blip>
+          <a:srcRect/>
+          <a:stretch>
+            <a:fillRect/>
+          </a:stretch>
+        </p:blipFill>
+        <p:spPr bwMode="auto">
+          <a:xfrm>
+            <a:off x="235017" y="5306027"/>
+            <a:ext cx="1254667" cy="1254668"/>
+          </a:xfrm>
+          <a:prstGeom prst="rect">
+            <a:avLst/>
+          </a:prstGeom>
+          <a:noFill/>
+          <a:ln>
+            <a:noFill/>
+          </a:ln>
+          <a:extLst>
+            <a:ext uri="{909E8E84-426E-40DD-AFC4-6F175D3DCCD1}">
+              <a14:hiddenFill xmlns:a14="http://schemas.microsoft.com/office/drawing/2010/main">
+                <a:solidFill>
+                  <a:srgbClr val="FFFFFF"/>
+                </a:solidFill>
+              </a14:hiddenFill>
+            </a:ext>
+            <a:ext uri="{91240B29-F687-4F45-9708-019B960494DF}">
+              <a14:hiddenLine xmlns:a14="http://schemas.microsoft.com/office/drawing/2010/main" w="9525">
+                <a:solidFill>
+                  <a:srgbClr val="000000"/>
+                </a:solidFill>
+                <a:miter lim="800000"/>
+                <a:headEnd/>
+                <a:tailEnd/>
+              </a14:hiddenLine>
+            </a:ext>
+          </a:extLst>
+        </p:spPr>
+      </p:pic>
+      <p:sp>
+        <p:nvSpPr>
+          <p:cNvPr id="13" name="Suorakulmio 12"/>
+          <p:cNvSpPr/>
+          <p:nvPr/>
+        </p:nvSpPr>
+        <p:spPr bwMode="auto">
+          <a:xfrm>
+            <a:off x="5311958" y="240174"/>
+            <a:ext cx="3570371" cy="531170"/>
+          </a:xfrm>
+          <a:prstGeom prst="rect">
+            <a:avLst/>
+          </a:prstGeom>
+          <a:ln>
+            <a:headEnd type="none" w="med" len="med"/>
+            <a:tailEnd type="none" w="med" len="med"/>
+          </a:ln>
+          <a:scene3d>
+            <a:camera prst="orthographicFront"/>
+            <a:lightRig rig="threePt" dir="t"/>
+          </a:scene3d>
+          <a:sp3d>
+            <a:bevelT w="114300" prst="artDeco"/>
+          </a:sp3d>
+        </p:spPr>
+        <p:style>
+          <a:lnRef idx="2">
+            <a:schemeClr val="accent4"/>
+          </a:lnRef>
+          <a:fillRef idx="1">
+            <a:schemeClr val="lt1"/>
+          </a:fillRef>
+          <a:effectRef idx="0">
+            <a:schemeClr val="accent4"/>
+          </a:effectRef>
+          <a:fontRef idx="minor">
+            <a:schemeClr val="dk1"/>
+          </a:fontRef>
+        </p:style>
+        <p:txBody>
+          <a:bodyPr vert="horz" wrap="square" lIns="91440" tIns="45720" rIns="91440" bIns="45720" numCol="1" rtlCol="0" anchor="t" anchorCtr="0" compatLnSpc="1">
+            <a:prstTxWarp prst="textNoShape">
+              <a:avLst/>
+            </a:prstTxWarp>
+          </a:bodyPr>
+          <a:lstStyle/>
+          <a:p>
+            <a:pPr marL="0" marR="0" indent="0" algn="ctr" defTabSz="449263" rtl="0" eaLnBrk="1" fontAlgn="base" latinLnBrk="0" hangingPunct="1">
+              <a:lnSpc>
+                <a:spcPct val="100000"/>
+              </a:lnSpc>
+              <a:spcBef>
+                <a:spcPct val="0"/>
+              </a:spcBef>
+              <a:spcAft>
+                <a:spcPct val="0"/>
+              </a:spcAft>
+              <a:buClr>
+                <a:srgbClr val="000000"/>
+              </a:buClr>
+              <a:buSzPct val="100000"/>
+              <a:buFont typeface="Times New Roman" pitchFamily="16" charset="0"/>
+              <a:buNone/>
+              <a:tabLst/>
+            </a:pPr>
+            <a:r>
+              <a:rPr kumimoji="0" lang="fi-FI" sz="2400" b="0" i="0" u="none" strike="noStrike" cap="none" normalizeH="0" dirty="0">
+                <a:ln>
+                  <a:noFill/>
+                </a:ln>
+                <a:solidFill>
+                  <a:schemeClr val="tx2">
+                    <a:lumMod val="75000"/>
+                    <a:lumOff val="25000"/>
+                  </a:schemeClr>
+                </a:solidFill>
+                <a:effectLst/>
+                <a:latin typeface="Arial" charset="0"/>
+              </a:rPr>
+              <a:t>MÄÄRITTELYIKKUNA</a:t>
+            </a:r>
+            <a:endParaRPr kumimoji="0" lang="fi-FI" sz="1800" b="0" i="0" u="none" strike="noStrike" cap="none" normalizeH="0" dirty="0">
+              <a:ln>
+                <a:noFill/>
+              </a:ln>
+              <a:solidFill>
+                <a:schemeClr val="tx2">
+                  <a:lumMod val="75000"/>
+                  <a:lumOff val="25000"/>
+                </a:schemeClr>
+              </a:solidFill>
+              <a:effectLst/>
+              <a:latin typeface="Arial" charset="0"/>
+            </a:endParaRPr>
+          </a:p>
+          <a:p>
+            <a:pPr marL="0" marR="0" indent="0" algn="l" defTabSz="449263" rtl="0" eaLnBrk="1" fontAlgn="base" latinLnBrk="0" hangingPunct="1">
+              <a:lnSpc>
+                <a:spcPct val="100000"/>
+              </a:lnSpc>
+              <a:spcBef>
+                <a:spcPct val="0"/>
+              </a:spcBef>
+              <a:spcAft>
+                <a:spcPct val="0"/>
+              </a:spcAft>
+              <a:buClr>
+                <a:srgbClr val="000000"/>
+              </a:buClr>
+              <a:buSzPct val="100000"/>
+              <a:buFont typeface="Times New Roman" pitchFamily="16" charset="0"/>
+              <a:buNone/>
+              <a:tabLst/>
+            </a:pPr>
+            <a:endParaRPr kumimoji="0" lang="fi-FI" sz="1800" b="0" i="0" u="none" strike="noStrike" cap="none" normalizeH="0" dirty="0">
+              <a:ln>
+                <a:noFill/>
+              </a:ln>
+              <a:solidFill>
+                <a:schemeClr val="tx2">
+                  <a:lumMod val="75000"/>
+                  <a:lumOff val="25000"/>
+                </a:schemeClr>
+              </a:solidFill>
+              <a:effectLst/>
+              <a:latin typeface="Arial" charset="0"/>
+            </a:endParaRPr>
+          </a:p>
+        </p:txBody>
+      </p:sp>
+      <p:pic>
+        <p:nvPicPr>
+          <p:cNvPr id="42" name="Kuva 41"/>
+          <p:cNvPicPr>
+            <a:picLocks noChangeAspect="1"/>
+          </p:cNvPicPr>
+          <p:nvPr/>
+        </p:nvPicPr>
+        <p:blipFill>
+          <a:blip r:embed="rId4">
+            <a:extLst>
+              <a:ext uri="{28A0092B-C50C-407E-A947-70E740481C1C}">
+                <a14:useLocalDpi xmlns:a14="http://schemas.microsoft.com/office/drawing/2010/main" val="0"/>
+              </a:ext>
+            </a:extLst>
+          </a:blip>
+          <a:stretch>
+            <a:fillRect/>
+          </a:stretch>
+        </p:blipFill>
+        <p:spPr>
+          <a:xfrm>
+            <a:off x="8068724" y="1165451"/>
+            <a:ext cx="1075276" cy="516133"/>
+          </a:xfrm>
+          <a:prstGeom prst="rect">
+            <a:avLst/>
+          </a:prstGeom>
+        </p:spPr>
+      </p:pic>
+      <p:sp>
+        <p:nvSpPr>
+          <p:cNvPr id="3" name="Alatunnisteen paikkamerkki 2"/>
+          <p:cNvSpPr>
+            <a:spLocks noGrp="1"/>
+          </p:cNvSpPr>
+          <p:nvPr>
+            <p:ph type="ftr" sz="quarter" idx="11"/>
+          </p:nvPr>
+        </p:nvSpPr>
+        <p:spPr>
+          <a:xfrm>
+            <a:off x="755576" y="6308361"/>
+            <a:ext cx="4870585" cy="365125"/>
+          </a:xfrm>
+        </p:spPr>
+        <p:txBody>
+          <a:bodyPr/>
+          <a:lstStyle/>
+          <a:p>
+            <a:pPr algn="r">
+              <a:defRPr/>
+            </a:pPr>
+            <a:r>
+              <a:rPr lang="fi-FI" dirty="0"/>
+              <a:t>MAOL Ohjelmointia matematiikkaan</a:t>
+            </a:r>
+            <a:endParaRPr lang="ru-RU" dirty="0"/>
+          </a:p>
+        </p:txBody>
+      </p:sp>
+      <p:sp>
+        <p:nvSpPr>
+          <p:cNvPr id="35" name="Suorakulmio 34"/>
+          <p:cNvSpPr/>
+          <p:nvPr/>
+        </p:nvSpPr>
+        <p:spPr>
+          <a:xfrm>
+            <a:off x="428520" y="765364"/>
+            <a:ext cx="8391952" cy="430887"/>
+          </a:xfrm>
+          <a:prstGeom prst="rect">
+            <a:avLst/>
+          </a:prstGeom>
+        </p:spPr>
+        <p:txBody>
+          <a:bodyPr wrap="square">
+            <a:spAutoFit/>
+          </a:bodyPr>
+          <a:lstStyle/>
+          <a:p>
+            <a:r>
+              <a:rPr lang="fi-FI" sz="2200" dirty="0">
+                <a:solidFill>
+                  <a:schemeClr val="tx1"/>
+                </a:solidFill>
+                <a:latin typeface="Arial" charset="0"/>
+              </a:rPr>
+              <a:t>Pallon heitto                                          </a:t>
+            </a:r>
+            <a:r>
+              <a:rPr lang="fi-FI" sz="1600" i="1" dirty="0">
+                <a:solidFill>
+                  <a:schemeClr val="tx1"/>
+                </a:solidFill>
+                <a:latin typeface="Arial" charset="0"/>
+              </a:rPr>
+              <a:t>(vinkki: plot, points, function, +, -, *, /)</a:t>
+            </a:r>
+            <a:endParaRPr lang="fi-FI" sz="1600" i="1" dirty="0">
+              <a:solidFill>
+                <a:schemeClr val="tx1"/>
+              </a:solidFill>
+            </a:endParaRPr>
+          </a:p>
+        </p:txBody>
+      </p:sp>
+      <p:pic>
+        <p:nvPicPr>
+          <p:cNvPr id="61" name="Picture 2" descr="WeScheme Logo"/>
+          <p:cNvPicPr>
+            <a:picLocks noChangeAspect="1" noChangeArrowheads="1"/>
+          </p:cNvPicPr>
+          <p:nvPr/>
+        </p:nvPicPr>
+        <p:blipFill>
+          <a:blip r:embed="rId5" cstate="print">
+            <a:extLst>
+              <a:ext uri="{28A0092B-C50C-407E-A947-70E740481C1C}">
+                <a14:useLocalDpi xmlns:a14="http://schemas.microsoft.com/office/drawing/2010/main" val="0"/>
+              </a:ext>
+            </a:extLst>
+          </a:blip>
+          <a:srcRect/>
+          <a:stretch>
+            <a:fillRect/>
+          </a:stretch>
+        </p:blipFill>
+        <p:spPr bwMode="auto">
+          <a:xfrm>
+            <a:off x="7386527" y="5180161"/>
+            <a:ext cx="1495802" cy="1383832"/>
+          </a:xfrm>
+          <a:prstGeom prst="rect">
+            <a:avLst/>
+          </a:prstGeom>
+          <a:noFill/>
+          <a:ln>
+            <a:noFill/>
+          </a:ln>
+          <a:effectLst>
+            <a:outerShdw blurRad="50800" dist="38100" dir="5400000" algn="t" rotWithShape="0">
+              <a:prstClr val="black">
+                <a:alpha val="40000"/>
+              </a:prstClr>
+            </a:outerShdw>
+          </a:effectLst>
+          <a:extLst>
+            <a:ext uri="{909E8E84-426E-40DD-AFC4-6F175D3DCCD1}">
+              <a14:hiddenFill xmlns:a14="http://schemas.microsoft.com/office/drawing/2010/main">
+                <a:solidFill>
+                  <a:srgbClr val="FFFFFF"/>
+                </a:solidFill>
+              </a14:hiddenFill>
+            </a:ext>
+            <a:ext uri="{91240B29-F687-4F45-9708-019B960494DF}">
+              <a14:hiddenLine xmlns:a14="http://schemas.microsoft.com/office/drawing/2010/main" w="9525">
+                <a:solidFill>
+                  <a:srgbClr val="000000"/>
+                </a:solidFill>
+                <a:miter lim="800000"/>
+                <a:headEnd/>
+                <a:tailEnd/>
+              </a14:hiddenLine>
+            </a:ext>
+          </a:extLst>
+        </p:spPr>
+      </p:pic>
+      <mc:AlternateContent xmlns:mc="http://schemas.openxmlformats.org/markup-compatibility/2006">
+        <mc:Choice xmlns:a14="http://schemas.microsoft.com/office/drawing/2010/main" Requires="a14">
+          <p:sp>
+            <p:nvSpPr>
+              <p:cNvPr id="16" name="Suorakulmio 34"/>
+              <p:cNvSpPr/>
+              <p:nvPr/>
+            </p:nvSpPr>
+            <p:spPr>
+              <a:xfrm>
+                <a:off x="1155412" y="1558298"/>
+                <a:ext cx="7446886" cy="4470968"/>
+              </a:xfrm>
+              <a:prstGeom prst="rect">
+                <a:avLst/>
+              </a:prstGeom>
+            </p:spPr>
+            <p:txBody>
+              <a:bodyPr wrap="square">
+                <a:spAutoFit/>
+              </a:bodyPr>
+              <a:lstStyle/>
+              <a:p>
+                <a:r>
+                  <a:rPr lang="fi-FI" sz="2200" dirty="0">
+                    <a:solidFill>
+                      <a:schemeClr val="tx1"/>
+                    </a:solidFill>
+                    <a:latin typeface="Arial" charset="0"/>
+                  </a:rPr>
+                  <a:t>Funktioiden avulla voidaan selvittää miten pallo liikkuu, kun sitä heitetään.</a:t>
+                </a:r>
+              </a:p>
+              <a:p>
+                <a:r>
+                  <a:rPr lang="fi-FI" sz="2200" dirty="0">
+                    <a:solidFill>
+                      <a:schemeClr val="tx1"/>
+                    </a:solidFill>
+                    <a:latin typeface="Arial" charset="0"/>
+                  </a:rPr>
+                  <a:t>Jos pallo heitetään suoraan ylöspäin, pallon korkeuteen (</a:t>
+                </a:r>
+                <a14:m>
+                  <m:oMath xmlns:m="http://schemas.openxmlformats.org/officeDocument/2006/math">
+                    <m:r>
+                      <a:rPr lang="fi-FI" sz="2200" i="1">
+                        <a:solidFill>
+                          <a:schemeClr val="tx1"/>
+                        </a:solidFill>
+                        <a:latin typeface="Cambria Math" panose="02040503050406030204" pitchFamily="18" charset="0"/>
+                      </a:rPr>
+                      <m:t>h</m:t>
+                    </m:r>
+                  </m:oMath>
+                </a14:m>
+                <a:r>
+                  <a:rPr lang="fi-FI" sz="2200" dirty="0">
+                    <a:solidFill>
+                      <a:schemeClr val="tx1"/>
+                    </a:solidFill>
+                    <a:latin typeface="Arial" charset="0"/>
+                  </a:rPr>
+                  <a:t>) vaikuttaa sen lähtönopeus (</a:t>
+                </a:r>
+                <a14:m>
+                  <m:oMath xmlns:m="http://schemas.openxmlformats.org/officeDocument/2006/math">
+                    <m:sSub>
+                      <m:sSubPr>
+                        <m:ctrlPr>
+                          <a:rPr lang="fi-FI" sz="2200" i="1">
+                            <a:solidFill>
+                              <a:schemeClr val="tx1"/>
+                            </a:solidFill>
+                            <a:latin typeface="Cambria Math" panose="02040503050406030204" pitchFamily="18" charset="0"/>
+                          </a:rPr>
+                        </m:ctrlPr>
+                      </m:sSubPr>
+                      <m:e>
+                        <m:r>
+                          <a:rPr lang="fi-FI" sz="2200" i="1">
+                            <a:solidFill>
+                              <a:schemeClr val="tx1"/>
+                            </a:solidFill>
+                            <a:latin typeface="Cambria Math" panose="02040503050406030204" pitchFamily="18" charset="0"/>
+                          </a:rPr>
+                          <m:t>𝑣</m:t>
+                        </m:r>
+                      </m:e>
+                      <m:sub>
+                        <m:r>
+                          <a:rPr lang="fi-FI" sz="2200" i="1">
+                            <a:solidFill>
+                              <a:schemeClr val="tx1"/>
+                            </a:solidFill>
+                            <a:latin typeface="Cambria Math" panose="02040503050406030204" pitchFamily="18" charset="0"/>
+                          </a:rPr>
+                          <m:t>0</m:t>
+                        </m:r>
+                      </m:sub>
+                    </m:sSub>
+                  </m:oMath>
+                </a14:m>
+                <a:r>
+                  <a:rPr lang="fi-FI" sz="2200" dirty="0">
+                    <a:solidFill>
+                      <a:schemeClr val="tx1"/>
+                    </a:solidFill>
+                    <a:latin typeface="Arial" charset="0"/>
+                  </a:rPr>
+                  <a:t>), aika (</a:t>
+                </a:r>
+                <a14:m>
+                  <m:oMath xmlns:m="http://schemas.openxmlformats.org/officeDocument/2006/math">
+                    <m:r>
+                      <a:rPr lang="fi-FI" sz="2200" i="1">
+                        <a:solidFill>
+                          <a:schemeClr val="tx1"/>
+                        </a:solidFill>
+                        <a:latin typeface="Cambria Math" panose="02040503050406030204" pitchFamily="18" charset="0"/>
+                      </a:rPr>
+                      <m:t>𝑡</m:t>
+                    </m:r>
+                  </m:oMath>
+                </a14:m>
+                <a:r>
+                  <a:rPr lang="fi-FI" sz="2200" dirty="0">
+                    <a:solidFill>
+                      <a:schemeClr val="tx1"/>
+                    </a:solidFill>
+                    <a:latin typeface="Arial" charset="0"/>
+                  </a:rPr>
+                  <a:t>) ja maan putoamiskiihtyvyys (</a:t>
+                </a:r>
+                <a14:m>
+                  <m:oMath xmlns:m="http://schemas.openxmlformats.org/officeDocument/2006/math">
+                    <m:r>
+                      <a:rPr lang="fi-FI" sz="2200" b="0" i="1" smtClean="0">
+                        <a:solidFill>
+                          <a:schemeClr val="tx1"/>
+                        </a:solidFill>
+                        <a:latin typeface="Cambria Math" panose="02040503050406030204" pitchFamily="18" charset="0"/>
+                      </a:rPr>
+                      <m:t>𝑔</m:t>
+                    </m:r>
+                    <m:r>
+                      <a:rPr lang="fi-FI" sz="2200" b="0" i="1" smtClean="0">
+                        <a:solidFill>
+                          <a:schemeClr val="tx1"/>
+                        </a:solidFill>
+                        <a:latin typeface="Cambria Math" panose="02040503050406030204" pitchFamily="18" charset="0"/>
+                      </a:rPr>
+                      <m:t>=9.81 </m:t>
+                    </m:r>
+                    <m:r>
+                      <a:rPr lang="fi-FI" sz="2200" b="0" i="1" smtClean="0">
+                        <a:solidFill>
+                          <a:schemeClr val="tx1"/>
+                        </a:solidFill>
+                        <a:latin typeface="Cambria Math" panose="02040503050406030204" pitchFamily="18" charset="0"/>
+                      </a:rPr>
+                      <m:t>𝑚</m:t>
+                    </m:r>
+                    <m:r>
+                      <a:rPr lang="fi-FI" sz="2200" b="0" i="1" smtClean="0">
+                        <a:solidFill>
+                          <a:schemeClr val="tx1"/>
+                        </a:solidFill>
+                        <a:latin typeface="Cambria Math" panose="02040503050406030204" pitchFamily="18" charset="0"/>
+                      </a:rPr>
+                      <m:t>/</m:t>
+                    </m:r>
+                    <m:sSup>
+                      <m:sSupPr>
+                        <m:ctrlPr>
+                          <a:rPr lang="fi-FI" sz="2200" b="0" i="1" smtClean="0">
+                            <a:solidFill>
+                              <a:schemeClr val="tx1"/>
+                            </a:solidFill>
+                            <a:latin typeface="Cambria Math" panose="02040503050406030204" pitchFamily="18" charset="0"/>
+                          </a:rPr>
+                        </m:ctrlPr>
+                      </m:sSupPr>
+                      <m:e>
+                        <m:r>
+                          <a:rPr lang="fi-FI" sz="2200" b="0" i="1" smtClean="0">
+                            <a:solidFill>
+                              <a:schemeClr val="tx1"/>
+                            </a:solidFill>
+                            <a:latin typeface="Cambria Math" panose="02040503050406030204" pitchFamily="18" charset="0"/>
+                          </a:rPr>
+                          <m:t>𝑠</m:t>
+                        </m:r>
+                      </m:e>
+                      <m:sup>
+                        <m:r>
+                          <a:rPr lang="fi-FI" sz="2200" b="0" i="1" smtClean="0">
+                            <a:solidFill>
+                              <a:schemeClr val="tx1"/>
+                            </a:solidFill>
+                            <a:latin typeface="Cambria Math" panose="02040503050406030204" pitchFamily="18" charset="0"/>
+                          </a:rPr>
+                          <m:t>2</m:t>
+                        </m:r>
+                      </m:sup>
+                    </m:sSup>
+                  </m:oMath>
+                </a14:m>
+                <a:r>
+                  <a:rPr lang="fi-FI" sz="2200" dirty="0">
+                    <a:solidFill>
+                      <a:schemeClr val="tx1"/>
+                    </a:solidFill>
+                    <a:latin typeface="Arial" charset="0"/>
+                  </a:rPr>
+                  <a:t>).</a:t>
+                </a:r>
+              </a:p>
+              <a:p>
+                <a:endParaRPr lang="fi-FI" sz="800" dirty="0">
+                  <a:solidFill>
+                    <a:schemeClr val="tx1"/>
+                  </a:solidFill>
+                  <a:latin typeface="Arial" charset="0"/>
+                </a:endParaRPr>
+              </a:p>
+              <a:p>
+                <a:r>
+                  <a:rPr lang="fi-FI" sz="2200" dirty="0">
+                    <a:solidFill>
+                      <a:schemeClr val="tx1"/>
+                    </a:solidFill>
+                    <a:latin typeface="Arial" charset="0"/>
+                  </a:rPr>
+                  <a:t>Funktio pallon korkeudelle ajan (</a:t>
+                </a:r>
+                <a14:m>
+                  <m:oMath xmlns:m="http://schemas.openxmlformats.org/officeDocument/2006/math">
+                    <m:r>
+                      <a:rPr lang="fi-FI" sz="2200" i="1">
+                        <a:solidFill>
+                          <a:schemeClr val="tx1"/>
+                        </a:solidFill>
+                        <a:latin typeface="Cambria Math" panose="02040503050406030204" pitchFamily="18" charset="0"/>
+                      </a:rPr>
+                      <m:t>𝑡</m:t>
+                    </m:r>
+                  </m:oMath>
+                </a14:m>
+                <a:r>
+                  <a:rPr lang="fi-FI" sz="2200" dirty="0">
+                    <a:solidFill>
+                      <a:schemeClr val="tx1"/>
+                    </a:solidFill>
+                    <a:latin typeface="Arial" charset="0"/>
+                  </a:rPr>
+                  <a:t>) suhteen on siis:</a:t>
+                </a:r>
+              </a:p>
+              <a:p>
+                <a:r>
+                  <a:rPr lang="fi-FI" sz="2200" dirty="0">
+                    <a:solidFill>
+                      <a:schemeClr val="tx1"/>
+                    </a:solidFill>
+                    <a:latin typeface="Arial" charset="0"/>
+                  </a:rPr>
+                  <a:t>                          </a:t>
+                </a:r>
+                <a14:m>
+                  <m:oMath xmlns:m="http://schemas.openxmlformats.org/officeDocument/2006/math">
+                    <m:r>
+                      <a:rPr lang="fi-FI" sz="2200" b="0" i="1" smtClean="0">
+                        <a:solidFill>
+                          <a:schemeClr val="tx1"/>
+                        </a:solidFill>
+                        <a:latin typeface="Cambria Math" panose="02040503050406030204" pitchFamily="18" charset="0"/>
+                      </a:rPr>
+                      <m:t>h</m:t>
+                    </m:r>
+                    <m:d>
+                      <m:dPr>
+                        <m:ctrlPr>
+                          <a:rPr lang="fi-FI" sz="2200" b="0" i="1" smtClean="0">
+                            <a:solidFill>
+                              <a:schemeClr val="tx1"/>
+                            </a:solidFill>
+                            <a:latin typeface="Cambria Math" panose="02040503050406030204" pitchFamily="18" charset="0"/>
+                          </a:rPr>
+                        </m:ctrlPr>
+                      </m:dPr>
+                      <m:e>
+                        <m:r>
+                          <a:rPr lang="fi-FI" sz="2200" b="0" i="1" smtClean="0">
+                            <a:solidFill>
+                              <a:schemeClr val="tx1"/>
+                            </a:solidFill>
+                            <a:latin typeface="Cambria Math" panose="02040503050406030204" pitchFamily="18" charset="0"/>
+                          </a:rPr>
+                          <m:t>𝑡</m:t>
+                        </m:r>
+                      </m:e>
+                    </m:d>
+                    <m:r>
+                      <a:rPr lang="fi-FI" sz="2200" b="0" i="1" smtClean="0">
+                        <a:solidFill>
+                          <a:schemeClr val="tx1"/>
+                        </a:solidFill>
+                        <a:latin typeface="Cambria Math" panose="02040503050406030204" pitchFamily="18" charset="0"/>
+                      </a:rPr>
+                      <m:t>=</m:t>
+                    </m:r>
+                    <m:sSub>
+                      <m:sSubPr>
+                        <m:ctrlPr>
+                          <a:rPr lang="fi-FI" sz="2200" b="0" i="1" smtClean="0">
+                            <a:solidFill>
+                              <a:schemeClr val="tx1"/>
+                            </a:solidFill>
+                            <a:latin typeface="Cambria Math" panose="02040503050406030204" pitchFamily="18" charset="0"/>
+                          </a:rPr>
+                        </m:ctrlPr>
+                      </m:sSubPr>
+                      <m:e>
+                        <m:r>
+                          <a:rPr lang="fi-FI" sz="2200" b="0" i="1" smtClean="0">
+                            <a:solidFill>
+                              <a:schemeClr val="tx1"/>
+                            </a:solidFill>
+                            <a:latin typeface="Cambria Math" panose="02040503050406030204" pitchFamily="18" charset="0"/>
+                          </a:rPr>
+                          <m:t>𝑣</m:t>
+                        </m:r>
+                      </m:e>
+                      <m:sub>
+                        <m:r>
+                          <a:rPr lang="fi-FI" sz="2200" b="0" i="1" smtClean="0">
+                            <a:solidFill>
+                              <a:schemeClr val="tx1"/>
+                            </a:solidFill>
+                            <a:latin typeface="Cambria Math" panose="02040503050406030204" pitchFamily="18" charset="0"/>
+                          </a:rPr>
+                          <m:t>0</m:t>
+                        </m:r>
+                      </m:sub>
+                    </m:sSub>
+                    <m:r>
+                      <a:rPr lang="fi-FI" sz="2200" b="0" i="1" smtClean="0">
+                        <a:solidFill>
+                          <a:schemeClr val="tx1"/>
+                        </a:solidFill>
+                        <a:latin typeface="Cambria Math" panose="02040503050406030204" pitchFamily="18" charset="0"/>
+                      </a:rPr>
+                      <m:t>𝑡</m:t>
+                    </m:r>
+                    <m:r>
+                      <a:rPr lang="fi-FI" sz="2200" b="0" i="1" smtClean="0">
+                        <a:solidFill>
+                          <a:schemeClr val="tx1"/>
+                        </a:solidFill>
+                        <a:latin typeface="Cambria Math" panose="02040503050406030204" pitchFamily="18" charset="0"/>
+                        <a:ea typeface="Cambria Math" panose="02040503050406030204" pitchFamily="18" charset="0"/>
+                      </a:rPr>
+                      <m:t>−</m:t>
+                    </m:r>
+                    <m:f>
+                      <m:fPr>
+                        <m:ctrlPr>
+                          <a:rPr lang="fi-FI" sz="2200" b="0" i="1" smtClean="0">
+                            <a:solidFill>
+                              <a:schemeClr val="tx1"/>
+                            </a:solidFill>
+                            <a:latin typeface="Cambria Math" panose="02040503050406030204" pitchFamily="18" charset="0"/>
+                            <a:ea typeface="Cambria Math" panose="02040503050406030204" pitchFamily="18" charset="0"/>
+                          </a:rPr>
+                        </m:ctrlPr>
+                      </m:fPr>
+                      <m:num>
+                        <m:r>
+                          <a:rPr lang="fi-FI" sz="2200" b="0" i="1" smtClean="0">
+                            <a:solidFill>
+                              <a:schemeClr val="tx1"/>
+                            </a:solidFill>
+                            <a:latin typeface="Cambria Math" panose="02040503050406030204" pitchFamily="18" charset="0"/>
+                            <a:ea typeface="Cambria Math" panose="02040503050406030204" pitchFamily="18" charset="0"/>
+                          </a:rPr>
+                          <m:t>1</m:t>
+                        </m:r>
+                      </m:num>
+                      <m:den>
+                        <m:r>
+                          <a:rPr lang="fi-FI" sz="2200" b="0" i="1" smtClean="0">
+                            <a:solidFill>
+                              <a:schemeClr val="tx1"/>
+                            </a:solidFill>
+                            <a:latin typeface="Cambria Math" panose="02040503050406030204" pitchFamily="18" charset="0"/>
+                            <a:ea typeface="Cambria Math" panose="02040503050406030204" pitchFamily="18" charset="0"/>
+                          </a:rPr>
+                          <m:t>2</m:t>
+                        </m:r>
+                      </m:den>
+                    </m:f>
+                    <m:r>
+                      <a:rPr lang="fi-FI" sz="2200" b="0" i="1" smtClean="0">
+                        <a:solidFill>
+                          <a:schemeClr val="tx1"/>
+                        </a:solidFill>
+                        <a:latin typeface="Cambria Math" panose="02040503050406030204" pitchFamily="18" charset="0"/>
+                        <a:ea typeface="Cambria Math" panose="02040503050406030204" pitchFamily="18" charset="0"/>
+                      </a:rPr>
+                      <m:t>𝑔</m:t>
+                    </m:r>
+                    <m:sSup>
+                      <m:sSupPr>
+                        <m:ctrlPr>
+                          <a:rPr lang="fi-FI" sz="2200" b="0" i="1" smtClean="0">
+                            <a:solidFill>
+                              <a:schemeClr val="tx1"/>
+                            </a:solidFill>
+                            <a:latin typeface="Cambria Math" panose="02040503050406030204" pitchFamily="18" charset="0"/>
+                            <a:ea typeface="Cambria Math" panose="02040503050406030204" pitchFamily="18" charset="0"/>
+                          </a:rPr>
+                        </m:ctrlPr>
+                      </m:sSupPr>
+                      <m:e>
+                        <m:r>
+                          <a:rPr lang="fi-FI" sz="2200" b="0" i="1" smtClean="0">
+                            <a:solidFill>
+                              <a:schemeClr val="tx1"/>
+                            </a:solidFill>
+                            <a:latin typeface="Cambria Math" panose="02040503050406030204" pitchFamily="18" charset="0"/>
+                            <a:ea typeface="Cambria Math" panose="02040503050406030204" pitchFamily="18" charset="0"/>
+                          </a:rPr>
+                          <m:t>𝑡</m:t>
+                        </m:r>
+                      </m:e>
+                      <m:sup>
+                        <m:r>
+                          <a:rPr lang="fi-FI" sz="2200" b="0" i="1" smtClean="0">
+                            <a:solidFill>
+                              <a:schemeClr val="tx1"/>
+                            </a:solidFill>
+                            <a:latin typeface="Cambria Math" panose="02040503050406030204" pitchFamily="18" charset="0"/>
+                            <a:ea typeface="Cambria Math" panose="02040503050406030204" pitchFamily="18" charset="0"/>
+                          </a:rPr>
+                          <m:t>2</m:t>
+                        </m:r>
+                      </m:sup>
+                    </m:sSup>
+                  </m:oMath>
+                </a14:m>
+                <a:endParaRPr lang="fi-FI" sz="2200" dirty="0">
+                  <a:solidFill>
+                    <a:schemeClr val="tx1"/>
+                  </a:solidFill>
+                  <a:latin typeface="Arial" charset="0"/>
+                </a:endParaRPr>
+              </a:p>
+              <a:p>
+                <a:r>
+                  <a:rPr lang="fi-FI" sz="2200" dirty="0">
+                    <a:solidFill>
+                      <a:schemeClr val="tx1"/>
+                    </a:solidFill>
+                    <a:latin typeface="Arial" charset="0"/>
+                  </a:rPr>
+                  <a:t>Jos pallon heittosuunta on vinoon, nopeudesta täytyy selvittää ylöspäin vaikuttava nopeuden osuus </a:t>
+                </a:r>
+                <a14:m>
+                  <m:oMath xmlns:m="http://schemas.openxmlformats.org/officeDocument/2006/math">
+                    <m:sSub>
+                      <m:sSubPr>
+                        <m:ctrlPr>
+                          <a:rPr lang="fi-FI" sz="2200" i="1">
+                            <a:solidFill>
+                              <a:schemeClr val="tx1"/>
+                            </a:solidFill>
+                            <a:latin typeface="Cambria Math" panose="02040503050406030204" pitchFamily="18" charset="0"/>
+                          </a:rPr>
+                        </m:ctrlPr>
+                      </m:sSubPr>
+                      <m:e>
+                        <m:r>
+                          <a:rPr lang="fi-FI" sz="2200" i="1">
+                            <a:solidFill>
+                              <a:schemeClr val="tx1"/>
+                            </a:solidFill>
+                            <a:latin typeface="Cambria Math" panose="02040503050406030204" pitchFamily="18" charset="0"/>
+                          </a:rPr>
+                          <m:t>𝑣</m:t>
+                        </m:r>
+                      </m:e>
+                      <m:sub>
+                        <m:r>
+                          <a:rPr lang="fi-FI" sz="2200" i="1">
+                            <a:solidFill>
+                              <a:schemeClr val="tx1"/>
+                            </a:solidFill>
+                            <a:latin typeface="Cambria Math" panose="02040503050406030204" pitchFamily="18" charset="0"/>
+                          </a:rPr>
+                          <m:t>0</m:t>
+                        </m:r>
+                        <m:r>
+                          <a:rPr lang="fi-FI" sz="2200" i="1">
+                            <a:solidFill>
+                              <a:schemeClr val="tx1"/>
+                            </a:solidFill>
+                            <a:latin typeface="Cambria Math" panose="02040503050406030204" pitchFamily="18" charset="0"/>
+                          </a:rPr>
+                          <m:t>𝑦</m:t>
+                        </m:r>
+                      </m:sub>
+                    </m:sSub>
+                  </m:oMath>
+                </a14:m>
+                <a:r>
+                  <a:rPr lang="fi-FI" sz="2200" dirty="0">
+                    <a:solidFill>
+                      <a:schemeClr val="tx1"/>
+                    </a:solidFill>
+                    <a:latin typeface="Arial" charset="0"/>
+                  </a:rPr>
+                  <a:t>. Se saadaan trigonometrian avulla (</a:t>
+                </a:r>
+                <a14:m>
+                  <m:oMath xmlns:m="http://schemas.openxmlformats.org/officeDocument/2006/math">
+                    <m:r>
+                      <m:rPr>
+                        <m:sty m:val="p"/>
+                      </m:rPr>
+                      <a:rPr lang="el-GR" sz="2200" i="1">
+                        <a:solidFill>
+                          <a:schemeClr val="tx1"/>
+                        </a:solidFill>
+                        <a:latin typeface="Cambria Math" panose="02040503050406030204" pitchFamily="18" charset="0"/>
+                      </a:rPr>
+                      <m:t>α</m:t>
+                    </m:r>
+                    <m:r>
+                      <a:rPr lang="el-GR" sz="2200" i="1">
+                        <a:solidFill>
+                          <a:schemeClr val="tx1"/>
+                        </a:solidFill>
+                        <a:latin typeface="Cambria Math" panose="02040503050406030204" pitchFamily="18" charset="0"/>
+                      </a:rPr>
+                      <m:t> </m:t>
+                    </m:r>
+                  </m:oMath>
+                </a14:m>
+                <a:r>
+                  <a:rPr lang="fi-FI" sz="2200" dirty="0">
+                    <a:solidFill>
+                      <a:schemeClr val="tx1"/>
+                    </a:solidFill>
+                    <a:latin typeface="Arial" charset="0"/>
+                  </a:rPr>
+                  <a:t>on heittokulma): </a:t>
+                </a:r>
+              </a:p>
+              <a:p>
+                <a:pPr/>
+                <a:r>
+                  <a:rPr lang="fi-FI" sz="2200" b="0" dirty="0">
+                    <a:solidFill>
+                      <a:schemeClr val="tx1"/>
+                    </a:solidFill>
+                  </a:rPr>
+                  <a:t>                          </a:t>
+                </a:r>
+                <a14:m>
+                  <m:oMath xmlns:m="http://schemas.openxmlformats.org/officeDocument/2006/math">
+                    <m:sSub>
+                      <m:sSubPr>
+                        <m:ctrlPr>
+                          <a:rPr lang="fi-FI" sz="2200" b="0" i="1" smtClean="0">
+                            <a:solidFill>
+                              <a:srgbClr val="FF0000"/>
+                            </a:solidFill>
+                            <a:latin typeface="Cambria Math" panose="02040503050406030204" pitchFamily="18" charset="0"/>
+                          </a:rPr>
+                        </m:ctrlPr>
+                      </m:sSubPr>
+                      <m:e>
+                        <m:r>
+                          <a:rPr lang="fi-FI" sz="2200" b="0" i="1" smtClean="0">
+                            <a:solidFill>
+                              <a:srgbClr val="FF0000"/>
+                            </a:solidFill>
+                            <a:latin typeface="Cambria Math" panose="02040503050406030204" pitchFamily="18" charset="0"/>
+                          </a:rPr>
+                          <m:t>𝑣</m:t>
+                        </m:r>
+                      </m:e>
+                      <m:sub>
+                        <m:r>
+                          <a:rPr lang="fi-FI" sz="2200" b="0" i="1" smtClean="0">
+                            <a:solidFill>
+                              <a:srgbClr val="FF0000"/>
+                            </a:solidFill>
+                            <a:latin typeface="Cambria Math" panose="02040503050406030204" pitchFamily="18" charset="0"/>
+                          </a:rPr>
+                          <m:t>0</m:t>
+                        </m:r>
+                        <m:r>
+                          <a:rPr lang="fi-FI" sz="2200" b="0" i="1" smtClean="0">
+                            <a:solidFill>
+                              <a:srgbClr val="FF0000"/>
+                            </a:solidFill>
+                            <a:latin typeface="Cambria Math" panose="02040503050406030204" pitchFamily="18" charset="0"/>
+                          </a:rPr>
+                          <m:t>𝑦</m:t>
+                        </m:r>
+                      </m:sub>
+                    </m:sSub>
+                    <m:r>
+                      <a:rPr lang="fi-FI" sz="2200" i="1" smtClean="0">
+                        <a:solidFill>
+                          <a:srgbClr val="FF0000"/>
+                        </a:solidFill>
+                        <a:latin typeface="Cambria Math" panose="02040503050406030204" pitchFamily="18" charset="0"/>
+                      </a:rPr>
+                      <m:t>=</m:t>
+                    </m:r>
+                    <m:sSub>
+                      <m:sSubPr>
+                        <m:ctrlPr>
+                          <a:rPr lang="fi-FI" sz="2200" i="1">
+                            <a:solidFill>
+                              <a:srgbClr val="FF0000"/>
+                            </a:solidFill>
+                            <a:latin typeface="Cambria Math" panose="02040503050406030204" pitchFamily="18" charset="0"/>
+                          </a:rPr>
+                        </m:ctrlPr>
+                      </m:sSubPr>
+                      <m:e>
+                        <m:r>
+                          <a:rPr lang="fi-FI" sz="2200" i="1">
+                            <a:solidFill>
+                              <a:srgbClr val="FF0000"/>
+                            </a:solidFill>
+                            <a:latin typeface="Cambria Math" panose="02040503050406030204" pitchFamily="18" charset="0"/>
+                          </a:rPr>
+                          <m:t>𝑣</m:t>
+                        </m:r>
+                      </m:e>
+                      <m:sub>
+                        <m:r>
+                          <a:rPr lang="fi-FI" sz="2200" i="1">
+                            <a:solidFill>
+                              <a:srgbClr val="FF0000"/>
+                            </a:solidFill>
+                            <a:latin typeface="Cambria Math" panose="02040503050406030204" pitchFamily="18" charset="0"/>
+                          </a:rPr>
+                          <m:t>0</m:t>
+                        </m:r>
+                      </m:sub>
+                    </m:sSub>
+                    <m:r>
+                      <a:rPr lang="fi-FI" sz="2200" b="0" i="1" smtClean="0">
+                        <a:solidFill>
+                          <a:srgbClr val="FF0000"/>
+                        </a:solidFill>
+                        <a:latin typeface="Cambria Math" panose="02040503050406030204" pitchFamily="18" charset="0"/>
+                      </a:rPr>
+                      <m:t>𝑠𝑖𝑛</m:t>
+                    </m:r>
+                    <m:r>
+                      <m:rPr>
+                        <m:sty m:val="p"/>
+                      </m:rPr>
+                      <a:rPr lang="el-GR" sz="2200" b="0" i="1" smtClean="0">
+                        <a:solidFill>
+                          <a:srgbClr val="FF0000"/>
+                        </a:solidFill>
+                        <a:latin typeface="Cambria Math" panose="02040503050406030204" pitchFamily="18" charset="0"/>
+                      </a:rPr>
+                      <m:t>α</m:t>
+                    </m:r>
+                  </m:oMath>
+                </a14:m>
+                <a:endParaRPr lang="fi-FI" sz="2200" dirty="0">
+                  <a:solidFill>
+                    <a:srgbClr val="FF0000"/>
+                  </a:solidFill>
+                  <a:latin typeface="Arial" charset="0"/>
+                </a:endParaRPr>
+              </a:p>
+              <a:p>
+                <a:pPr/>
+                <a:r>
+                  <a:rPr lang="fi-FI" sz="2200" dirty="0">
+                    <a:solidFill>
+                      <a:schemeClr val="tx1"/>
+                    </a:solidFill>
+                  </a:rPr>
+                  <a:t>                          </a:t>
+                </a:r>
+                <a14:m>
+                  <m:oMath xmlns:m="http://schemas.openxmlformats.org/officeDocument/2006/math">
+                    <m:sSub>
+                      <m:sSubPr>
+                        <m:ctrlPr>
+                          <a:rPr lang="fi-FI" sz="2200" i="1" smtClean="0">
+                            <a:solidFill>
+                              <a:srgbClr val="00B050"/>
+                            </a:solidFill>
+                            <a:latin typeface="Cambria Math" panose="02040503050406030204" pitchFamily="18" charset="0"/>
+                          </a:rPr>
+                        </m:ctrlPr>
+                      </m:sSubPr>
+                      <m:e>
+                        <m:r>
+                          <a:rPr lang="fi-FI" sz="2200" i="1">
+                            <a:solidFill>
+                              <a:srgbClr val="00B050"/>
+                            </a:solidFill>
+                            <a:latin typeface="Cambria Math" panose="02040503050406030204" pitchFamily="18" charset="0"/>
+                          </a:rPr>
+                          <m:t>𝑣</m:t>
+                        </m:r>
+                      </m:e>
+                      <m:sub>
+                        <m:r>
+                          <a:rPr lang="fi-FI" sz="2200" i="1">
+                            <a:solidFill>
+                              <a:srgbClr val="00B050"/>
+                            </a:solidFill>
+                            <a:latin typeface="Cambria Math" panose="02040503050406030204" pitchFamily="18" charset="0"/>
+                          </a:rPr>
+                          <m:t>0</m:t>
+                        </m:r>
+                        <m:r>
+                          <a:rPr lang="fi-FI" sz="2200" b="0" i="1" smtClean="0">
+                            <a:solidFill>
+                              <a:srgbClr val="00B050"/>
+                            </a:solidFill>
+                            <a:latin typeface="Cambria Math" panose="02040503050406030204" pitchFamily="18" charset="0"/>
+                          </a:rPr>
+                          <m:t>𝑥</m:t>
+                        </m:r>
+                      </m:sub>
+                    </m:sSub>
+                    <m:r>
+                      <a:rPr lang="fi-FI" sz="2200" i="1">
+                        <a:solidFill>
+                          <a:srgbClr val="00B050"/>
+                        </a:solidFill>
+                        <a:latin typeface="Cambria Math" panose="02040503050406030204" pitchFamily="18" charset="0"/>
+                      </a:rPr>
+                      <m:t>=</m:t>
+                    </m:r>
+                    <m:sSub>
+                      <m:sSubPr>
+                        <m:ctrlPr>
+                          <a:rPr lang="fi-FI" sz="2200" i="1">
+                            <a:solidFill>
+                              <a:srgbClr val="00B050"/>
+                            </a:solidFill>
+                            <a:latin typeface="Cambria Math" panose="02040503050406030204" pitchFamily="18" charset="0"/>
+                          </a:rPr>
+                        </m:ctrlPr>
+                      </m:sSubPr>
+                      <m:e>
+                        <m:r>
+                          <a:rPr lang="fi-FI" sz="2200" i="1">
+                            <a:solidFill>
+                              <a:srgbClr val="00B050"/>
+                            </a:solidFill>
+                            <a:latin typeface="Cambria Math" panose="02040503050406030204" pitchFamily="18" charset="0"/>
+                          </a:rPr>
+                          <m:t>𝑣</m:t>
+                        </m:r>
+                      </m:e>
+                      <m:sub>
+                        <m:r>
+                          <a:rPr lang="fi-FI" sz="2200" i="1">
+                            <a:solidFill>
+                              <a:srgbClr val="00B050"/>
+                            </a:solidFill>
+                            <a:latin typeface="Cambria Math" panose="02040503050406030204" pitchFamily="18" charset="0"/>
+                          </a:rPr>
+                          <m:t>0</m:t>
+                        </m:r>
+                      </m:sub>
+                    </m:sSub>
+                    <m:r>
+                      <a:rPr lang="fi-FI" sz="2200" b="0" i="1" smtClean="0">
+                        <a:solidFill>
+                          <a:srgbClr val="00B050"/>
+                        </a:solidFill>
+                        <a:latin typeface="Cambria Math" panose="02040503050406030204" pitchFamily="18" charset="0"/>
+                      </a:rPr>
+                      <m:t>𝑐𝑜𝑠</m:t>
+                    </m:r>
+                    <m:r>
+                      <m:rPr>
+                        <m:sty m:val="p"/>
+                      </m:rPr>
+                      <a:rPr lang="el-GR" sz="2200" i="1">
+                        <a:solidFill>
+                          <a:srgbClr val="00B050"/>
+                        </a:solidFill>
+                        <a:latin typeface="Cambria Math" panose="02040503050406030204" pitchFamily="18" charset="0"/>
+                      </a:rPr>
+                      <m:t>α</m:t>
+                    </m:r>
+                  </m:oMath>
+                </a14:m>
+                <a:endParaRPr lang="fi-FI" sz="2200" dirty="0">
+                  <a:solidFill>
+                    <a:schemeClr val="tx1"/>
+                  </a:solidFill>
+                  <a:latin typeface="Arial" charset="0"/>
+                </a:endParaRPr>
+              </a:p>
+            </p:txBody>
+          </p:sp>
+        </mc:Choice>
+        <mc:Fallback>
+          <p:sp>
+            <p:nvSpPr>
+              <p:cNvPr id="16" name="Suorakulmio 34"/>
+              <p:cNvSpPr>
+                <a:spLocks noRot="1" noChangeAspect="1" noMove="1" noResize="1" noEditPoints="1" noAdjustHandles="1" noChangeArrowheads="1" noChangeShapeType="1" noTextEdit="1"/>
+              </p:cNvSpPr>
+              <p:nvPr/>
+            </p:nvSpPr>
+            <p:spPr>
+              <a:xfrm>
+                <a:off x="1155412" y="1558298"/>
+                <a:ext cx="7446886" cy="4470968"/>
+              </a:xfrm>
+              <a:prstGeom prst="rect">
+                <a:avLst/>
+              </a:prstGeom>
+              <a:blipFill>
+                <a:blip r:embed="rId6"/>
+                <a:stretch>
+                  <a:fillRect l="-1065" t="-819"/>
+                </a:stretch>
+              </a:blipFill>
+            </p:spPr>
+            <p:txBody>
+              <a:bodyPr/>
+              <a:lstStyle/>
+              <a:p>
+                <a:r>
+                  <a:rPr lang="fi-FI">
+                    <a:noFill/>
+                  </a:rPr>
+                  <a:t> </a:t>
+                </a:r>
+              </a:p>
+            </p:txBody>
+          </p:sp>
+        </mc:Fallback>
+      </mc:AlternateContent>
+      <p:grpSp>
+        <p:nvGrpSpPr>
+          <p:cNvPr id="23" name="Group 22"/>
+          <p:cNvGrpSpPr/>
+          <p:nvPr/>
+        </p:nvGrpSpPr>
+        <p:grpSpPr>
+          <a:xfrm>
+            <a:off x="5453034" y="5343436"/>
+            <a:ext cx="1473296" cy="1237185"/>
+            <a:chOff x="5940152" y="5440508"/>
+            <a:chExt cx="1473296" cy="1237185"/>
+          </a:xfrm>
+        </p:grpSpPr>
+        <p:cxnSp>
+          <p:nvCxnSpPr>
+            <p:cNvPr id="4" name="Straight Arrow Connector 3"/>
+            <p:cNvCxnSpPr/>
+            <p:nvPr/>
+          </p:nvCxnSpPr>
+          <p:spPr>
+            <a:xfrm flipV="1">
+              <a:off x="5940152" y="5440508"/>
+              <a:ext cx="904673" cy="867854"/>
+            </a:xfrm>
+            <a:prstGeom prst="straightConnector1">
+              <a:avLst/>
+            </a:prstGeom>
+            <a:ln>
+              <a:tailEnd type="triangle"/>
+            </a:ln>
+          </p:spPr>
+          <p:style>
+            <a:lnRef idx="1">
+              <a:schemeClr val="accent1"/>
+            </a:lnRef>
+            <a:fillRef idx="0">
+              <a:schemeClr val="accent1"/>
+            </a:fillRef>
+            <a:effectRef idx="0">
+              <a:schemeClr val="accent1"/>
+            </a:effectRef>
+            <a:fontRef idx="minor">
+              <a:schemeClr val="tx1"/>
+            </a:fontRef>
+          </p:style>
+        </p:cxnSp>
+        <p:cxnSp>
+          <p:nvCxnSpPr>
+            <p:cNvPr id="7" name="Straight Arrow Connector 6"/>
+            <p:cNvCxnSpPr/>
+            <p:nvPr/>
+          </p:nvCxnSpPr>
+          <p:spPr>
+            <a:xfrm>
+              <a:off x="5940152" y="6308361"/>
+              <a:ext cx="936104" cy="0"/>
+            </a:xfrm>
+            <a:prstGeom prst="straightConnector1">
+              <a:avLst/>
+            </a:prstGeom>
+            <a:ln w="19050">
+              <a:solidFill>
+                <a:srgbClr val="00B050"/>
+              </a:solidFill>
+              <a:prstDash val="dash"/>
+              <a:tailEnd type="triangle"/>
+            </a:ln>
+          </p:spPr>
+          <p:style>
+            <a:lnRef idx="1">
+              <a:schemeClr val="accent1"/>
+            </a:lnRef>
+            <a:fillRef idx="0">
+              <a:schemeClr val="accent1"/>
+            </a:fillRef>
+            <a:effectRef idx="0">
+              <a:schemeClr val="accent1"/>
+            </a:effectRef>
+            <a:fontRef idx="minor">
+              <a:schemeClr val="tx1"/>
+            </a:fontRef>
+          </p:style>
+        </p:cxnSp>
+        <p:cxnSp>
+          <p:nvCxnSpPr>
+            <p:cNvPr id="18" name="Straight Arrow Connector 17"/>
+            <p:cNvCxnSpPr/>
+            <p:nvPr/>
+          </p:nvCxnSpPr>
+          <p:spPr>
+            <a:xfrm flipV="1">
+              <a:off x="6885720" y="5440508"/>
+              <a:ext cx="0" cy="863138"/>
+            </a:xfrm>
+            <a:prstGeom prst="straightConnector1">
+              <a:avLst/>
+            </a:prstGeom>
+            <a:ln w="19050">
+              <a:solidFill>
+                <a:srgbClr val="FF0000"/>
+              </a:solidFill>
+              <a:prstDash val="dash"/>
+              <a:tailEnd type="triangle"/>
+            </a:ln>
+          </p:spPr>
+          <p:style>
+            <a:lnRef idx="1">
+              <a:schemeClr val="accent1"/>
+            </a:lnRef>
+            <a:fillRef idx="0">
+              <a:schemeClr val="accent1"/>
+            </a:fillRef>
+            <a:effectRef idx="0">
+              <a:schemeClr val="accent1"/>
+            </a:effectRef>
+            <a:fontRef idx="minor">
+              <a:schemeClr val="tx1"/>
+            </a:fontRef>
+          </p:style>
+        </p:cxnSp>
+        <mc:AlternateContent xmlns:mc="http://schemas.openxmlformats.org/markup-compatibility/2006">
+          <mc:Choice xmlns:a14="http://schemas.microsoft.com/office/drawing/2010/main" Requires="a14">
+            <p:sp>
+              <p:nvSpPr>
+                <p:cNvPr id="15" name="Rectangle 14"/>
+                <p:cNvSpPr/>
+                <p:nvPr/>
+              </p:nvSpPr>
+              <p:spPr>
+                <a:xfrm rot="18190039">
+                  <a:off x="6050630" y="5506045"/>
+                  <a:ext cx="478913" cy="369332"/>
+                </a:xfrm>
+                <a:prstGeom prst="rect">
+                  <a:avLst/>
+                </a:prstGeom>
+              </p:spPr>
+              <p:txBody>
+                <a:bodyPr wrap="none">
+                  <a:spAutoFit/>
+                </a:bodyPr>
+                <a:lstStyle/>
+                <a:p>
+                  <a14:m>
+                    <m:oMathPara xmlns:m="http://schemas.openxmlformats.org/officeDocument/2006/math">
+                      <m:oMathParaPr>
+                        <m:jc m:val="centerGroup"/>
+                      </m:oMathParaPr>
+                      <m:oMath xmlns:m="http://schemas.openxmlformats.org/officeDocument/2006/math">
+                        <m:sSub>
+                          <m:sSubPr>
+                            <m:ctrlPr>
+                              <a:rPr lang="fi-FI" i="1">
+                                <a:solidFill>
+                                  <a:schemeClr val="tx1"/>
+                                </a:solidFill>
+                                <a:latin typeface="Cambria Math" panose="02040503050406030204" pitchFamily="18" charset="0"/>
+                              </a:rPr>
+                            </m:ctrlPr>
+                          </m:sSubPr>
+                          <m:e>
+                            <m:r>
+                              <a:rPr lang="fi-FI" i="1">
+                                <a:solidFill>
+                                  <a:schemeClr val="tx1"/>
+                                </a:solidFill>
+                                <a:latin typeface="Cambria Math" panose="02040503050406030204" pitchFamily="18" charset="0"/>
+                              </a:rPr>
+                              <m:t>𝑣</m:t>
+                            </m:r>
+                          </m:e>
+                          <m:sub>
+                            <m:r>
+                              <a:rPr lang="fi-FI" i="1">
+                                <a:solidFill>
+                                  <a:schemeClr val="tx1"/>
+                                </a:solidFill>
+                                <a:latin typeface="Cambria Math" panose="02040503050406030204" pitchFamily="18" charset="0"/>
+                              </a:rPr>
+                              <m:t>0</m:t>
+                            </m:r>
+                          </m:sub>
+                        </m:sSub>
+                      </m:oMath>
+                    </m:oMathPara>
+                  </a14:m>
+                  <a:endParaRPr lang="fi-FI" dirty="0"/>
+                </a:p>
+              </p:txBody>
+            </p:sp>
+          </mc:Choice>
+          <mc:Fallback>
+            <p:sp>
+              <p:nvSpPr>
+                <p:cNvPr id="15" name="Rectangle 14"/>
+                <p:cNvSpPr>
+                  <a:spLocks noRot="1" noChangeAspect="1" noMove="1" noResize="1" noEditPoints="1" noAdjustHandles="1" noChangeArrowheads="1" noChangeShapeType="1" noTextEdit="1"/>
+                </p:cNvSpPr>
+                <p:nvPr/>
+              </p:nvSpPr>
+              <p:spPr>
+                <a:xfrm rot="18190039">
+                  <a:off x="6050630" y="5506045"/>
+                  <a:ext cx="478913" cy="369332"/>
+                </a:xfrm>
+                <a:prstGeom prst="rect">
+                  <a:avLst/>
+                </a:prstGeom>
+                <a:blipFill>
+                  <a:blip r:embed="rId7"/>
+                  <a:stretch>
+                    <a:fillRect/>
+                  </a:stretch>
+                </a:blipFill>
+              </p:spPr>
+              <p:txBody>
+                <a:bodyPr/>
+                <a:lstStyle/>
+                <a:p>
+                  <a:r>
+                    <a:rPr lang="fi-FI">
+                      <a:noFill/>
+                    </a:rPr>
+                    <a:t> </a:t>
+                  </a:r>
+                </a:p>
+              </p:txBody>
+            </p:sp>
+          </mc:Fallback>
+        </mc:AlternateContent>
+        <mc:AlternateContent xmlns:mc="http://schemas.openxmlformats.org/markup-compatibility/2006">
+          <mc:Choice xmlns:a14="http://schemas.microsoft.com/office/drawing/2010/main" Requires="a14">
+            <p:sp>
+              <p:nvSpPr>
+                <p:cNvPr id="17" name="Rectangle 16"/>
+                <p:cNvSpPr/>
+                <p:nvPr/>
+              </p:nvSpPr>
+              <p:spPr>
+                <a:xfrm>
+                  <a:off x="6823030" y="5690610"/>
+                  <a:ext cx="590418" cy="391261"/>
+                </a:xfrm>
+                <a:prstGeom prst="rect">
+                  <a:avLst/>
+                </a:prstGeom>
+              </p:spPr>
+              <p:txBody>
+                <a:bodyPr wrap="none">
+                  <a:spAutoFit/>
+                </a:bodyPr>
+                <a:lstStyle/>
+                <a:p>
+                  <a14:m>
+                    <m:oMathPara xmlns:m="http://schemas.openxmlformats.org/officeDocument/2006/math">
+                      <m:oMathParaPr>
+                        <m:jc m:val="centerGroup"/>
+                      </m:oMathParaPr>
+                      <m:oMath xmlns:m="http://schemas.openxmlformats.org/officeDocument/2006/math">
+                        <m:sSub>
+                          <m:sSubPr>
+                            <m:ctrlPr>
+                              <a:rPr lang="fi-FI" i="1" smtClean="0">
+                                <a:solidFill>
+                                  <a:srgbClr val="FF0000"/>
+                                </a:solidFill>
+                                <a:latin typeface="Cambria Math" panose="02040503050406030204" pitchFamily="18" charset="0"/>
+                              </a:rPr>
+                            </m:ctrlPr>
+                          </m:sSubPr>
+                          <m:e>
+                            <m:r>
+                              <a:rPr lang="fi-FI" i="1">
+                                <a:solidFill>
+                                  <a:srgbClr val="FF0000"/>
+                                </a:solidFill>
+                                <a:latin typeface="Cambria Math" panose="02040503050406030204" pitchFamily="18" charset="0"/>
+                              </a:rPr>
+                              <m:t>𝑣</m:t>
+                            </m:r>
+                          </m:e>
+                          <m:sub>
+                            <m:r>
+                              <a:rPr lang="fi-FI" i="1">
+                                <a:solidFill>
+                                  <a:srgbClr val="FF0000"/>
+                                </a:solidFill>
+                                <a:latin typeface="Cambria Math" panose="02040503050406030204" pitchFamily="18" charset="0"/>
+                              </a:rPr>
+                              <m:t>0</m:t>
+                            </m:r>
+                            <m:r>
+                              <a:rPr lang="fi-FI" i="1">
+                                <a:solidFill>
+                                  <a:srgbClr val="FF0000"/>
+                                </a:solidFill>
+                                <a:latin typeface="Cambria Math" panose="02040503050406030204" pitchFamily="18" charset="0"/>
+                              </a:rPr>
+                              <m:t>𝑦</m:t>
+                            </m:r>
+                          </m:sub>
+                        </m:sSub>
+                      </m:oMath>
+                    </m:oMathPara>
+                  </a14:m>
+                  <a:endParaRPr lang="fi-FI" dirty="0">
+                    <a:solidFill>
+                      <a:srgbClr val="FF0000"/>
+                    </a:solidFill>
+                  </a:endParaRPr>
+                </a:p>
+              </p:txBody>
+            </p:sp>
+          </mc:Choice>
+          <mc:Fallback>
+            <p:sp>
+              <p:nvSpPr>
+                <p:cNvPr id="17" name="Rectangle 16"/>
+                <p:cNvSpPr>
+                  <a:spLocks noRot="1" noChangeAspect="1" noMove="1" noResize="1" noEditPoints="1" noAdjustHandles="1" noChangeArrowheads="1" noChangeShapeType="1" noTextEdit="1"/>
+                </p:cNvSpPr>
+                <p:nvPr/>
+              </p:nvSpPr>
+              <p:spPr>
+                <a:xfrm>
+                  <a:off x="6823030" y="5690610"/>
+                  <a:ext cx="590418" cy="391261"/>
+                </a:xfrm>
+                <a:prstGeom prst="rect">
+                  <a:avLst/>
+                </a:prstGeom>
+                <a:blipFill>
+                  <a:blip r:embed="rId8"/>
+                  <a:stretch>
+                    <a:fillRect b="-6250"/>
+                  </a:stretch>
+                </a:blipFill>
+              </p:spPr>
+              <p:txBody>
+                <a:bodyPr/>
+                <a:lstStyle/>
+                <a:p>
+                  <a:r>
+                    <a:rPr lang="fi-FI">
+                      <a:noFill/>
+                    </a:rPr>
+                    <a:t> </a:t>
+                  </a:r>
+                </a:p>
+              </p:txBody>
+            </p:sp>
+          </mc:Fallback>
+        </mc:AlternateContent>
+        <mc:AlternateContent xmlns:mc="http://schemas.openxmlformats.org/markup-compatibility/2006">
+          <mc:Choice xmlns:a14="http://schemas.microsoft.com/office/drawing/2010/main" Requires="a14">
+            <p:sp>
+              <p:nvSpPr>
+                <p:cNvPr id="19" name="Rectangle 18"/>
+                <p:cNvSpPr/>
+                <p:nvPr/>
+              </p:nvSpPr>
+              <p:spPr>
+                <a:xfrm>
+                  <a:off x="6129889" y="6308361"/>
+                  <a:ext cx="582787" cy="369332"/>
+                </a:xfrm>
+                <a:prstGeom prst="rect">
+                  <a:avLst/>
+                </a:prstGeom>
+              </p:spPr>
+              <p:txBody>
+                <a:bodyPr wrap="none">
+                  <a:spAutoFit/>
+                </a:bodyPr>
+                <a:lstStyle/>
+                <a:p>
+                  <a14:m>
+                    <m:oMathPara xmlns:m="http://schemas.openxmlformats.org/officeDocument/2006/math">
+                      <m:oMathParaPr>
+                        <m:jc m:val="centerGroup"/>
+                      </m:oMathParaPr>
+                      <m:oMath xmlns:m="http://schemas.openxmlformats.org/officeDocument/2006/math">
+                        <m:sSub>
+                          <m:sSubPr>
+                            <m:ctrlPr>
+                              <a:rPr lang="fi-FI" i="1" smtClean="0">
+                                <a:solidFill>
+                                  <a:srgbClr val="00B050"/>
+                                </a:solidFill>
+                                <a:latin typeface="Cambria Math" panose="02040503050406030204" pitchFamily="18" charset="0"/>
+                              </a:rPr>
+                            </m:ctrlPr>
+                          </m:sSubPr>
+                          <m:e>
+                            <m:r>
+                              <a:rPr lang="fi-FI" i="1">
+                                <a:solidFill>
+                                  <a:srgbClr val="00B050"/>
+                                </a:solidFill>
+                                <a:latin typeface="Cambria Math" panose="02040503050406030204" pitchFamily="18" charset="0"/>
+                              </a:rPr>
+                              <m:t>𝑣</m:t>
+                            </m:r>
+                          </m:e>
+                          <m:sub>
+                            <m:r>
+                              <a:rPr lang="fi-FI" i="1">
+                                <a:solidFill>
+                                  <a:srgbClr val="00B050"/>
+                                </a:solidFill>
+                                <a:latin typeface="Cambria Math" panose="02040503050406030204" pitchFamily="18" charset="0"/>
+                              </a:rPr>
+                              <m:t>0</m:t>
+                            </m:r>
+                            <m:r>
+                              <a:rPr lang="fi-FI" b="0" i="1" smtClean="0">
+                                <a:solidFill>
+                                  <a:srgbClr val="00B050"/>
+                                </a:solidFill>
+                                <a:latin typeface="Cambria Math" panose="02040503050406030204" pitchFamily="18" charset="0"/>
+                              </a:rPr>
+                              <m:t>𝑥</m:t>
+                            </m:r>
+                          </m:sub>
+                        </m:sSub>
+                      </m:oMath>
+                    </m:oMathPara>
+                  </a14:m>
+                  <a:endParaRPr lang="fi-FI" dirty="0">
+                    <a:solidFill>
+                      <a:srgbClr val="00B050"/>
+                    </a:solidFill>
+                  </a:endParaRPr>
+                </a:p>
+              </p:txBody>
+            </p:sp>
+          </mc:Choice>
+          <mc:Fallback>
+            <p:sp>
+              <p:nvSpPr>
+                <p:cNvPr id="19" name="Rectangle 18"/>
+                <p:cNvSpPr>
+                  <a:spLocks noRot="1" noChangeAspect="1" noMove="1" noResize="1" noEditPoints="1" noAdjustHandles="1" noChangeArrowheads="1" noChangeShapeType="1" noTextEdit="1"/>
+                </p:cNvSpPr>
+                <p:nvPr/>
+              </p:nvSpPr>
+              <p:spPr>
+                <a:xfrm>
+                  <a:off x="6129889" y="6308361"/>
+                  <a:ext cx="582787" cy="369332"/>
+                </a:xfrm>
+                <a:prstGeom prst="rect">
+                  <a:avLst/>
+                </a:prstGeom>
+                <a:blipFill>
+                  <a:blip r:embed="rId9"/>
+                  <a:stretch>
+                    <a:fillRect b="-1667"/>
+                  </a:stretch>
+                </a:blipFill>
+              </p:spPr>
+              <p:txBody>
+                <a:bodyPr/>
+                <a:lstStyle/>
+                <a:p>
+                  <a:r>
+                    <a:rPr lang="fi-FI">
+                      <a:noFill/>
+                    </a:rPr>
+                    <a:t> </a:t>
+                  </a:r>
+                </a:p>
+              </p:txBody>
+            </p:sp>
+          </mc:Fallback>
+        </mc:AlternateContent>
+        <mc:AlternateContent xmlns:mc="http://schemas.openxmlformats.org/markup-compatibility/2006">
+          <mc:Choice xmlns:a14="http://schemas.microsoft.com/office/drawing/2010/main" Requires="a14">
+            <p:sp>
+              <p:nvSpPr>
+                <p:cNvPr id="20" name="TextBox 19"/>
+                <p:cNvSpPr txBox="1"/>
+                <p:nvPr/>
+              </p:nvSpPr>
+              <p:spPr>
+                <a:xfrm>
+                  <a:off x="6337200" y="5951757"/>
+                  <a:ext cx="208968" cy="276999"/>
+                </a:xfrm>
+                <a:prstGeom prst="rect">
+                  <a:avLst/>
+                </a:prstGeom>
+                <a:noFill/>
+              </p:spPr>
+              <p:txBody>
+                <a:bodyPr wrap="none" lIns="0" tIns="0" rIns="0" bIns="0" rtlCol="0">
+                  <a:spAutoFit/>
+                </a:bodyPr>
+                <a:lstStyle/>
+                <a:p>
+                  <a14:m>
+                    <m:oMathPara xmlns:m="http://schemas.openxmlformats.org/officeDocument/2006/math">
+                      <m:oMathParaPr>
+                        <m:jc m:val="centerGroup"/>
+                      </m:oMathParaPr>
+                      <m:oMath xmlns:m="http://schemas.openxmlformats.org/officeDocument/2006/math">
+                        <m:r>
+                          <a:rPr lang="fi-FI" i="1" smtClean="0">
+                            <a:solidFill>
+                              <a:schemeClr val="tx1"/>
+                            </a:solidFill>
+                            <a:latin typeface="Cambria Math" panose="02040503050406030204" pitchFamily="18" charset="0"/>
+                            <a:ea typeface="Cambria Math" panose="02040503050406030204" pitchFamily="18" charset="0"/>
+                          </a:rPr>
+                          <m:t>𝛼</m:t>
+                        </m:r>
+                      </m:oMath>
+                    </m:oMathPara>
+                  </a14:m>
+                  <a:endParaRPr lang="fi-FI" dirty="0">
+                    <a:solidFill>
+                      <a:schemeClr val="tx1"/>
+                    </a:solidFill>
+                  </a:endParaRPr>
+                </a:p>
+              </p:txBody>
+            </p:sp>
+          </mc:Choice>
+          <mc:Fallback>
+            <p:sp>
+              <p:nvSpPr>
+                <p:cNvPr id="20" name="TextBox 19"/>
+                <p:cNvSpPr txBox="1">
+                  <a:spLocks noRot="1" noChangeAspect="1" noMove="1" noResize="1" noEditPoints="1" noAdjustHandles="1" noChangeArrowheads="1" noChangeShapeType="1" noTextEdit="1"/>
+                </p:cNvSpPr>
+                <p:nvPr/>
+              </p:nvSpPr>
+              <p:spPr>
+                <a:xfrm>
+                  <a:off x="6337200" y="5951757"/>
+                  <a:ext cx="208968" cy="276999"/>
+                </a:xfrm>
+                <a:prstGeom prst="rect">
+                  <a:avLst/>
+                </a:prstGeom>
+                <a:blipFill>
+                  <a:blip r:embed="rId10"/>
+                  <a:stretch>
+                    <a:fillRect l="-14706" r="-11765"/>
+                  </a:stretch>
+                </a:blipFill>
+              </p:spPr>
+              <p:txBody>
+                <a:bodyPr/>
+                <a:lstStyle/>
+                <a:p>
+                  <a:r>
+                    <a:rPr lang="fi-FI">
+                      <a:noFill/>
+                    </a:rPr>
+                    <a:t> </a:t>
+                  </a:r>
+                </a:p>
+              </p:txBody>
+            </p:sp>
+          </mc:Fallback>
+        </mc:AlternateContent>
+        <p:sp>
+          <p:nvSpPr>
+            <p:cNvPr id="21" name="Arc 20"/>
+            <p:cNvSpPr/>
+            <p:nvPr/>
+          </p:nvSpPr>
+          <p:spPr>
+            <a:xfrm>
+              <a:off x="6129889" y="6081870"/>
+              <a:ext cx="135303" cy="371466"/>
+            </a:xfrm>
+            <a:prstGeom prst="arc">
+              <a:avLst/>
+            </a:prstGeom>
+          </p:spPr>
+          <p:style>
+            <a:lnRef idx="1">
+              <a:schemeClr val="accent1"/>
+            </a:lnRef>
+            <a:fillRef idx="0">
+              <a:schemeClr val="accent1"/>
+            </a:fillRef>
+            <a:effectRef idx="0">
+              <a:schemeClr val="accent1"/>
+            </a:effectRef>
+            <a:fontRef idx="minor">
+              <a:schemeClr val="tx1"/>
+            </a:fontRef>
+          </p:style>
+          <p:txBody>
+            <a:bodyPr rtlCol="0" anchor="ctr"/>
+            <a:lstStyle/>
+            <a:p>
+              <a:pPr algn="ctr"/>
+              <a:endParaRPr lang="fi-FI"/>
+            </a:p>
+          </p:txBody>
+        </p:sp>
+      </p:grpSp>
+    </p:spTree>
+    <p:extLst>
+      <p:ext uri="{BB962C8B-B14F-4D97-AF65-F5344CB8AC3E}">
+        <p14:creationId xmlns:p14="http://schemas.microsoft.com/office/powerpoint/2010/main" val="2720432706"/>
+      </p:ext>
+    </p:extLst>
+  </p:cSld>
+  <p:clrMapOvr>
+    <a:masterClrMapping/>
+  </p:clrMapOvr>
+</p:sld>
+</file>
+
+<file path=ppt/slides/slide13.xml><?xml version="1.0" encoding="utf-8"?>
+<p:sld xmlns:a="http://schemas.openxmlformats.org/drawingml/2006/main" xmlns:r="http://schemas.openxmlformats.org/officeDocument/2006/relationships" xmlns:p="http://schemas.openxmlformats.org/presentationml/2006/main">
+  <p:cSld>
+    <p:spTree>
+      <p:nvGrpSpPr>
+        <p:cNvPr id="1" name=""/>
+        <p:cNvGrpSpPr/>
+        <p:nvPr/>
+      </p:nvGrpSpPr>
+      <p:grpSpPr>
+        <a:xfrm>
+          <a:off x="0" y="0"/>
+          <a:ext cx="0" cy="0"/>
+          <a:chOff x="0" y="0"/>
+          <a:chExt cx="0" cy="0"/>
+        </a:xfrm>
+      </p:grpSpPr>
+      <p:pic>
+        <p:nvPicPr>
+          <p:cNvPr id="10" name="Picture 8" descr="https://avatars0.githubusercontent.com/u/232371?v=3&amp;s=400"/>
+          <p:cNvPicPr>
+            <a:picLocks noChangeAspect="1" noChangeArrowheads="1"/>
+          </p:cNvPicPr>
+          <p:nvPr/>
+        </p:nvPicPr>
+        <p:blipFill>
+          <a:blip r:embed="rId3" cstate="print">
+            <a:extLst>
+              <a:ext uri="{28A0092B-C50C-407E-A947-70E740481C1C}">
+                <a14:useLocalDpi xmlns:a14="http://schemas.microsoft.com/office/drawing/2010/main" val="0"/>
+              </a:ext>
+            </a:extLst>
+          </a:blip>
+          <a:srcRect/>
+          <a:stretch>
+            <a:fillRect/>
+          </a:stretch>
+        </p:blipFill>
+        <p:spPr bwMode="auto">
+          <a:xfrm>
+            <a:off x="235017" y="5306027"/>
+            <a:ext cx="1254667" cy="1254668"/>
+          </a:xfrm>
+          <a:prstGeom prst="rect">
+            <a:avLst/>
+          </a:prstGeom>
+          <a:noFill/>
+          <a:ln>
+            <a:noFill/>
+          </a:ln>
+          <a:extLst>
+            <a:ext uri="{909E8E84-426E-40DD-AFC4-6F175D3DCCD1}">
+              <a14:hiddenFill xmlns:a14="http://schemas.microsoft.com/office/drawing/2010/main">
+                <a:solidFill>
+                  <a:srgbClr val="FFFFFF"/>
+                </a:solidFill>
+              </a14:hiddenFill>
+            </a:ext>
+            <a:ext uri="{91240B29-F687-4F45-9708-019B960494DF}">
+              <a14:hiddenLine xmlns:a14="http://schemas.microsoft.com/office/drawing/2010/main" w="9525">
+                <a:solidFill>
+                  <a:srgbClr val="000000"/>
+                </a:solidFill>
+                <a:miter lim="800000"/>
+                <a:headEnd/>
+                <a:tailEnd/>
+              </a14:hiddenLine>
+            </a:ext>
+          </a:extLst>
+        </p:spPr>
+      </p:pic>
+      <p:sp>
+        <p:nvSpPr>
+          <p:cNvPr id="13" name="Suorakulmio 12"/>
+          <p:cNvSpPr/>
+          <p:nvPr/>
+        </p:nvSpPr>
+        <p:spPr bwMode="auto">
+          <a:xfrm>
+            <a:off x="5311958" y="240174"/>
+            <a:ext cx="3570371" cy="531170"/>
+          </a:xfrm>
+          <a:prstGeom prst="rect">
+            <a:avLst/>
+          </a:prstGeom>
+          <a:ln>
+            <a:headEnd type="none" w="med" len="med"/>
+            <a:tailEnd type="none" w="med" len="med"/>
+          </a:ln>
+          <a:scene3d>
+            <a:camera prst="orthographicFront"/>
+            <a:lightRig rig="threePt" dir="t"/>
+          </a:scene3d>
+          <a:sp3d>
+            <a:bevelT w="114300" prst="artDeco"/>
+          </a:sp3d>
+        </p:spPr>
+        <p:style>
+          <a:lnRef idx="2">
+            <a:schemeClr val="accent4"/>
+          </a:lnRef>
+          <a:fillRef idx="1">
+            <a:schemeClr val="lt1"/>
+          </a:fillRef>
+          <a:effectRef idx="0">
+            <a:schemeClr val="accent4"/>
+          </a:effectRef>
+          <a:fontRef idx="minor">
+            <a:schemeClr val="dk1"/>
+          </a:fontRef>
+        </p:style>
+        <p:txBody>
+          <a:bodyPr vert="horz" wrap="square" lIns="91440" tIns="45720" rIns="91440" bIns="45720" numCol="1" rtlCol="0" anchor="t" anchorCtr="0" compatLnSpc="1">
+            <a:prstTxWarp prst="textNoShape">
+              <a:avLst/>
+            </a:prstTxWarp>
+          </a:bodyPr>
+          <a:lstStyle/>
+          <a:p>
+            <a:pPr marL="0" marR="0" indent="0" algn="ctr" defTabSz="449263" rtl="0" eaLnBrk="1" fontAlgn="base" latinLnBrk="0" hangingPunct="1">
+              <a:lnSpc>
+                <a:spcPct val="100000"/>
+              </a:lnSpc>
+              <a:spcBef>
+                <a:spcPct val="0"/>
+              </a:spcBef>
+              <a:spcAft>
+                <a:spcPct val="0"/>
+              </a:spcAft>
+              <a:buClr>
+                <a:srgbClr val="000000"/>
+              </a:buClr>
+              <a:buSzPct val="100000"/>
+              <a:buFont typeface="Times New Roman" pitchFamily="16" charset="0"/>
+              <a:buNone/>
+              <a:tabLst/>
+            </a:pPr>
+            <a:r>
+              <a:rPr kumimoji="0" lang="fi-FI" sz="2400" b="0" i="0" u="none" strike="noStrike" cap="none" normalizeH="0" dirty="0">
+                <a:ln>
+                  <a:noFill/>
+                </a:ln>
+                <a:solidFill>
+                  <a:schemeClr val="tx2">
+                    <a:lumMod val="75000"/>
+                    <a:lumOff val="25000"/>
+                  </a:schemeClr>
+                </a:solidFill>
+                <a:effectLst/>
+                <a:latin typeface="Arial" charset="0"/>
+              </a:rPr>
+              <a:t>MÄÄRITTELYIKKUNA</a:t>
+            </a:r>
+            <a:endParaRPr kumimoji="0" lang="fi-FI" sz="1800" b="0" i="0" u="none" strike="noStrike" cap="none" normalizeH="0" dirty="0">
+              <a:ln>
+                <a:noFill/>
+              </a:ln>
+              <a:solidFill>
+                <a:schemeClr val="tx2">
+                  <a:lumMod val="75000"/>
+                  <a:lumOff val="25000"/>
+                </a:schemeClr>
+              </a:solidFill>
+              <a:effectLst/>
+              <a:latin typeface="Arial" charset="0"/>
+            </a:endParaRPr>
+          </a:p>
+          <a:p>
+            <a:pPr marL="0" marR="0" indent="0" algn="l" defTabSz="449263" rtl="0" eaLnBrk="1" fontAlgn="base" latinLnBrk="0" hangingPunct="1">
+              <a:lnSpc>
+                <a:spcPct val="100000"/>
+              </a:lnSpc>
+              <a:spcBef>
+                <a:spcPct val="0"/>
+              </a:spcBef>
+              <a:spcAft>
+                <a:spcPct val="0"/>
+              </a:spcAft>
+              <a:buClr>
+                <a:srgbClr val="000000"/>
+              </a:buClr>
+              <a:buSzPct val="100000"/>
+              <a:buFont typeface="Times New Roman" pitchFamily="16" charset="0"/>
+              <a:buNone/>
+              <a:tabLst/>
+            </a:pPr>
+            <a:endParaRPr kumimoji="0" lang="fi-FI" sz="1800" b="0" i="0" u="none" strike="noStrike" cap="none" normalizeH="0" dirty="0">
+              <a:ln>
+                <a:noFill/>
+              </a:ln>
+              <a:solidFill>
+                <a:schemeClr val="tx2">
+                  <a:lumMod val="75000"/>
+                  <a:lumOff val="25000"/>
+                </a:schemeClr>
+              </a:solidFill>
+              <a:effectLst/>
+              <a:latin typeface="Arial" charset="0"/>
+            </a:endParaRPr>
+          </a:p>
+        </p:txBody>
+      </p:sp>
+      <p:pic>
+        <p:nvPicPr>
+          <p:cNvPr id="42" name="Kuva 41"/>
+          <p:cNvPicPr>
+            <a:picLocks noChangeAspect="1"/>
+          </p:cNvPicPr>
+          <p:nvPr/>
+        </p:nvPicPr>
+        <p:blipFill>
+          <a:blip r:embed="rId4">
+            <a:extLst>
+              <a:ext uri="{28A0092B-C50C-407E-A947-70E740481C1C}">
+                <a14:useLocalDpi xmlns:a14="http://schemas.microsoft.com/office/drawing/2010/main" val="0"/>
+              </a:ext>
+            </a:extLst>
+          </a:blip>
+          <a:stretch>
+            <a:fillRect/>
+          </a:stretch>
+        </p:blipFill>
+        <p:spPr>
+          <a:xfrm>
+            <a:off x="8068724" y="1165451"/>
+            <a:ext cx="1075276" cy="516133"/>
+          </a:xfrm>
+          <a:prstGeom prst="rect">
+            <a:avLst/>
+          </a:prstGeom>
+        </p:spPr>
+      </p:pic>
+      <p:sp>
+        <p:nvSpPr>
+          <p:cNvPr id="3" name="Alatunnisteen paikkamerkki 2"/>
+          <p:cNvSpPr>
+            <a:spLocks noGrp="1"/>
+          </p:cNvSpPr>
+          <p:nvPr>
+            <p:ph type="ftr" sz="quarter" idx="11"/>
+          </p:nvPr>
+        </p:nvSpPr>
+        <p:spPr>
+          <a:xfrm>
+            <a:off x="755576" y="6376295"/>
+            <a:ext cx="4870585" cy="365125"/>
+          </a:xfrm>
+        </p:spPr>
+        <p:txBody>
+          <a:bodyPr/>
+          <a:lstStyle/>
+          <a:p>
+            <a:pPr algn="r">
+              <a:defRPr/>
+            </a:pPr>
+            <a:r>
+              <a:rPr lang="fi-FI" dirty="0"/>
+              <a:t>MAOL Ohjelmointia matematiikkaan</a:t>
+            </a:r>
+            <a:endParaRPr lang="ru-RU" dirty="0"/>
+          </a:p>
+        </p:txBody>
+      </p:sp>
+      <p:sp>
+        <p:nvSpPr>
+          <p:cNvPr id="35" name="Suorakulmio 34"/>
+          <p:cNvSpPr/>
+          <p:nvPr/>
+        </p:nvSpPr>
+        <p:spPr>
+          <a:xfrm>
+            <a:off x="428520" y="765364"/>
+            <a:ext cx="8391952" cy="430887"/>
+          </a:xfrm>
+          <a:prstGeom prst="rect">
+            <a:avLst/>
+          </a:prstGeom>
+        </p:spPr>
+        <p:txBody>
+          <a:bodyPr wrap="square">
+            <a:spAutoFit/>
+          </a:bodyPr>
+          <a:lstStyle/>
+          <a:p>
+            <a:r>
+              <a:rPr lang="fi-FI" sz="2200" dirty="0">
+                <a:solidFill>
+                  <a:schemeClr val="tx1"/>
+                </a:solidFill>
+                <a:latin typeface="Arial" charset="0"/>
+              </a:rPr>
+              <a:t>Pallon heitto                                          </a:t>
+            </a:r>
+            <a:r>
+              <a:rPr lang="fi-FI" sz="1600" i="1" dirty="0">
+                <a:solidFill>
+                  <a:schemeClr val="tx1"/>
+                </a:solidFill>
+                <a:latin typeface="Arial" charset="0"/>
+              </a:rPr>
+              <a:t>(vinkki: plot, points, function)</a:t>
+            </a:r>
+            <a:endParaRPr lang="fi-FI" sz="1600" i="1" dirty="0">
+              <a:solidFill>
+                <a:schemeClr val="tx1"/>
+              </a:solidFill>
+            </a:endParaRPr>
+          </a:p>
+        </p:txBody>
+      </p:sp>
+      <p:pic>
+        <p:nvPicPr>
+          <p:cNvPr id="61" name="Picture 2" descr="WeScheme Logo"/>
+          <p:cNvPicPr>
+            <a:picLocks noChangeAspect="1" noChangeArrowheads="1"/>
+          </p:cNvPicPr>
+          <p:nvPr/>
+        </p:nvPicPr>
+        <p:blipFill>
+          <a:blip r:embed="rId5" cstate="print">
+            <a:extLst>
+              <a:ext uri="{28A0092B-C50C-407E-A947-70E740481C1C}">
+                <a14:useLocalDpi xmlns:a14="http://schemas.microsoft.com/office/drawing/2010/main" val="0"/>
+              </a:ext>
+            </a:extLst>
+          </a:blip>
+          <a:srcRect/>
+          <a:stretch>
+            <a:fillRect/>
+          </a:stretch>
+        </p:blipFill>
+        <p:spPr bwMode="auto">
+          <a:xfrm>
+            <a:off x="7386527" y="5180161"/>
+            <a:ext cx="1495802" cy="1383832"/>
+          </a:xfrm>
+          <a:prstGeom prst="rect">
+            <a:avLst/>
+          </a:prstGeom>
+          <a:noFill/>
+          <a:ln>
+            <a:noFill/>
+          </a:ln>
+          <a:effectLst>
+            <a:outerShdw blurRad="50800" dist="38100" dir="5400000" algn="t" rotWithShape="0">
+              <a:prstClr val="black">
+                <a:alpha val="40000"/>
+              </a:prstClr>
+            </a:outerShdw>
+          </a:effectLst>
+          <a:extLst>
+            <a:ext uri="{909E8E84-426E-40DD-AFC4-6F175D3DCCD1}">
+              <a14:hiddenFill xmlns:a14="http://schemas.microsoft.com/office/drawing/2010/main">
+                <a:solidFill>
+                  <a:srgbClr val="FFFFFF"/>
+                </a:solidFill>
+              </a14:hiddenFill>
+            </a:ext>
+            <a:ext uri="{91240B29-F687-4F45-9708-019B960494DF}">
+              <a14:hiddenLine xmlns:a14="http://schemas.microsoft.com/office/drawing/2010/main" w="9525">
+                <a:solidFill>
+                  <a:srgbClr val="000000"/>
+                </a:solidFill>
+                <a:miter lim="800000"/>
+                <a:headEnd/>
+                <a:tailEnd/>
+              </a14:hiddenLine>
+            </a:ext>
+          </a:extLst>
+        </p:spPr>
+      </p:pic>
+      <p:sp>
+        <p:nvSpPr>
+          <p:cNvPr id="16" name="Suorakulmio 34"/>
+          <p:cNvSpPr/>
+          <p:nvPr/>
+        </p:nvSpPr>
+        <p:spPr>
+          <a:xfrm>
+            <a:off x="1153739" y="1437268"/>
+            <a:ext cx="7446886" cy="1754326"/>
+          </a:xfrm>
+          <a:prstGeom prst="rect">
+            <a:avLst/>
+          </a:prstGeom>
+        </p:spPr>
+        <p:txBody>
+          <a:bodyPr wrap="square">
+            <a:spAutoFit/>
+          </a:bodyPr>
+          <a:lstStyle/>
+          <a:p>
+            <a:r>
+              <a:rPr lang="fi-FI" dirty="0">
+                <a:solidFill>
+                  <a:schemeClr val="tx1"/>
+                </a:solidFill>
+                <a:latin typeface="Arial" charset="0"/>
+              </a:rPr>
+              <a:t>Tutki oheisen koodin avulla pallon heittoa ylöspäin (A kohta). </a:t>
+            </a:r>
+          </a:p>
+          <a:p>
+            <a:pPr marL="457200" indent="-457200">
+              <a:buAutoNum type="alphaLcParenR"/>
+            </a:pPr>
+            <a:r>
+              <a:rPr lang="fi-FI" dirty="0">
+                <a:solidFill>
+                  <a:schemeClr val="tx1"/>
+                </a:solidFill>
+                <a:latin typeface="Arial" charset="0"/>
+              </a:rPr>
+              <a:t>Selvitä millä lähtönopeudella saat pallon käymään 5m:n korkeudessa.</a:t>
+            </a:r>
+          </a:p>
+          <a:p>
+            <a:pPr marL="457200" indent="-457200">
+              <a:buAutoNum type="alphaLcParenR"/>
+            </a:pPr>
+            <a:r>
+              <a:rPr lang="fi-FI" dirty="0">
+                <a:solidFill>
+                  <a:schemeClr val="tx1"/>
+                </a:solidFill>
+                <a:latin typeface="Arial" charset="0"/>
+              </a:rPr>
+              <a:t>Selvitä millä lähtönopeudella saat pallon pysymään ilmassa 5s ajan.</a:t>
+            </a:r>
+          </a:p>
+          <a:p>
+            <a:r>
+              <a:rPr lang="fi-FI" dirty="0">
+                <a:solidFill>
+                  <a:schemeClr val="tx1"/>
+                </a:solidFill>
+                <a:latin typeface="Arial" charset="0"/>
+              </a:rPr>
+              <a:t>Piirrä kuvaajat samaan koordinaatistoon.</a:t>
+            </a:r>
+          </a:p>
+        </p:txBody>
+      </p:sp>
+      <p:sp>
+        <p:nvSpPr>
+          <p:cNvPr id="22" name="Suorakulmio 42"/>
+          <p:cNvSpPr/>
+          <p:nvPr/>
+        </p:nvSpPr>
+        <p:spPr>
+          <a:xfrm>
+            <a:off x="5630" y="1521947"/>
+            <a:ext cx="1074012" cy="338554"/>
+          </a:xfrm>
+          <a:prstGeom prst="rect">
+            <a:avLst/>
+          </a:prstGeom>
+          <a:solidFill>
+            <a:schemeClr val="accent2">
+              <a:lumMod val="75000"/>
+            </a:schemeClr>
+          </a:solidFill>
+        </p:spPr>
+        <p:txBody>
+          <a:bodyPr wrap="none">
+            <a:spAutoFit/>
+          </a:bodyPr>
+          <a:lstStyle/>
+          <a:p>
+            <a:r>
+              <a:rPr kumimoji="0" lang="fi-FI" sz="1600" b="0" i="0" u="none" strike="noStrike" cap="none" normalizeH="0" dirty="0">
+                <a:ln>
+                  <a:noFill/>
+                </a:ln>
+                <a:effectLst/>
+                <a:latin typeface="Arial" charset="0"/>
+              </a:rPr>
+              <a:t>Tehtävä </a:t>
+            </a:r>
+            <a:r>
+              <a:rPr lang="fi-FI" sz="1600" dirty="0">
+                <a:latin typeface="Arial" charset="0"/>
+              </a:rPr>
+              <a:t>7</a:t>
+            </a:r>
+            <a:endParaRPr lang="fi-FI" sz="1600" dirty="0"/>
+          </a:p>
+        </p:txBody>
+      </p:sp>
+      <p:pic>
+        <p:nvPicPr>
+          <p:cNvPr id="5" name="Picture 4"/>
+          <p:cNvPicPr>
+            <a:picLocks noChangeAspect="1"/>
+          </p:cNvPicPr>
+          <p:nvPr/>
+        </p:nvPicPr>
+        <p:blipFill>
+          <a:blip r:embed="rId6">
+            <a:extLst>
+              <a:ext uri="{28A0092B-C50C-407E-A947-70E740481C1C}">
+                <a14:useLocalDpi xmlns:a14="http://schemas.microsoft.com/office/drawing/2010/main" val="0"/>
+              </a:ext>
+            </a:extLst>
+          </a:blip>
+          <a:stretch>
+            <a:fillRect/>
+          </a:stretch>
+        </p:blipFill>
+        <p:spPr>
+          <a:xfrm>
+            <a:off x="2552330" y="3129048"/>
+            <a:ext cx="3583484" cy="3301073"/>
+          </a:xfrm>
+          <a:prstGeom prst="rect">
+            <a:avLst/>
+          </a:prstGeom>
+        </p:spPr>
+      </p:pic>
+    </p:spTree>
+    <p:extLst>
+      <p:ext uri="{BB962C8B-B14F-4D97-AF65-F5344CB8AC3E}">
+        <p14:creationId xmlns:p14="http://schemas.microsoft.com/office/powerpoint/2010/main" val="832155158"/>
+      </p:ext>
+    </p:extLst>
+  </p:cSld>
+  <p:clrMapOvr>
+    <a:masterClrMapping/>
+  </p:clrMapOvr>
+</p:sld>
+</file>
+
+<file path=ppt/slides/slide14.xml><?xml version="1.0" encoding="utf-8"?>
+<p:sld xmlns:a="http://schemas.openxmlformats.org/drawingml/2006/main" xmlns:r="http://schemas.openxmlformats.org/officeDocument/2006/relationships" xmlns:p="http://schemas.openxmlformats.org/presentationml/2006/main">
+  <p:cSld>
+    <p:spTree>
+      <p:nvGrpSpPr>
+        <p:cNvPr id="1" name=""/>
+        <p:cNvGrpSpPr/>
+        <p:nvPr/>
+      </p:nvGrpSpPr>
+      <p:grpSpPr>
+        <a:xfrm>
+          <a:off x="0" y="0"/>
+          <a:ext cx="0" cy="0"/>
+          <a:chOff x="0" y="0"/>
+          <a:chExt cx="0" cy="0"/>
+        </a:xfrm>
+      </p:grpSpPr>
+      <p:grpSp>
+        <p:nvGrpSpPr>
+          <p:cNvPr id="19" name="Group 18"/>
+          <p:cNvGrpSpPr/>
+          <p:nvPr/>
+        </p:nvGrpSpPr>
+        <p:grpSpPr>
+          <a:xfrm>
+            <a:off x="4589467" y="4175673"/>
+            <a:ext cx="3114506" cy="2183980"/>
+            <a:chOff x="1852612" y="923925"/>
+            <a:chExt cx="5438775" cy="5010150"/>
+          </a:xfrm>
+        </p:grpSpPr>
+        <p:pic>
+          <p:nvPicPr>
+            <p:cNvPr id="9" name="Picture 8"/>
+            <p:cNvPicPr>
+              <a:picLocks noChangeAspect="1"/>
+            </p:cNvPicPr>
+            <p:nvPr/>
+          </p:nvPicPr>
+          <p:blipFill>
+            <a:blip r:embed="rId3">
+              <a:extLst>
+                <a:ext uri="{28A0092B-C50C-407E-A947-70E740481C1C}">
+                  <a14:useLocalDpi xmlns:a14="http://schemas.microsoft.com/office/drawing/2010/main" val="0"/>
+                </a:ext>
+              </a:extLst>
+            </a:blip>
+            <a:stretch>
+              <a:fillRect/>
+            </a:stretch>
+          </p:blipFill>
+          <p:spPr>
+            <a:xfrm>
+              <a:off x="1852612" y="923925"/>
+              <a:ext cx="5438775" cy="5010150"/>
+            </a:xfrm>
+            <a:prstGeom prst="rect">
+              <a:avLst/>
+            </a:prstGeom>
+          </p:spPr>
+        </p:pic>
+        <p:pic>
+          <p:nvPicPr>
+            <p:cNvPr id="18" name="Picture 17"/>
+            <p:cNvPicPr>
+              <a:picLocks noChangeAspect="1"/>
+            </p:cNvPicPr>
+            <p:nvPr/>
+          </p:nvPicPr>
+          <p:blipFill rotWithShape="1">
+            <a:blip r:embed="rId4"/>
+            <a:srcRect l="9878" t="-8484" r="17256" b="7494"/>
+            <a:stretch/>
+          </p:blipFill>
+          <p:spPr>
+            <a:xfrm>
+              <a:off x="2212219" y="2852936"/>
+              <a:ext cx="631589" cy="221241"/>
+            </a:xfrm>
+            <a:prstGeom prst="rect">
+              <a:avLst/>
+            </a:prstGeom>
+          </p:spPr>
+        </p:pic>
+      </p:grpSp>
+      <p:grpSp>
+        <p:nvGrpSpPr>
+          <p:cNvPr id="7" name="Group 6"/>
+          <p:cNvGrpSpPr/>
+          <p:nvPr/>
+        </p:nvGrpSpPr>
+        <p:grpSpPr>
+          <a:xfrm>
+            <a:off x="1636970" y="4175353"/>
+            <a:ext cx="3060884" cy="2221175"/>
+            <a:chOff x="2137572" y="705268"/>
+            <a:chExt cx="6106835" cy="5625563"/>
+          </a:xfrm>
+        </p:grpSpPr>
+        <p:pic>
+          <p:nvPicPr>
+            <p:cNvPr id="4" name="Picture 3"/>
+            <p:cNvPicPr>
+              <a:picLocks noChangeAspect="1"/>
+            </p:cNvPicPr>
+            <p:nvPr/>
+          </p:nvPicPr>
+          <p:blipFill>
+            <a:blip r:embed="rId5">
+              <a:extLst>
+                <a:ext uri="{28A0092B-C50C-407E-A947-70E740481C1C}">
+                  <a14:useLocalDpi xmlns:a14="http://schemas.microsoft.com/office/drawing/2010/main" val="0"/>
+                </a:ext>
+              </a:extLst>
+            </a:blip>
+            <a:stretch>
+              <a:fillRect/>
+            </a:stretch>
+          </p:blipFill>
+          <p:spPr>
+            <a:xfrm>
+              <a:off x="2137572" y="705268"/>
+              <a:ext cx="6106835" cy="5625563"/>
+            </a:xfrm>
+            <a:prstGeom prst="rect">
+              <a:avLst/>
+            </a:prstGeom>
+          </p:spPr>
+        </p:pic>
+        <p:pic>
+          <p:nvPicPr>
+            <p:cNvPr id="5" name="Picture 4"/>
+            <p:cNvPicPr>
+              <a:picLocks noChangeAspect="1"/>
+            </p:cNvPicPr>
+            <p:nvPr/>
+          </p:nvPicPr>
+          <p:blipFill rotWithShape="1">
+            <a:blip r:embed="rId6"/>
+            <a:srcRect l="28324" t="-51123" r="10573" b="-21145"/>
+            <a:stretch/>
+          </p:blipFill>
+          <p:spPr>
+            <a:xfrm>
+              <a:off x="2523771" y="3333873"/>
+              <a:ext cx="683029" cy="348746"/>
+            </a:xfrm>
+            <a:prstGeom prst="rect">
+              <a:avLst/>
+            </a:prstGeom>
+          </p:spPr>
+        </p:pic>
+      </p:grpSp>
+      <p:pic>
+        <p:nvPicPr>
+          <p:cNvPr id="10" name="Picture 8" descr="https://avatars0.githubusercontent.com/u/232371?v=3&amp;s=400"/>
+          <p:cNvPicPr>
+            <a:picLocks noChangeAspect="1" noChangeArrowheads="1"/>
+          </p:cNvPicPr>
+          <p:nvPr/>
+        </p:nvPicPr>
+        <p:blipFill>
+          <a:blip r:embed="rId7" cstate="print">
+            <a:extLst>
+              <a:ext uri="{28A0092B-C50C-407E-A947-70E740481C1C}">
+                <a14:useLocalDpi xmlns:a14="http://schemas.microsoft.com/office/drawing/2010/main" val="0"/>
+              </a:ext>
+            </a:extLst>
+          </a:blip>
+          <a:srcRect/>
+          <a:stretch>
+            <a:fillRect/>
+          </a:stretch>
+        </p:blipFill>
+        <p:spPr bwMode="auto">
+          <a:xfrm>
+            <a:off x="235017" y="5306027"/>
+            <a:ext cx="1254667" cy="1254668"/>
+          </a:xfrm>
+          <a:prstGeom prst="rect">
+            <a:avLst/>
+          </a:prstGeom>
+          <a:noFill/>
+          <a:ln>
+            <a:noFill/>
+          </a:ln>
+          <a:extLst>
+            <a:ext uri="{909E8E84-426E-40DD-AFC4-6F175D3DCCD1}">
+              <a14:hiddenFill xmlns:a14="http://schemas.microsoft.com/office/drawing/2010/main">
+                <a:solidFill>
+                  <a:srgbClr val="FFFFFF"/>
+                </a:solidFill>
+              </a14:hiddenFill>
+            </a:ext>
+            <a:ext uri="{91240B29-F687-4F45-9708-019B960494DF}">
+              <a14:hiddenLine xmlns:a14="http://schemas.microsoft.com/office/drawing/2010/main" w="9525">
+                <a:solidFill>
+                  <a:srgbClr val="000000"/>
+                </a:solidFill>
+                <a:miter lim="800000"/>
+                <a:headEnd/>
+                <a:tailEnd/>
+              </a14:hiddenLine>
+            </a:ext>
+          </a:extLst>
+        </p:spPr>
+      </p:pic>
+      <p:sp>
+        <p:nvSpPr>
+          <p:cNvPr id="13" name="Suorakulmio 12"/>
+          <p:cNvSpPr/>
+          <p:nvPr/>
+        </p:nvSpPr>
+        <p:spPr bwMode="auto">
+          <a:xfrm>
+            <a:off x="5311958" y="240174"/>
+            <a:ext cx="3570371" cy="531170"/>
+          </a:xfrm>
+          <a:prstGeom prst="rect">
+            <a:avLst/>
+          </a:prstGeom>
+          <a:ln>
+            <a:headEnd type="none" w="med" len="med"/>
+            <a:tailEnd type="none" w="med" len="med"/>
+          </a:ln>
+          <a:scene3d>
+            <a:camera prst="orthographicFront"/>
+            <a:lightRig rig="threePt" dir="t"/>
+          </a:scene3d>
+          <a:sp3d>
+            <a:bevelT w="114300" prst="artDeco"/>
+          </a:sp3d>
+        </p:spPr>
+        <p:style>
+          <a:lnRef idx="2">
+            <a:schemeClr val="accent4"/>
+          </a:lnRef>
+          <a:fillRef idx="1">
+            <a:schemeClr val="lt1"/>
+          </a:fillRef>
+          <a:effectRef idx="0">
+            <a:schemeClr val="accent4"/>
+          </a:effectRef>
+          <a:fontRef idx="minor">
+            <a:schemeClr val="dk1"/>
+          </a:fontRef>
+        </p:style>
+        <p:txBody>
+          <a:bodyPr vert="horz" wrap="square" lIns="91440" tIns="45720" rIns="91440" bIns="45720" numCol="1" rtlCol="0" anchor="t" anchorCtr="0" compatLnSpc="1">
+            <a:prstTxWarp prst="textNoShape">
+              <a:avLst/>
+            </a:prstTxWarp>
+          </a:bodyPr>
+          <a:lstStyle/>
+          <a:p>
+            <a:pPr marL="0" marR="0" indent="0" algn="ctr" defTabSz="449263" rtl="0" eaLnBrk="1" fontAlgn="base" latinLnBrk="0" hangingPunct="1">
+              <a:lnSpc>
+                <a:spcPct val="100000"/>
+              </a:lnSpc>
+              <a:spcBef>
+                <a:spcPct val="0"/>
+              </a:spcBef>
+              <a:spcAft>
+                <a:spcPct val="0"/>
+              </a:spcAft>
+              <a:buClr>
+                <a:srgbClr val="000000"/>
+              </a:buClr>
+              <a:buSzPct val="100000"/>
+              <a:buFont typeface="Times New Roman" pitchFamily="16" charset="0"/>
+              <a:buNone/>
+              <a:tabLst/>
+            </a:pPr>
+            <a:r>
+              <a:rPr kumimoji="0" lang="fi-FI" sz="2400" b="0" i="0" u="none" strike="noStrike" cap="none" normalizeH="0" dirty="0">
+                <a:ln>
+                  <a:noFill/>
+                </a:ln>
+                <a:solidFill>
+                  <a:schemeClr val="tx2">
+                    <a:lumMod val="75000"/>
+                    <a:lumOff val="25000"/>
+                  </a:schemeClr>
+                </a:solidFill>
+                <a:effectLst/>
+                <a:latin typeface="Arial" charset="0"/>
+              </a:rPr>
+              <a:t>MÄÄRITTELYIKKUNA</a:t>
+            </a:r>
+            <a:endParaRPr kumimoji="0" lang="fi-FI" sz="1800" b="0" i="0" u="none" strike="noStrike" cap="none" normalizeH="0" dirty="0">
+              <a:ln>
+                <a:noFill/>
+              </a:ln>
+              <a:solidFill>
+                <a:schemeClr val="tx2">
+                  <a:lumMod val="75000"/>
+                  <a:lumOff val="25000"/>
+                </a:schemeClr>
+              </a:solidFill>
+              <a:effectLst/>
+              <a:latin typeface="Arial" charset="0"/>
+            </a:endParaRPr>
+          </a:p>
+          <a:p>
+            <a:pPr marL="0" marR="0" indent="0" algn="l" defTabSz="449263" rtl="0" eaLnBrk="1" fontAlgn="base" latinLnBrk="0" hangingPunct="1">
+              <a:lnSpc>
+                <a:spcPct val="100000"/>
+              </a:lnSpc>
+              <a:spcBef>
+                <a:spcPct val="0"/>
+              </a:spcBef>
+              <a:spcAft>
+                <a:spcPct val="0"/>
+              </a:spcAft>
+              <a:buClr>
+                <a:srgbClr val="000000"/>
+              </a:buClr>
+              <a:buSzPct val="100000"/>
+              <a:buFont typeface="Times New Roman" pitchFamily="16" charset="0"/>
+              <a:buNone/>
+              <a:tabLst/>
+            </a:pPr>
+            <a:endParaRPr kumimoji="0" lang="fi-FI" sz="1800" b="0" i="0" u="none" strike="noStrike" cap="none" normalizeH="0" dirty="0">
+              <a:ln>
+                <a:noFill/>
+              </a:ln>
+              <a:solidFill>
+                <a:schemeClr val="tx2">
+                  <a:lumMod val="75000"/>
+                  <a:lumOff val="25000"/>
+                </a:schemeClr>
+              </a:solidFill>
+              <a:effectLst/>
+              <a:latin typeface="Arial" charset="0"/>
+            </a:endParaRPr>
+          </a:p>
+        </p:txBody>
+      </p:sp>
+      <p:pic>
+        <p:nvPicPr>
+          <p:cNvPr id="42" name="Kuva 41"/>
+          <p:cNvPicPr>
+            <a:picLocks noChangeAspect="1"/>
+          </p:cNvPicPr>
+          <p:nvPr/>
+        </p:nvPicPr>
+        <p:blipFill>
+          <a:blip r:embed="rId8">
+            <a:extLst>
+              <a:ext uri="{28A0092B-C50C-407E-A947-70E740481C1C}">
+                <a14:useLocalDpi xmlns:a14="http://schemas.microsoft.com/office/drawing/2010/main" val="0"/>
+              </a:ext>
+            </a:extLst>
+          </a:blip>
+          <a:stretch>
+            <a:fillRect/>
+          </a:stretch>
+        </p:blipFill>
+        <p:spPr>
+          <a:xfrm>
+            <a:off x="8068724" y="1165451"/>
+            <a:ext cx="1075276" cy="516133"/>
+          </a:xfrm>
+          <a:prstGeom prst="rect">
+            <a:avLst/>
+          </a:prstGeom>
+        </p:spPr>
+      </p:pic>
+      <p:sp>
+        <p:nvSpPr>
+          <p:cNvPr id="3" name="Alatunnisteen paikkamerkki 2"/>
+          <p:cNvSpPr>
+            <a:spLocks noGrp="1"/>
+          </p:cNvSpPr>
+          <p:nvPr>
+            <p:ph type="ftr" sz="quarter" idx="11"/>
+          </p:nvPr>
+        </p:nvSpPr>
+        <p:spPr>
+          <a:xfrm>
+            <a:off x="755576" y="6308361"/>
+            <a:ext cx="4870585" cy="365125"/>
+          </a:xfrm>
+        </p:spPr>
+        <p:txBody>
+          <a:bodyPr/>
+          <a:lstStyle/>
+          <a:p>
+            <a:pPr algn="r">
+              <a:defRPr/>
+            </a:pPr>
+            <a:r>
+              <a:rPr lang="fi-FI" dirty="0"/>
+              <a:t>MAOL Ohjelmointia matematiikkaan</a:t>
+            </a:r>
+            <a:endParaRPr lang="ru-RU" dirty="0"/>
+          </a:p>
+        </p:txBody>
+      </p:sp>
+      <p:sp>
+        <p:nvSpPr>
+          <p:cNvPr id="35" name="Suorakulmio 34"/>
+          <p:cNvSpPr/>
+          <p:nvPr/>
+        </p:nvSpPr>
+        <p:spPr>
+          <a:xfrm>
+            <a:off x="428520" y="765364"/>
+            <a:ext cx="8391952" cy="677108"/>
+          </a:xfrm>
+          <a:prstGeom prst="rect">
+            <a:avLst/>
+          </a:prstGeom>
+        </p:spPr>
+        <p:txBody>
+          <a:bodyPr wrap="square">
+            <a:spAutoFit/>
+          </a:bodyPr>
+          <a:lstStyle/>
+          <a:p>
+            <a:r>
+              <a:rPr lang="fi-FI" sz="2200" dirty="0">
+                <a:solidFill>
+                  <a:schemeClr val="tx1"/>
+                </a:solidFill>
+                <a:latin typeface="Arial" charset="0"/>
+              </a:rPr>
+              <a:t>Pallon heitto                                          </a:t>
+            </a:r>
+            <a:r>
+              <a:rPr lang="fi-FI" sz="1600" i="1" dirty="0">
+                <a:solidFill>
+                  <a:schemeClr val="tx1"/>
+                </a:solidFill>
+                <a:latin typeface="Arial" charset="0"/>
+              </a:rPr>
+              <a:t>(vinkki: plot, points, function, range,                   </a:t>
+            </a:r>
+          </a:p>
+          <a:p>
+            <a:r>
+              <a:rPr lang="fi-FI" sz="1600" i="1" dirty="0">
+                <a:solidFill>
+                  <a:schemeClr val="tx1"/>
+                </a:solidFill>
+                <a:latin typeface="Arial" charset="0"/>
+              </a:rPr>
+              <a:t>                                                                                                map, vector, sin, cos)</a:t>
+            </a:r>
+            <a:endParaRPr lang="fi-FI" sz="1600" i="1" dirty="0">
+              <a:solidFill>
+                <a:schemeClr val="tx1"/>
+              </a:solidFill>
+            </a:endParaRPr>
+          </a:p>
+        </p:txBody>
+      </p:sp>
+      <p:pic>
+        <p:nvPicPr>
+          <p:cNvPr id="61" name="Picture 2" descr="WeScheme Logo"/>
+          <p:cNvPicPr>
+            <a:picLocks noChangeAspect="1" noChangeArrowheads="1"/>
+          </p:cNvPicPr>
+          <p:nvPr/>
+        </p:nvPicPr>
+        <p:blipFill>
+          <a:blip r:embed="rId9" cstate="print">
+            <a:extLst>
+              <a:ext uri="{28A0092B-C50C-407E-A947-70E740481C1C}">
+                <a14:useLocalDpi xmlns:a14="http://schemas.microsoft.com/office/drawing/2010/main" val="0"/>
+              </a:ext>
+            </a:extLst>
+          </a:blip>
+          <a:srcRect/>
+          <a:stretch>
+            <a:fillRect/>
+          </a:stretch>
+        </p:blipFill>
+        <p:spPr bwMode="auto">
+          <a:xfrm>
+            <a:off x="7386527" y="5180161"/>
+            <a:ext cx="1495802" cy="1383832"/>
+          </a:xfrm>
+          <a:prstGeom prst="rect">
+            <a:avLst/>
+          </a:prstGeom>
+          <a:noFill/>
+          <a:ln>
+            <a:noFill/>
+          </a:ln>
+          <a:effectLst>
+            <a:outerShdw blurRad="50800" dist="38100" dir="5400000" algn="t" rotWithShape="0">
+              <a:prstClr val="black">
+                <a:alpha val="40000"/>
+              </a:prstClr>
+            </a:outerShdw>
+          </a:effectLst>
+          <a:extLst>
+            <a:ext uri="{909E8E84-426E-40DD-AFC4-6F175D3DCCD1}">
+              <a14:hiddenFill xmlns:a14="http://schemas.microsoft.com/office/drawing/2010/main">
+                <a:solidFill>
+                  <a:srgbClr val="FFFFFF"/>
+                </a:solidFill>
+              </a14:hiddenFill>
+            </a:ext>
+            <a:ext uri="{91240B29-F687-4F45-9708-019B960494DF}">
+              <a14:hiddenLine xmlns:a14="http://schemas.microsoft.com/office/drawing/2010/main" w="9525">
+                <a:solidFill>
+                  <a:srgbClr val="000000"/>
+                </a:solidFill>
+                <a:miter lim="800000"/>
+                <a:headEnd/>
+                <a:tailEnd/>
+              </a14:hiddenLine>
+            </a:ext>
+          </a:extLst>
+        </p:spPr>
+      </p:pic>
+      <mc:AlternateContent xmlns:mc="http://schemas.openxmlformats.org/markup-compatibility/2006">
+        <mc:Choice xmlns:a14="http://schemas.microsoft.com/office/drawing/2010/main" Requires="a14">
+          <p:sp>
+            <p:nvSpPr>
+              <p:cNvPr id="16" name="Suorakulmio 34"/>
+              <p:cNvSpPr/>
+              <p:nvPr/>
+            </p:nvSpPr>
+            <p:spPr>
+              <a:xfrm>
+                <a:off x="1185635" y="1473784"/>
+                <a:ext cx="7446886" cy="2585323"/>
+              </a:xfrm>
+              <a:prstGeom prst="rect">
+                <a:avLst/>
+              </a:prstGeom>
+            </p:spPr>
+            <p:txBody>
+              <a:bodyPr wrap="square">
+                <a:spAutoFit/>
+              </a:bodyPr>
+              <a:lstStyle/>
+              <a:p>
+                <a:pPr marL="342900" indent="-342900">
+                  <a:buAutoNum type="alphaLcParenR"/>
+                </a:pPr>
+                <a:r>
+                  <a:rPr lang="fi-FI" dirty="0">
+                    <a:solidFill>
+                      <a:schemeClr val="tx1"/>
+                    </a:solidFill>
+                    <a:latin typeface="Arial" charset="0"/>
+                  </a:rPr>
+                  <a:t>Tutki oheisen koodin avulla pallon liikettä ajansuhteen eri lähtönopeuksilla ja heittokulmilla piirrä tulokset samaan aika-korkeus kuvaajaan (B kohta). Piirrä vähintään kolme heittoa.</a:t>
+                </a:r>
+              </a:p>
+              <a:p>
+                <a:pPr marL="342900" indent="-342900">
+                  <a:buAutoNum type="alphaLcParenR"/>
+                </a:pPr>
+                <a:r>
+                  <a:rPr lang="fi-FI" dirty="0">
+                    <a:solidFill>
+                      <a:schemeClr val="tx1"/>
+                    </a:solidFill>
+                    <a:latin typeface="Arial" charset="0"/>
+                  </a:rPr>
+                  <a:t>Edelliset tulokset eivät vielä kerro siitä kuinka pitkälle pallot lensivät (kuvaajasta voi lukea vain korkeuden). Jos kuvaajan x-akseliksi valitaan matka ja lasketaan se funktion </a:t>
+                </a:r>
+                <a14:m>
+                  <m:oMath xmlns:m="http://schemas.openxmlformats.org/officeDocument/2006/math">
+                    <m:r>
+                      <a:rPr lang="fi-FI" b="0" i="1" smtClean="0">
+                        <a:solidFill>
+                          <a:schemeClr val="tx1"/>
+                        </a:solidFill>
+                        <a:latin typeface="Cambria Math" panose="02040503050406030204" pitchFamily="18" charset="0"/>
+                      </a:rPr>
+                      <m:t>𝑠</m:t>
+                    </m:r>
+                    <m:d>
+                      <m:dPr>
+                        <m:ctrlPr>
+                          <a:rPr lang="fi-FI" b="0" i="1" smtClean="0">
+                            <a:solidFill>
+                              <a:schemeClr val="tx1"/>
+                            </a:solidFill>
+                            <a:latin typeface="Cambria Math" panose="02040503050406030204" pitchFamily="18" charset="0"/>
+                          </a:rPr>
+                        </m:ctrlPr>
+                      </m:dPr>
+                      <m:e>
+                        <m:r>
+                          <a:rPr lang="fi-FI" b="0" i="1" smtClean="0">
+                            <a:solidFill>
+                              <a:schemeClr val="tx1"/>
+                            </a:solidFill>
+                            <a:latin typeface="Cambria Math" panose="02040503050406030204" pitchFamily="18" charset="0"/>
+                          </a:rPr>
+                          <m:t>𝑡</m:t>
+                        </m:r>
+                      </m:e>
+                    </m:d>
+                    <m:r>
+                      <a:rPr lang="fi-FI" b="0" i="1" smtClean="0">
+                        <a:solidFill>
+                          <a:schemeClr val="tx1"/>
+                        </a:solidFill>
+                        <a:latin typeface="Cambria Math" panose="02040503050406030204" pitchFamily="18" charset="0"/>
+                      </a:rPr>
+                      <m:t>=</m:t>
+                    </m:r>
+                    <m:sSub>
+                      <m:sSubPr>
+                        <m:ctrlPr>
+                          <a:rPr lang="fi-FI" b="0" i="1" smtClean="0">
+                            <a:solidFill>
+                              <a:schemeClr val="tx1"/>
+                            </a:solidFill>
+                            <a:latin typeface="Cambria Math" panose="02040503050406030204" pitchFamily="18" charset="0"/>
+                          </a:rPr>
+                        </m:ctrlPr>
+                      </m:sSubPr>
+                      <m:e>
+                        <m:r>
+                          <a:rPr lang="fi-FI" b="0" i="1" smtClean="0">
+                            <a:solidFill>
+                              <a:schemeClr val="tx1"/>
+                            </a:solidFill>
+                            <a:latin typeface="Cambria Math" panose="02040503050406030204" pitchFamily="18" charset="0"/>
+                          </a:rPr>
+                          <m:t>𝑣</m:t>
+                        </m:r>
+                      </m:e>
+                      <m:sub>
+                        <m:r>
+                          <a:rPr lang="fi-FI" b="0" i="1" smtClean="0">
+                            <a:solidFill>
+                              <a:schemeClr val="tx1"/>
+                            </a:solidFill>
+                            <a:latin typeface="Cambria Math" panose="02040503050406030204" pitchFamily="18" charset="0"/>
+                          </a:rPr>
+                          <m:t>0</m:t>
+                        </m:r>
+                        <m:r>
+                          <a:rPr lang="fi-FI" b="0" i="1" smtClean="0">
+                            <a:solidFill>
+                              <a:schemeClr val="tx1"/>
+                            </a:solidFill>
+                            <a:latin typeface="Cambria Math" panose="02040503050406030204" pitchFamily="18" charset="0"/>
+                          </a:rPr>
+                          <m:t>𝑥</m:t>
+                        </m:r>
+                      </m:sub>
+                    </m:sSub>
+                    <m:r>
+                      <a:rPr lang="fi-FI" b="0" i="1" smtClean="0">
+                        <a:solidFill>
+                          <a:schemeClr val="tx1"/>
+                        </a:solidFill>
+                        <a:latin typeface="Cambria Math" panose="02040503050406030204" pitchFamily="18" charset="0"/>
+                      </a:rPr>
+                      <m:t>𝑡</m:t>
+                    </m:r>
+                  </m:oMath>
+                </a14:m>
+                <a:r>
+                  <a:rPr lang="fi-FI" dirty="0">
+                    <a:solidFill>
+                      <a:schemeClr val="tx1"/>
+                    </a:solidFill>
+                    <a:latin typeface="Arial" charset="0"/>
+                  </a:rPr>
+                  <a:t> avulla saadaan tieto myös siitä mikä palloista lensi pisimmälle. </a:t>
+                </a:r>
+              </a:p>
+              <a:p>
+                <a:r>
+                  <a:rPr lang="fi-FI" dirty="0">
+                    <a:solidFill>
+                      <a:schemeClr val="tx1"/>
+                    </a:solidFill>
+                    <a:latin typeface="Arial" charset="0"/>
+                  </a:rPr>
+                  <a:t>     Saatko selville mikä kohdan a) heitoista lensi pisimmälle</a:t>
+                </a:r>
+              </a:p>
+              <a:p>
+                <a:r>
+                  <a:rPr lang="fi-FI" dirty="0">
+                    <a:solidFill>
+                      <a:schemeClr val="tx1"/>
+                    </a:solidFill>
+                    <a:latin typeface="Arial" charset="0"/>
+                  </a:rPr>
+                  <a:t>     (C kohta)? </a:t>
+                </a:r>
+              </a:p>
+            </p:txBody>
+          </p:sp>
+        </mc:Choice>
+        <mc:Fallback>
+          <p:sp>
+            <p:nvSpPr>
+              <p:cNvPr id="16" name="Suorakulmio 34"/>
+              <p:cNvSpPr>
+                <a:spLocks noRot="1" noChangeAspect="1" noMove="1" noResize="1" noEditPoints="1" noAdjustHandles="1" noChangeArrowheads="1" noChangeShapeType="1" noTextEdit="1"/>
+              </p:cNvSpPr>
+              <p:nvPr/>
+            </p:nvSpPr>
+            <p:spPr>
+              <a:xfrm>
+                <a:off x="1185635" y="1473784"/>
+                <a:ext cx="7446886" cy="2585323"/>
+              </a:xfrm>
+              <a:prstGeom prst="rect">
+                <a:avLst/>
+              </a:prstGeom>
+              <a:blipFill>
+                <a:blip r:embed="rId10"/>
+                <a:stretch>
+                  <a:fillRect l="-491" t="-1415" b="-2830"/>
+                </a:stretch>
+              </a:blipFill>
+            </p:spPr>
+            <p:txBody>
+              <a:bodyPr/>
+              <a:lstStyle/>
+              <a:p>
+                <a:r>
+                  <a:rPr lang="fi-FI">
+                    <a:noFill/>
+                  </a:rPr>
+                  <a:t> </a:t>
+                </a:r>
+              </a:p>
+            </p:txBody>
+          </p:sp>
+        </mc:Fallback>
+      </mc:AlternateContent>
+      <p:sp>
+        <p:nvSpPr>
+          <p:cNvPr id="24" name="Suorakulmio 42"/>
+          <p:cNvSpPr/>
+          <p:nvPr/>
+        </p:nvSpPr>
+        <p:spPr>
+          <a:xfrm>
+            <a:off x="26159" y="1502490"/>
+            <a:ext cx="1074012" cy="338554"/>
+          </a:xfrm>
+          <a:prstGeom prst="rect">
+            <a:avLst/>
+          </a:prstGeom>
+          <a:solidFill>
+            <a:schemeClr val="accent2">
+              <a:lumMod val="75000"/>
+            </a:schemeClr>
+          </a:solidFill>
+        </p:spPr>
+        <p:txBody>
+          <a:bodyPr wrap="none">
+            <a:spAutoFit/>
+          </a:bodyPr>
+          <a:lstStyle/>
+          <a:p>
+            <a:r>
+              <a:rPr kumimoji="0" lang="fi-FI" sz="1600" b="0" i="0" u="none" strike="noStrike" cap="none" normalizeH="0" dirty="0">
+                <a:ln>
+                  <a:noFill/>
+                </a:ln>
+                <a:effectLst/>
+                <a:latin typeface="Arial" charset="0"/>
+              </a:rPr>
+              <a:t>Tehtävä </a:t>
+            </a:r>
+            <a:r>
+              <a:rPr lang="fi-FI" sz="1600" dirty="0">
+                <a:latin typeface="Arial" charset="0"/>
+              </a:rPr>
+              <a:t>8</a:t>
+            </a:r>
+            <a:endParaRPr lang="fi-FI" sz="1600" dirty="0"/>
+          </a:p>
+        </p:txBody>
+      </p:sp>
+    </p:spTree>
+    <p:extLst>
+      <p:ext uri="{BB962C8B-B14F-4D97-AF65-F5344CB8AC3E}">
+        <p14:creationId xmlns:p14="http://schemas.microsoft.com/office/powerpoint/2010/main" val="1180608202"/>
       </p:ext>
     </p:extLst>
   </p:cSld>
@@ -16014,17 +20397,11 @@
               </a:rPr>
               <a:t>Kirjoita kunkin koululaisen kävelyyn liittyvä funktio ja piirrä kuvaajat samaan aika/matka koordinaatistoon. </a:t>
             </a:r>
-            <a:endParaRPr lang="fi-FI" sz="2200" dirty="0">
-              <a:solidFill>
-                <a:schemeClr val="tx1"/>
-              </a:solidFill>
-              <a:latin typeface="Arial" charset="0"/>
-            </a:endParaRPr>
-          </a:p>
-        </p:txBody>
-      </p:sp>
-      <mc:AlternateContent xmlns:mc="http://schemas.openxmlformats.org/markup-compatibility/2006">
-        <mc:Choice xmlns:a14="http://schemas.microsoft.com/office/drawing/2010/main" Requires="a14">
+          </a:p>
+        </p:txBody>
+      </p:sp>
+      <mc:AlternateContent xmlns:mc="http://schemas.openxmlformats.org/markup-compatibility/2006" xmlns:a14="http://schemas.microsoft.com/office/drawing/2010/main">
+        <mc:Choice Requires="a14">
           <p:sp>
             <p:nvSpPr>
               <p:cNvPr id="16" name="Suorakulmio 34"/>
@@ -16236,7 +20613,7 @@
             </p:txBody>
           </p:sp>
         </mc:Choice>
-        <mc:Fallback>
+        <mc:Fallback xmlns="">
           <p:sp>
             <p:nvSpPr>
               <p:cNvPr id="16" name="Suorakulmio 34"/>
@@ -16324,7 +20701,7 @@
 <file path=ppt/tags/tag1.xml><?xml version="1.0" encoding="utf-8"?>
 <p:tagLst xmlns:a="http://schemas.openxmlformats.org/drawingml/2006/main" xmlns:r="http://schemas.openxmlformats.org/officeDocument/2006/relationships" xmlns:p="http://schemas.openxmlformats.org/presentationml/2006/main">
   <p:tag name="MMPROD_NEXTUNIQUEID" val="10009"/>
-  <p:tag name="MMPROD_UIDATA" val="&lt;database version=&quot;10.0&quot;&gt;&lt;object type=&quot;1&quot; unique_id=&quot;10001&quot;&gt;&lt;object type=&quot;2&quot; unique_id=&quot;10002&quot;&gt;&lt;object type=&quot;3&quot; unique_id=&quot;11647&quot;&gt;&lt;property id=&quot;20148&quot; value=&quot;5&quot;/&gt;&lt;property id=&quot;20300&quot; value=&quot;Slide 5&quot;/&gt;&lt;property id=&quot;20307&quot; value=&quot;398&quot;/&gt;&lt;/object&gt;&lt;object type=&quot;3&quot; unique_id=&quot;16793&quot;&gt;&lt;property id=&quot;20148&quot; value=&quot;5&quot;/&gt;&lt;property id=&quot;20300&quot; value=&quot;Slide 9&quot;/&gt;&lt;property id=&quot;20307&quot; value=&quot;439&quot;/&gt;&lt;/object&gt;&lt;object type=&quot;3&quot; unique_id=&quot;19218&quot;&gt;&lt;property id=&quot;20148&quot; value=&quot;5&quot;/&gt;&lt;property id=&quot;20300&quot; value=&quot;Slide 6&quot;/&gt;&lt;property id=&quot;20307&quot; value=&quot;440&quot;/&gt;&lt;/object&gt;&lt;object type=&quot;3&quot; unique_id=&quot;19280&quot;&gt;&lt;property id=&quot;20148&quot; value=&quot;5&quot;/&gt;&lt;property id=&quot;20300&quot; value=&quot;Slide 1&quot;/&gt;&lt;property id=&quot;20307&quot; value=&quot;442&quot;/&gt;&lt;/object&gt;&lt;object type=&quot;3&quot; unique_id=&quot;19281&quot;&gt;&lt;property id=&quot;20148&quot; value=&quot;5&quot;/&gt;&lt;property id=&quot;20300&quot; value=&quot;Slide 2&quot;/&gt;&lt;property id=&quot;20307&quot; value=&quot;443&quot;/&gt;&lt;/object&gt;&lt;object type=&quot;3&quot; unique_id=&quot;19282&quot;&gt;&lt;property id=&quot;20148&quot; value=&quot;5&quot;/&gt;&lt;property id=&quot;20300&quot; value=&quot;Slide 7&quot;/&gt;&lt;property id=&quot;20307&quot; value=&quot;441&quot;/&gt;&lt;/object&gt;&lt;object type=&quot;3&quot; unique_id=&quot;19315&quot;&gt;&lt;property id=&quot;20148&quot; value=&quot;5&quot;/&gt;&lt;property id=&quot;20300&quot; value=&quot;Slide 3&quot;/&gt;&lt;property id=&quot;20307&quot; value=&quot;444&quot;/&gt;&lt;/object&gt;&lt;object type=&quot;3&quot; unique_id=&quot;19397&quot;&gt;&lt;property id=&quot;20148&quot; value=&quot;5&quot;/&gt;&lt;property id=&quot;20300&quot; value=&quot;Slide 4&quot;/&gt;&lt;property id=&quot;20307&quot; value=&quot;445&quot;/&gt;&lt;/object&gt;&lt;object type=&quot;3&quot; unique_id=&quot;19548&quot;&gt;&lt;property id=&quot;20148&quot; value=&quot;5&quot;/&gt;&lt;property id=&quot;20300&quot; value=&quot;Slide 8&quot;/&gt;&lt;property id=&quot;20307&quot; value=&quot;446&quot;/&gt;&lt;/object&gt;&lt;object type=&quot;3&quot; unique_id=&quot;19802&quot;&gt;&lt;property id=&quot;20148&quot; value=&quot;5&quot;/&gt;&lt;property id=&quot;20300&quot; value=&quot;Slide 10&quot;/&gt;&lt;property id=&quot;20307&quot; value=&quot;447&quot;/&gt;&lt;/object&gt;&lt;/object&gt;&lt;object type=&quot;8&quot; unique_id=&quot;10028&quot;&gt;&lt;/object&gt;&lt;/object&gt;&lt;/database&gt;"/>
+  <p:tag name="MMPROD_UIDATA" val="&lt;database version=&quot;10.0&quot;&gt;&lt;object type=&quot;1&quot; unique_id=&quot;10001&quot;&gt;&lt;object type=&quot;2&quot; unique_id=&quot;10002&quot;&gt;&lt;object type=&quot;3&quot; unique_id=&quot;11647&quot;&gt;&lt;property id=&quot;20148&quot; value=&quot;5&quot;/&gt;&lt;property id=&quot;20300&quot; value=&quot;Slide 5&quot;/&gt;&lt;property id=&quot;20307&quot; value=&quot;398&quot;/&gt;&lt;/object&gt;&lt;object type=&quot;3&quot; unique_id=&quot;16793&quot;&gt;&lt;property id=&quot;20148&quot; value=&quot;5&quot;/&gt;&lt;property id=&quot;20300&quot; value=&quot;Slide 9&quot;/&gt;&lt;property id=&quot;20307&quot; value=&quot;439&quot;/&gt;&lt;/object&gt;&lt;object type=&quot;3&quot; unique_id=&quot;19218&quot;&gt;&lt;property id=&quot;20148&quot; value=&quot;5&quot;/&gt;&lt;property id=&quot;20300&quot; value=&quot;Slide 6&quot;/&gt;&lt;property id=&quot;20307&quot; value=&quot;440&quot;/&gt;&lt;/object&gt;&lt;object type=&quot;3&quot; unique_id=&quot;19280&quot;&gt;&lt;property id=&quot;20148&quot; value=&quot;5&quot;/&gt;&lt;property id=&quot;20300&quot; value=&quot;Slide 1&quot;/&gt;&lt;property id=&quot;20307&quot; value=&quot;442&quot;/&gt;&lt;/object&gt;&lt;object type=&quot;3&quot; unique_id=&quot;19281&quot;&gt;&lt;property id=&quot;20148&quot; value=&quot;5&quot;/&gt;&lt;property id=&quot;20300&quot; value=&quot;Slide 2&quot;/&gt;&lt;property id=&quot;20307&quot; value=&quot;443&quot;/&gt;&lt;/object&gt;&lt;object type=&quot;3&quot; unique_id=&quot;19282&quot;&gt;&lt;property id=&quot;20148&quot; value=&quot;5&quot;/&gt;&lt;property id=&quot;20300&quot; value=&quot;Slide 7&quot;/&gt;&lt;property id=&quot;20307&quot; value=&quot;441&quot;/&gt;&lt;/object&gt;&lt;object type=&quot;3&quot; unique_id=&quot;19315&quot;&gt;&lt;property id=&quot;20148&quot; value=&quot;5&quot;/&gt;&lt;property id=&quot;20300&quot; value=&quot;Slide 3&quot;/&gt;&lt;property id=&quot;20307&quot; value=&quot;444&quot;/&gt;&lt;/object&gt;&lt;object type=&quot;3&quot; unique_id=&quot;19397&quot;&gt;&lt;property id=&quot;20148&quot; value=&quot;5&quot;/&gt;&lt;property id=&quot;20300&quot; value=&quot;Slide 4&quot;/&gt;&lt;property id=&quot;20307&quot; value=&quot;445&quot;/&gt;&lt;/object&gt;&lt;object type=&quot;3&quot; unique_id=&quot;19548&quot;&gt;&lt;property id=&quot;20148&quot; value=&quot;5&quot;/&gt;&lt;property id=&quot;20300&quot; value=&quot;Slide 8&quot;/&gt;&lt;property id=&quot;20307&quot; value=&quot;446&quot;/&gt;&lt;/object&gt;&lt;object type=&quot;3&quot; unique_id=&quot;19802&quot;&gt;&lt;property id=&quot;20148&quot; value=&quot;5&quot;/&gt;&lt;property id=&quot;20300&quot; value=&quot;Slide 10&quot;/&gt;&lt;property id=&quot;20307&quot; value=&quot;447&quot;/&gt;&lt;/object&gt;&lt;object type=&quot;3&quot; unique_id=&quot;19828&quot;&gt;&lt;property id=&quot;20148&quot; value=&quot;5&quot;/&gt;&lt;property id=&quot;20300&quot; value=&quot;Slide 11&quot;/&gt;&lt;property id=&quot;20307&quot; value=&quot;448&quot;/&gt;&lt;/object&gt;&lt;object type=&quot;3&quot; unique_id=&quot;19972&quot;&gt;&lt;property id=&quot;20148&quot; value=&quot;5&quot;/&gt;&lt;property id=&quot;20300&quot; value=&quot;Slide 12&quot;/&gt;&lt;property id=&quot;20307&quot; value=&quot;449&quot;/&gt;&lt;/object&gt;&lt;object type=&quot;3&quot; unique_id=&quot;20043&quot;&gt;&lt;property id=&quot;20148&quot; value=&quot;5&quot;/&gt;&lt;property id=&quot;20300&quot; value=&quot;Slide 13&quot;/&gt;&lt;property id=&quot;20307&quot; value=&quot;450&quot;/&gt;&lt;/object&gt;&lt;object type=&quot;3&quot; unique_id=&quot;20329&quot;&gt;&lt;property id=&quot;20148&quot; value=&quot;5&quot;/&gt;&lt;property id=&quot;20300&quot; value=&quot;Slide 14&quot;/&gt;&lt;property id=&quot;20307&quot; value=&quot;451&quot;/&gt;&lt;/object&gt;&lt;/object&gt;&lt;object type=&quot;8&quot; unique_id=&quot;10028&quot;&gt;&lt;/object&gt;&lt;/object&gt;&lt;/database&gt;"/>
   <p:tag name="SECTOMILLISECCONVERTED" val="1"/>
 </p:tagLst>
 </file>

</xml_diff>

<commit_message>
Added files for Maol
</commit_message>
<xml_diff>
--- a/tehtavat/tiedostot/maol/power_point/Racket-MAOL-9-funktiot.pptx
+++ b/tehtavat/tiedostot/maol/power_point/Racket-MAOL-9-funktiot.pptx
@@ -6,7 +6,7 @@
     <p:sldMasterId id="2147483703" r:id="rId2"/>
   </p:sldMasterIdLst>
   <p:notesMasterIdLst>
-    <p:notesMasterId r:id="rId30"/>
+    <p:notesMasterId r:id="rId31"/>
   </p:notesMasterIdLst>
   <p:sldIdLst>
     <p:sldId id="398" r:id="rId3"/>
@@ -35,12 +35,13 @@
     <p:sldId id="461" r:id="rId26"/>
     <p:sldId id="463" r:id="rId27"/>
     <p:sldId id="464" r:id="rId28"/>
-    <p:sldId id="452" r:id="rId29"/>
+    <p:sldId id="465" r:id="rId29"/>
+    <p:sldId id="452" r:id="rId30"/>
   </p:sldIdLst>
   <p:sldSz cx="9144000" cy="6858000" type="screen4x3"/>
   <p:notesSz cx="6858000" cy="9144000"/>
   <p:custDataLst>
-    <p:tags r:id="rId31"/>
+    <p:tags r:id="rId32"/>
   </p:custDataLst>
   <p:defaultTextStyle>
     <a:defPPr>
@@ -198,6 +199,10 @@
     </p:ext>
   </p:extLst>
 </p:presentation>
+</file>
+
+<file path=ppt/revisionInfo.xml><?xml version="1.0" encoding="utf-8"?>
+<p1510:revInfo xmlns:a="http://schemas.openxmlformats.org/drawingml/2006/main" xmlns:r="http://schemas.openxmlformats.org/officeDocument/2006/relationships" xmlns:p1510="http://schemas.microsoft.com/office/powerpoint/2015/10/main"/>
 </file>
 
 <file path=ppt/notesMasters/notesMaster1.xml><?xml version="1.0" encoding="utf-8"?>
@@ -827,6 +832,72 @@
     <p:extLst>
       <p:ext uri="{BB962C8B-B14F-4D97-AF65-F5344CB8AC3E}">
         <p14:creationId xmlns:p14="http://schemas.microsoft.com/office/powerpoint/2010/main" val="1536123519"/>
+      </p:ext>
+    </p:extLst>
+  </p:cSld>
+  <p:clrMapOvr>
+    <a:masterClrMapping/>
+  </p:clrMapOvr>
+</p:notes>
+</file>
+
+<file path=ppt/notesSlides/notesSlide13.xml><?xml version="1.0" encoding="utf-8"?>
+<p:notes xmlns:a="http://schemas.openxmlformats.org/drawingml/2006/main" xmlns:r="http://schemas.openxmlformats.org/officeDocument/2006/relationships" xmlns:p="http://schemas.openxmlformats.org/presentationml/2006/main">
+  <p:cSld>
+    <p:spTree>
+      <p:nvGrpSpPr>
+        <p:cNvPr id="1" name=""/>
+        <p:cNvGrpSpPr/>
+        <p:nvPr/>
+      </p:nvGrpSpPr>
+      <p:grpSpPr>
+        <a:xfrm>
+          <a:off x="0" y="0"/>
+          <a:ext cx="0" cy="0"/>
+          <a:chOff x="0" y="0"/>
+          <a:chExt cx="0" cy="0"/>
+        </a:xfrm>
+      </p:grpSpPr>
+      <p:sp>
+        <p:nvSpPr>
+          <p:cNvPr id="2" name="Slide Image Placeholder 1"/>
+          <p:cNvSpPr>
+            <a:spLocks noGrp="1" noRot="1" noChangeAspect="1"/>
+          </p:cNvSpPr>
+          <p:nvPr>
+            <p:ph type="sldImg"/>
+          </p:nvPr>
+        </p:nvSpPr>
+        <p:spPr>
+          <a:xfrm>
+            <a:off x="-14225588" y="-11796713"/>
+            <a:ext cx="16649701" cy="12488863"/>
+          </a:xfrm>
+        </p:spPr>
+      </p:sp>
+      <p:sp>
+        <p:nvSpPr>
+          <p:cNvPr id="3" name="Notes Placeholder 2"/>
+          <p:cNvSpPr>
+            <a:spLocks noGrp="1"/>
+          </p:cNvSpPr>
+          <p:nvPr>
+            <p:ph type="body" idx="1"/>
+          </p:nvPr>
+        </p:nvSpPr>
+        <p:spPr/>
+        <p:txBody>
+          <a:bodyPr/>
+          <a:lstStyle/>
+          <a:p>
+            <a:endParaRPr lang="fi-FI" dirty="0"/>
+          </a:p>
+        </p:txBody>
+      </p:sp>
+    </p:spTree>
+    <p:extLst>
+      <p:ext uri="{BB962C8B-B14F-4D97-AF65-F5344CB8AC3E}">
+        <p14:creationId xmlns:p14="http://schemas.microsoft.com/office/powerpoint/2010/main" val="2513922605"/>
       </p:ext>
     </p:extLst>
   </p:cSld>
@@ -25406,6 +25477,757 @@
           <a:chExt cx="0" cy="0"/>
         </a:xfrm>
       </p:grpSpPr>
+      <p:pic>
+        <p:nvPicPr>
+          <p:cNvPr id="10" name="Picture 8" descr="https://avatars0.githubusercontent.com/u/232371?v=3&amp;s=400"/>
+          <p:cNvPicPr>
+            <a:picLocks noChangeAspect="1" noChangeArrowheads="1"/>
+          </p:cNvPicPr>
+          <p:nvPr/>
+        </p:nvPicPr>
+        <p:blipFill>
+          <a:blip r:embed="rId3" cstate="print">
+            <a:extLst>
+              <a:ext uri="{28A0092B-C50C-407E-A947-70E740481C1C}">
+                <a14:useLocalDpi xmlns:a14="http://schemas.microsoft.com/office/drawing/2010/main" val="0"/>
+              </a:ext>
+            </a:extLst>
+          </a:blip>
+          <a:srcRect/>
+          <a:stretch>
+            <a:fillRect/>
+          </a:stretch>
+        </p:blipFill>
+        <p:spPr bwMode="auto">
+          <a:xfrm>
+            <a:off x="235017" y="5306027"/>
+            <a:ext cx="1254667" cy="1254668"/>
+          </a:xfrm>
+          <a:prstGeom prst="rect">
+            <a:avLst/>
+          </a:prstGeom>
+          <a:noFill/>
+          <a:ln>
+            <a:noFill/>
+          </a:ln>
+          <a:extLst>
+            <a:ext uri="{909E8E84-426E-40DD-AFC4-6F175D3DCCD1}">
+              <a14:hiddenFill xmlns:a14="http://schemas.microsoft.com/office/drawing/2010/main">
+                <a:solidFill>
+                  <a:srgbClr val="FFFFFF"/>
+                </a:solidFill>
+              </a14:hiddenFill>
+            </a:ext>
+            <a:ext uri="{91240B29-F687-4F45-9708-019B960494DF}">
+              <a14:hiddenLine xmlns:a14="http://schemas.microsoft.com/office/drawing/2010/main" w="9525">
+                <a:solidFill>
+                  <a:srgbClr val="000000"/>
+                </a:solidFill>
+                <a:miter lim="800000"/>
+                <a:headEnd/>
+                <a:tailEnd/>
+              </a14:hiddenLine>
+            </a:ext>
+          </a:extLst>
+        </p:spPr>
+      </p:pic>
+      <p:sp>
+        <p:nvSpPr>
+          <p:cNvPr id="13" name="Suorakulmio 12"/>
+          <p:cNvSpPr/>
+          <p:nvPr/>
+        </p:nvSpPr>
+        <p:spPr bwMode="auto">
+          <a:xfrm>
+            <a:off x="5311958" y="240174"/>
+            <a:ext cx="3570371" cy="531170"/>
+          </a:xfrm>
+          <a:prstGeom prst="rect">
+            <a:avLst/>
+          </a:prstGeom>
+          <a:ln>
+            <a:headEnd type="none" w="med" len="med"/>
+            <a:tailEnd type="none" w="med" len="med"/>
+          </a:ln>
+          <a:scene3d>
+            <a:camera prst="orthographicFront"/>
+            <a:lightRig rig="threePt" dir="t"/>
+          </a:scene3d>
+          <a:sp3d>
+            <a:bevelT w="114300" prst="artDeco"/>
+          </a:sp3d>
+        </p:spPr>
+        <p:style>
+          <a:lnRef idx="2">
+            <a:schemeClr val="accent4"/>
+          </a:lnRef>
+          <a:fillRef idx="1">
+            <a:schemeClr val="lt1"/>
+          </a:fillRef>
+          <a:effectRef idx="0">
+            <a:schemeClr val="accent4"/>
+          </a:effectRef>
+          <a:fontRef idx="minor">
+            <a:schemeClr val="dk1"/>
+          </a:fontRef>
+        </p:style>
+        <p:txBody>
+          <a:bodyPr vert="horz" wrap="square" lIns="91440" tIns="45720" rIns="91440" bIns="45720" numCol="1" rtlCol="0" anchor="t" anchorCtr="0" compatLnSpc="1">
+            <a:prstTxWarp prst="textNoShape">
+              <a:avLst/>
+            </a:prstTxWarp>
+          </a:bodyPr>
+          <a:lstStyle/>
+          <a:p>
+            <a:pPr marL="0" marR="0" indent="0" algn="ctr" defTabSz="449263" rtl="0" eaLnBrk="1" fontAlgn="base" latinLnBrk="0" hangingPunct="1">
+              <a:lnSpc>
+                <a:spcPct val="100000"/>
+              </a:lnSpc>
+              <a:spcBef>
+                <a:spcPct val="0"/>
+              </a:spcBef>
+              <a:spcAft>
+                <a:spcPct val="0"/>
+              </a:spcAft>
+              <a:buClr>
+                <a:srgbClr val="000000"/>
+              </a:buClr>
+              <a:buSzPct val="100000"/>
+              <a:buFont typeface="Times New Roman" pitchFamily="16" charset="0"/>
+              <a:buNone/>
+              <a:tabLst/>
+            </a:pPr>
+            <a:r>
+              <a:rPr kumimoji="0" lang="fi-FI" sz="2400" b="0" i="0" u="none" strike="noStrike" cap="none" normalizeH="0" dirty="0">
+                <a:ln>
+                  <a:noFill/>
+                </a:ln>
+                <a:solidFill>
+                  <a:schemeClr val="tx2">
+                    <a:lumMod val="75000"/>
+                    <a:lumOff val="25000"/>
+                  </a:schemeClr>
+                </a:solidFill>
+                <a:effectLst/>
+                <a:latin typeface="Arial" charset="0"/>
+              </a:rPr>
+              <a:t>MÄÄRITTELYIKKUNA</a:t>
+            </a:r>
+            <a:endParaRPr kumimoji="0" lang="fi-FI" sz="1800" b="0" i="0" u="none" strike="noStrike" cap="none" normalizeH="0" dirty="0">
+              <a:ln>
+                <a:noFill/>
+              </a:ln>
+              <a:solidFill>
+                <a:schemeClr val="tx2">
+                  <a:lumMod val="75000"/>
+                  <a:lumOff val="25000"/>
+                </a:schemeClr>
+              </a:solidFill>
+              <a:effectLst/>
+              <a:latin typeface="Arial" charset="0"/>
+            </a:endParaRPr>
+          </a:p>
+          <a:p>
+            <a:pPr marL="0" marR="0" indent="0" algn="l" defTabSz="449263" rtl="0" eaLnBrk="1" fontAlgn="base" latinLnBrk="0" hangingPunct="1">
+              <a:lnSpc>
+                <a:spcPct val="100000"/>
+              </a:lnSpc>
+              <a:spcBef>
+                <a:spcPct val="0"/>
+              </a:spcBef>
+              <a:spcAft>
+                <a:spcPct val="0"/>
+              </a:spcAft>
+              <a:buClr>
+                <a:srgbClr val="000000"/>
+              </a:buClr>
+              <a:buSzPct val="100000"/>
+              <a:buFont typeface="Times New Roman" pitchFamily="16" charset="0"/>
+              <a:buNone/>
+              <a:tabLst/>
+            </a:pPr>
+            <a:endParaRPr kumimoji="0" lang="fi-FI" sz="1800" b="0" i="0" u="none" strike="noStrike" cap="none" normalizeH="0" dirty="0">
+              <a:ln>
+                <a:noFill/>
+              </a:ln>
+              <a:solidFill>
+                <a:schemeClr val="tx2">
+                  <a:lumMod val="75000"/>
+                  <a:lumOff val="25000"/>
+                </a:schemeClr>
+              </a:solidFill>
+              <a:effectLst/>
+              <a:latin typeface="Arial" charset="0"/>
+            </a:endParaRPr>
+          </a:p>
+        </p:txBody>
+      </p:sp>
+      <p:sp>
+        <p:nvSpPr>
+          <p:cNvPr id="43" name="Suorakulmio 42"/>
+          <p:cNvSpPr/>
+          <p:nvPr/>
+        </p:nvSpPr>
+        <p:spPr>
+          <a:xfrm>
+            <a:off x="0" y="1805223"/>
+            <a:ext cx="1074012" cy="338554"/>
+          </a:xfrm>
+          <a:prstGeom prst="rect">
+            <a:avLst/>
+          </a:prstGeom>
+          <a:solidFill>
+            <a:schemeClr val="accent2">
+              <a:lumMod val="75000"/>
+            </a:schemeClr>
+          </a:solidFill>
+        </p:spPr>
+        <p:txBody>
+          <a:bodyPr wrap="none">
+            <a:spAutoFit/>
+          </a:bodyPr>
+          <a:lstStyle/>
+          <a:p>
+            <a:r>
+              <a:rPr kumimoji="0" lang="fi-FI" sz="1600" b="0" i="0" u="none" strike="noStrike" cap="none" normalizeH="0" dirty="0">
+                <a:ln>
+                  <a:noFill/>
+                </a:ln>
+                <a:effectLst/>
+                <a:latin typeface="Arial" charset="0"/>
+              </a:rPr>
+              <a:t>Tehtävä </a:t>
+            </a:r>
+            <a:r>
+              <a:rPr lang="fi-FI" sz="1600" dirty="0">
+                <a:latin typeface="Arial" charset="0"/>
+              </a:rPr>
+              <a:t>1</a:t>
+            </a:r>
+            <a:endParaRPr lang="fi-FI" sz="1600" dirty="0"/>
+          </a:p>
+        </p:txBody>
+      </p:sp>
+      <p:pic>
+        <p:nvPicPr>
+          <p:cNvPr id="42" name="Kuva 41"/>
+          <p:cNvPicPr>
+            <a:picLocks noChangeAspect="1"/>
+          </p:cNvPicPr>
+          <p:nvPr/>
+        </p:nvPicPr>
+        <p:blipFill>
+          <a:blip r:embed="rId4">
+            <a:extLst>
+              <a:ext uri="{28A0092B-C50C-407E-A947-70E740481C1C}">
+                <a14:useLocalDpi xmlns:a14="http://schemas.microsoft.com/office/drawing/2010/main" val="0"/>
+              </a:ext>
+            </a:extLst>
+          </a:blip>
+          <a:stretch>
+            <a:fillRect/>
+          </a:stretch>
+        </p:blipFill>
+        <p:spPr>
+          <a:xfrm>
+            <a:off x="8068724" y="1165451"/>
+            <a:ext cx="1075276" cy="516133"/>
+          </a:xfrm>
+          <a:prstGeom prst="rect">
+            <a:avLst/>
+          </a:prstGeom>
+        </p:spPr>
+      </p:pic>
+      <p:sp>
+        <p:nvSpPr>
+          <p:cNvPr id="3" name="Alatunnisteen paikkamerkki 2"/>
+          <p:cNvSpPr>
+            <a:spLocks noGrp="1"/>
+          </p:cNvSpPr>
+          <p:nvPr>
+            <p:ph type="ftr" sz="quarter" idx="11"/>
+          </p:nvPr>
+        </p:nvSpPr>
+        <p:spPr>
+          <a:xfrm>
+            <a:off x="755576" y="6308361"/>
+            <a:ext cx="4870585" cy="365125"/>
+          </a:xfrm>
+        </p:spPr>
+        <p:txBody>
+          <a:bodyPr/>
+          <a:lstStyle/>
+          <a:p>
+            <a:pPr algn="r">
+              <a:defRPr/>
+            </a:pPr>
+            <a:r>
+              <a:rPr lang="fi-FI" dirty="0"/>
+              <a:t>MAOL Ohjelmointia matematiikkaan</a:t>
+            </a:r>
+            <a:endParaRPr lang="ru-RU" dirty="0"/>
+          </a:p>
+        </p:txBody>
+      </p:sp>
+      <p:sp>
+        <p:nvSpPr>
+          <p:cNvPr id="35" name="Suorakulmio 34"/>
+          <p:cNvSpPr/>
+          <p:nvPr/>
+        </p:nvSpPr>
+        <p:spPr>
+          <a:xfrm>
+            <a:off x="428520" y="765364"/>
+            <a:ext cx="8715480" cy="677108"/>
+          </a:xfrm>
+          <a:prstGeom prst="rect">
+            <a:avLst/>
+          </a:prstGeom>
+        </p:spPr>
+        <p:txBody>
+          <a:bodyPr wrap="square">
+            <a:spAutoFit/>
+          </a:bodyPr>
+          <a:lstStyle/>
+          <a:p>
+            <a:r>
+              <a:rPr lang="fi-FI" sz="2200" dirty="0">
+                <a:solidFill>
+                  <a:schemeClr val="tx1"/>
+                </a:solidFill>
+                <a:latin typeface="Arial" charset="0"/>
+              </a:rPr>
+              <a:t>Automaattilaskuri  </a:t>
+            </a:r>
+            <a:r>
+              <a:rPr lang="fi-FI" sz="1600" i="1" dirty="0">
+                <a:solidFill>
+                  <a:schemeClr val="tx1"/>
+                </a:solidFill>
+                <a:latin typeface="Arial" charset="0"/>
+              </a:rPr>
+              <a:t>(vinkki: </a:t>
+            </a:r>
+            <a:r>
+              <a:rPr lang="fi-FI" sz="1600" i="1" dirty="0" err="1">
+                <a:solidFill>
+                  <a:schemeClr val="tx1"/>
+                </a:solidFill>
+                <a:latin typeface="Arial" charset="0"/>
+              </a:rPr>
+              <a:t>display-read-number</a:t>
+            </a:r>
+            <a:r>
+              <a:rPr lang="fi-FI" sz="1600" i="1" dirty="0">
+                <a:solidFill>
+                  <a:schemeClr val="tx1"/>
+                </a:solidFill>
+                <a:latin typeface="Arial" charset="0"/>
+              </a:rPr>
+              <a:t>, </a:t>
+            </a:r>
+            <a:r>
+              <a:rPr lang="fi-FI" sz="1600" i="1" dirty="0" err="1">
+                <a:solidFill>
+                  <a:schemeClr val="tx1"/>
+                </a:solidFill>
+                <a:latin typeface="Arial" charset="0"/>
+              </a:rPr>
+              <a:t>display</a:t>
+            </a:r>
+            <a:r>
+              <a:rPr lang="fi-FI" sz="1600" i="1" dirty="0">
+                <a:solidFill>
+                  <a:schemeClr val="tx1"/>
+                </a:solidFill>
+                <a:latin typeface="Arial" charset="0"/>
+              </a:rPr>
+              <a:t>-info, </a:t>
+            </a:r>
+            <a:r>
+              <a:rPr lang="fi-FI" sz="1600" i="1" dirty="0" err="1">
+                <a:solidFill>
+                  <a:schemeClr val="tx1"/>
+                </a:solidFill>
+                <a:latin typeface="Arial" charset="0"/>
+              </a:rPr>
+              <a:t>display-value</a:t>
+            </a:r>
+            <a:r>
+              <a:rPr lang="fi-FI" sz="1600" i="1" dirty="0">
+                <a:solidFill>
+                  <a:schemeClr val="tx1"/>
+                </a:solidFill>
+                <a:latin typeface="Arial" charset="0"/>
+              </a:rPr>
+              <a:t>, </a:t>
+            </a:r>
+          </a:p>
+          <a:p>
+            <a:r>
+              <a:rPr lang="fi-FI" sz="1600" i="1" dirty="0">
+                <a:solidFill>
+                  <a:schemeClr val="tx1"/>
+                </a:solidFill>
+                <a:latin typeface="Arial" charset="0"/>
+              </a:rPr>
+              <a:t>						     </a:t>
+            </a:r>
+            <a:r>
+              <a:rPr lang="fi-FI" sz="1600" i="1" dirty="0" err="1">
+                <a:solidFill>
+                  <a:schemeClr val="tx1"/>
+                </a:solidFill>
+                <a:latin typeface="Arial" charset="0"/>
+              </a:rPr>
+              <a:t>round</a:t>
+            </a:r>
+            <a:r>
+              <a:rPr lang="fi-FI" sz="1600" i="1" dirty="0">
+                <a:solidFill>
+                  <a:schemeClr val="tx1"/>
+                </a:solidFill>
+                <a:latin typeface="Arial" charset="0"/>
+              </a:rPr>
+              <a:t>-to-</a:t>
+            </a:r>
+            <a:r>
+              <a:rPr lang="fi-FI" sz="1600" i="1" dirty="0" err="1">
+                <a:solidFill>
+                  <a:schemeClr val="tx1"/>
+                </a:solidFill>
+                <a:latin typeface="Arial" charset="0"/>
+              </a:rPr>
+              <a:t>decimal</a:t>
+            </a:r>
+            <a:r>
+              <a:rPr lang="fi-FI" sz="1600" i="1">
+                <a:solidFill>
+                  <a:schemeClr val="tx1"/>
+                </a:solidFill>
+                <a:latin typeface="Arial" charset="0"/>
+              </a:rPr>
+              <a:t>, quantity</a:t>
+            </a:r>
+            <a:r>
+              <a:rPr lang="fi-FI" sz="1600" i="1" dirty="0">
+                <a:solidFill>
+                  <a:schemeClr val="tx1"/>
+                </a:solidFill>
+                <a:latin typeface="Arial" charset="0"/>
+              </a:rPr>
+              <a:t>-&gt;image, </a:t>
+            </a:r>
+            <a:r>
+              <a:rPr lang="fi-FI" sz="1600" i="1" dirty="0" err="1">
+                <a:solidFill>
+                  <a:schemeClr val="tx1"/>
+                </a:solidFill>
+                <a:latin typeface="Arial" charset="0"/>
+              </a:rPr>
+              <a:t>display-select</a:t>
+            </a:r>
+            <a:r>
+              <a:rPr lang="fi-FI" sz="1600" i="1" dirty="0">
+                <a:solidFill>
+                  <a:schemeClr val="tx1"/>
+                </a:solidFill>
+                <a:latin typeface="Arial" charset="0"/>
+              </a:rPr>
+              <a:t>)</a:t>
+            </a:r>
+            <a:endParaRPr lang="fi-FI" sz="1600" i="1" dirty="0">
+              <a:solidFill>
+                <a:schemeClr val="tx1"/>
+              </a:solidFill>
+            </a:endParaRPr>
+          </a:p>
+        </p:txBody>
+      </p:sp>
+      <p:pic>
+        <p:nvPicPr>
+          <p:cNvPr id="61" name="Picture 2" descr="WeScheme Logo"/>
+          <p:cNvPicPr>
+            <a:picLocks noChangeAspect="1" noChangeArrowheads="1"/>
+          </p:cNvPicPr>
+          <p:nvPr/>
+        </p:nvPicPr>
+        <p:blipFill>
+          <a:blip r:embed="rId5" cstate="print">
+            <a:extLst>
+              <a:ext uri="{28A0092B-C50C-407E-A947-70E740481C1C}">
+                <a14:useLocalDpi xmlns:a14="http://schemas.microsoft.com/office/drawing/2010/main" val="0"/>
+              </a:ext>
+            </a:extLst>
+          </a:blip>
+          <a:srcRect/>
+          <a:stretch>
+            <a:fillRect/>
+          </a:stretch>
+        </p:blipFill>
+        <p:spPr bwMode="auto">
+          <a:xfrm>
+            <a:off x="7386527" y="5180161"/>
+            <a:ext cx="1495802" cy="1383832"/>
+          </a:xfrm>
+          <a:prstGeom prst="rect">
+            <a:avLst/>
+          </a:prstGeom>
+          <a:noFill/>
+          <a:ln>
+            <a:noFill/>
+          </a:ln>
+          <a:effectLst>
+            <a:outerShdw blurRad="50800" dist="38100" dir="5400000" algn="t" rotWithShape="0">
+              <a:prstClr val="black">
+                <a:alpha val="40000"/>
+              </a:prstClr>
+            </a:outerShdw>
+          </a:effectLst>
+          <a:extLst>
+            <a:ext uri="{909E8E84-426E-40DD-AFC4-6F175D3DCCD1}">
+              <a14:hiddenFill xmlns:a14="http://schemas.microsoft.com/office/drawing/2010/main">
+                <a:solidFill>
+                  <a:srgbClr val="FFFFFF"/>
+                </a:solidFill>
+              </a14:hiddenFill>
+            </a:ext>
+            <a:ext uri="{91240B29-F687-4F45-9708-019B960494DF}">
+              <a14:hiddenLine xmlns:a14="http://schemas.microsoft.com/office/drawing/2010/main" w="9525">
+                <a:solidFill>
+                  <a:srgbClr val="000000"/>
+                </a:solidFill>
+                <a:miter lim="800000"/>
+                <a:headEnd/>
+                <a:tailEnd/>
+              </a14:hiddenLine>
+            </a:ext>
+          </a:extLst>
+        </p:spPr>
+      </p:pic>
+      <p:sp>
+        <p:nvSpPr>
+          <p:cNvPr id="16" name="Suorakulmio 34"/>
+          <p:cNvSpPr/>
+          <p:nvPr/>
+        </p:nvSpPr>
+        <p:spPr>
+          <a:xfrm>
+            <a:off x="1106302" y="1766072"/>
+            <a:ext cx="7446886" cy="1446550"/>
+          </a:xfrm>
+          <a:prstGeom prst="rect">
+            <a:avLst/>
+          </a:prstGeom>
+        </p:spPr>
+        <p:txBody>
+          <a:bodyPr wrap="square">
+            <a:spAutoFit/>
+          </a:bodyPr>
+          <a:lstStyle/>
+          <a:p>
+            <a:r>
+              <a:rPr lang="fi-FI" sz="2200" dirty="0">
+                <a:solidFill>
+                  <a:schemeClr val="tx1"/>
+                </a:solidFill>
+                <a:latin typeface="Arial" charset="0"/>
+              </a:rPr>
+              <a:t>Tee automaattilaskuri, joka laskee jonkin avaruuskappaleen tilavuuden tai kokonaispinta-alan. Ilmoita vastaus oikein pyöristettynä oikean mittayksikön kanssa. Kysy tarvittavat mitat käyttäjältä.</a:t>
+            </a:r>
+            <a:endParaRPr lang="fi-FI" sz="2000" i="1" dirty="0">
+              <a:solidFill>
+                <a:schemeClr val="tx1"/>
+              </a:solidFill>
+              <a:latin typeface="Arial" charset="0"/>
+            </a:endParaRPr>
+          </a:p>
+        </p:txBody>
+      </p:sp>
+      <p:sp>
+        <p:nvSpPr>
+          <p:cNvPr id="9" name="Rectangle 8"/>
+          <p:cNvSpPr/>
+          <p:nvPr/>
+        </p:nvSpPr>
+        <p:spPr>
+          <a:xfrm>
+            <a:off x="2216425" y="5185112"/>
+            <a:ext cx="4887620" cy="1200329"/>
+          </a:xfrm>
+          <a:prstGeom prst="rect">
+            <a:avLst/>
+          </a:prstGeom>
+        </p:spPr>
+        <p:txBody>
+          <a:bodyPr wrap="square">
+            <a:spAutoFit/>
+          </a:bodyPr>
+          <a:lstStyle/>
+          <a:p>
+            <a:r>
+              <a:rPr lang="fi-FI" i="1" dirty="0">
+                <a:solidFill>
+                  <a:schemeClr val="tx1"/>
+                </a:solidFill>
+                <a:latin typeface="Arial" charset="0"/>
+              </a:rPr>
+              <a:t>Vinkki: eri ryhmät voivat ottaa koodattavaksi eri avaruuskappaleet ja jakaa ne </a:t>
+            </a:r>
+            <a:r>
+              <a:rPr lang="fi-FI" i="1" dirty="0" err="1">
+                <a:solidFill>
+                  <a:schemeClr val="tx1"/>
+                </a:solidFill>
+                <a:latin typeface="Arial" charset="0"/>
+              </a:rPr>
+              <a:t>WeScheme:n</a:t>
+            </a:r>
+            <a:r>
+              <a:rPr lang="fi-FI" i="1" dirty="0">
+                <a:solidFill>
+                  <a:schemeClr val="tx1"/>
+                </a:solidFill>
+                <a:latin typeface="Arial" charset="0"/>
+              </a:rPr>
+              <a:t> ja </a:t>
+            </a:r>
+            <a:r>
+              <a:rPr lang="fi-FI" i="1" dirty="0" err="1">
+                <a:solidFill>
+                  <a:schemeClr val="tx1"/>
+                </a:solidFill>
+                <a:latin typeface="Arial" charset="0"/>
+              </a:rPr>
+              <a:t>Padlet</a:t>
+            </a:r>
+            <a:r>
+              <a:rPr lang="fi-FI" i="1" dirty="0">
+                <a:solidFill>
+                  <a:schemeClr val="tx1"/>
+                </a:solidFill>
+                <a:latin typeface="Arial" charset="0"/>
+              </a:rPr>
+              <a:t>-seinän avulla koko luokalle.</a:t>
+            </a:r>
+          </a:p>
+        </p:txBody>
+      </p:sp>
+      <p:sp>
+        <p:nvSpPr>
+          <p:cNvPr id="11" name="Suorakulmio 42"/>
+          <p:cNvSpPr/>
+          <p:nvPr/>
+        </p:nvSpPr>
+        <p:spPr>
+          <a:xfrm>
+            <a:off x="0" y="3542549"/>
+            <a:ext cx="1074012" cy="338554"/>
+          </a:xfrm>
+          <a:prstGeom prst="rect">
+            <a:avLst/>
+          </a:prstGeom>
+          <a:solidFill>
+            <a:schemeClr val="accent2">
+              <a:lumMod val="75000"/>
+            </a:schemeClr>
+          </a:solidFill>
+        </p:spPr>
+        <p:txBody>
+          <a:bodyPr wrap="none">
+            <a:spAutoFit/>
+          </a:bodyPr>
+          <a:lstStyle/>
+          <a:p>
+            <a:r>
+              <a:rPr kumimoji="0" lang="fi-FI" sz="1600" b="0" i="0" u="none" strike="noStrike" cap="none" normalizeH="0" dirty="0">
+                <a:ln>
+                  <a:noFill/>
+                </a:ln>
+                <a:effectLst/>
+                <a:latin typeface="Arial" charset="0"/>
+              </a:rPr>
+              <a:t>Tehtävä </a:t>
+            </a:r>
+            <a:r>
+              <a:rPr lang="fi-FI" sz="1600" dirty="0">
+                <a:latin typeface="Arial" charset="0"/>
+              </a:rPr>
+              <a:t>2</a:t>
+            </a:r>
+            <a:endParaRPr lang="fi-FI" sz="1600" dirty="0"/>
+          </a:p>
+        </p:txBody>
+      </p:sp>
+      <p:sp>
+        <p:nvSpPr>
+          <p:cNvPr id="12" name="Suorakulmio 34"/>
+          <p:cNvSpPr/>
+          <p:nvPr/>
+        </p:nvSpPr>
+        <p:spPr>
+          <a:xfrm>
+            <a:off x="1154629" y="3421215"/>
+            <a:ext cx="7565328" cy="1446550"/>
+          </a:xfrm>
+          <a:prstGeom prst="rect">
+            <a:avLst/>
+          </a:prstGeom>
+        </p:spPr>
+        <p:txBody>
+          <a:bodyPr wrap="square">
+            <a:spAutoFit/>
+          </a:bodyPr>
+          <a:lstStyle/>
+          <a:p>
+            <a:r>
+              <a:rPr lang="fi-FI" sz="2200" dirty="0">
+                <a:solidFill>
+                  <a:schemeClr val="tx1"/>
+                </a:solidFill>
+                <a:latin typeface="Arial" charset="0"/>
+              </a:rPr>
+              <a:t>Tee automaattilaskuri, joka ensin kysyy käyttäjältä mitä lasketaan, pyytää tarvittavia arvoja ja ilmoittaa tuloksen. Voit käyttää avuksi tehtävän 1 laskuria ja valintapelistä tuttua valintaikkunaa. </a:t>
+            </a:r>
+            <a:endParaRPr lang="fi-FI" sz="2000" dirty="0">
+              <a:solidFill>
+                <a:schemeClr val="tx1"/>
+              </a:solidFill>
+              <a:latin typeface="Arial" charset="0"/>
+            </a:endParaRPr>
+          </a:p>
+        </p:txBody>
+      </p:sp>
+    </p:spTree>
+    <p:extLst>
+      <p:ext uri="{BB962C8B-B14F-4D97-AF65-F5344CB8AC3E}">
+        <p14:creationId xmlns:p14="http://schemas.microsoft.com/office/powerpoint/2010/main" val="2642150010"/>
+      </p:ext>
+    </p:extLst>
+  </p:cSld>
+  <p:clrMapOvr>
+    <a:masterClrMapping/>
+  </p:clrMapOvr>
+</p:sld>
+</file>
+
+<file path=ppt/slides/slide28.xml><?xml version="1.0" encoding="utf-8"?>
+<p:sld xmlns:a="http://schemas.openxmlformats.org/drawingml/2006/main" xmlns:r="http://schemas.openxmlformats.org/officeDocument/2006/relationships" xmlns:p="http://schemas.openxmlformats.org/presentationml/2006/main">
+  <p:cSld>
+    <p:spTree>
+      <p:nvGrpSpPr>
+        <p:cNvPr id="1" name=""/>
+        <p:cNvGrpSpPr/>
+        <p:nvPr/>
+      </p:nvGrpSpPr>
+      <p:grpSpPr>
+        <a:xfrm>
+          <a:off x="0" y="0"/>
+          <a:ext cx="0" cy="0"/>
+          <a:chOff x="0" y="0"/>
+          <a:chExt cx="0" cy="0"/>
+        </a:xfrm>
+      </p:grpSpPr>
       <p:sp>
         <p:nvSpPr>
           <p:cNvPr id="3" name="Title 2"/>

</xml_diff>